<commit_message>
Timeline and Schedule almost F
</commit_message>
<xml_diff>
--- a/Aplikacja Sports Joiner.pptx
+++ b/Aplikacja Sports Joiner.pptx
@@ -5,10 +5,10 @@
     <p:sldMasterId id="2147483648" r:id="rId4"/>
   </p:sldMasterIdLst>
   <p:notesMasterIdLst>
-    <p:notesMasterId r:id="rId16"/>
+    <p:notesMasterId r:id="rId17"/>
   </p:notesMasterIdLst>
   <p:handoutMasterIdLst>
-    <p:handoutMasterId r:id="rId17"/>
+    <p:handoutMasterId r:id="rId18"/>
   </p:handoutMasterIdLst>
   <p:sldIdLst>
     <p:sldId id="258" r:id="rId5"/>
@@ -17,11 +17,12 @@
     <p:sldId id="286" r:id="rId8"/>
     <p:sldId id="272" r:id="rId9"/>
     <p:sldId id="282" r:id="rId10"/>
-    <p:sldId id="284" r:id="rId11"/>
-    <p:sldId id="287" r:id="rId12"/>
-    <p:sldId id="279" r:id="rId13"/>
+    <p:sldId id="287" r:id="rId11"/>
+    <p:sldId id="289" r:id="rId12"/>
+    <p:sldId id="290" r:id="rId13"/>
     <p:sldId id="288" r:id="rId14"/>
-    <p:sldId id="274" r:id="rId15"/>
+    <p:sldId id="279" r:id="rId15"/>
+    <p:sldId id="274" r:id="rId16"/>
   </p:sldIdLst>
   <p:sldSz cx="12192000" cy="6858000"/>
   <p:notesSz cx="6858000" cy="9144000"/>
@@ -4787,7 +4788,7 @@
             <a:pPr rtl="0"/>
             <a:fld id="{DAB64803-BE99-4D11-92FE-DB0D80E992EC}" type="datetime1">
               <a:rPr lang="pl-PL" smtClean="0"/>
-              <a:t>04.11.2024</a:t>
+              <a:t>06.11.2024</a:t>
             </a:fld>
             <a:endParaRPr lang="pl-PL" dirty="0"/>
           </a:p>
@@ -4968,7 +4969,7 @@
             <a:fld id="{DB090C74-F23A-4A01-B61B-B7FE422EF232}" type="datetime1">
               <a:rPr lang="pl-PL" smtClean="0"/>
               <a:pPr/>
-              <a:t>04.11.2024</a:t>
+              <a:t>06.11.2024</a:t>
             </a:fld>
             <a:endParaRPr lang="pl-PL" dirty="0"/>
           </a:p>
@@ -5791,7 +5792,7 @@
             <a:pPr rtl="0"/>
             <a:fld id="{339D21CC-DD94-204E-93C8-E1AAF3084C8D}" type="slidenum">
               <a:rPr lang="pl-PL" smtClean="0"/>
-              <a:t>7</a:t>
+              <a:t>11</a:t>
             </a:fld>
             <a:endParaRPr lang="pl-PL"/>
           </a:p>
@@ -5800,7 +5801,7 @@
     </p:spTree>
     <p:extLst>
       <p:ext uri="{BB962C8B-B14F-4D97-AF65-F5344CB8AC3E}">
-        <p14:creationId xmlns:p14="http://schemas.microsoft.com/office/powerpoint/2010/main" val="1026340830"/>
+        <p14:creationId xmlns:p14="http://schemas.microsoft.com/office/powerpoint/2010/main" val="1568690504"/>
       </p:ext>
     </p:extLst>
   </p:cSld>
@@ -5859,7 +5860,7 @@
           </a:lstStyle>
           <a:p>
             <a:pPr rtl="0"/>
-            <a:endParaRPr lang="pl-PL"/>
+            <a:endParaRPr lang="pl-PL" dirty="0"/>
           </a:p>
         </p:txBody>
       </p:sp>
@@ -5885,101 +5886,7 @@
             <a:pPr rtl="0"/>
             <a:fld id="{339D21CC-DD94-204E-93C8-E1AAF3084C8D}" type="slidenum">
               <a:rPr lang="pl-PL" smtClean="0"/>
-              <a:t>9</a:t>
-            </a:fld>
-            <a:endParaRPr lang="pl-PL"/>
-          </a:p>
-        </p:txBody>
-      </p:sp>
-    </p:spTree>
-    <p:extLst>
-      <p:ext uri="{BB962C8B-B14F-4D97-AF65-F5344CB8AC3E}">
-        <p14:creationId xmlns:p14="http://schemas.microsoft.com/office/powerpoint/2010/main" val="1568690504"/>
-      </p:ext>
-    </p:extLst>
-  </p:cSld>
-  <p:clrMapOvr>
-    <a:masterClrMapping/>
-  </p:clrMapOvr>
-</p:notes>
-</file>
-
-<file path=ppt/notesSlides/notesSlide8.xml><?xml version="1.0" encoding="utf-8"?>
-<p:notes xmlns:a="http://schemas.openxmlformats.org/drawingml/2006/main" xmlns:r="http://schemas.openxmlformats.org/officeDocument/2006/relationships" xmlns:p="http://schemas.openxmlformats.org/presentationml/2006/main">
-  <p:cSld>
-    <p:spTree>
-      <p:nvGrpSpPr>
-        <p:cNvPr id="1" name=""/>
-        <p:cNvGrpSpPr/>
-        <p:nvPr/>
-      </p:nvGrpSpPr>
-      <p:grpSpPr>
-        <a:xfrm>
-          <a:off x="0" y="0"/>
-          <a:ext cx="0" cy="0"/>
-          <a:chOff x="0" y="0"/>
-          <a:chExt cx="0" cy="0"/>
-        </a:xfrm>
-      </p:grpSpPr>
-      <p:sp>
-        <p:nvSpPr>
-          <p:cNvPr id="2" name="Obraz slajdu — symbol zastępczy 1"/>
-          <p:cNvSpPr>
-            <a:spLocks noGrp="1" noRot="1" noChangeAspect="1"/>
-          </p:cNvSpPr>
-          <p:nvPr>
-            <p:ph type="sldImg"/>
-          </p:nvPr>
-        </p:nvSpPr>
-        <p:spPr/>
-      </p:sp>
-      <p:sp>
-        <p:nvSpPr>
-          <p:cNvPr id="3" name="Notatki — symbol zastępczy 2"/>
-          <p:cNvSpPr>
-            <a:spLocks noGrp="1"/>
-          </p:cNvSpPr>
-          <p:nvPr>
-            <p:ph type="body" idx="1"/>
-          </p:nvPr>
-        </p:nvSpPr>
-        <p:spPr/>
-        <p:txBody>
-          <a:bodyPr rtlCol="0"/>
-          <a:lstStyle>
-            <a:defPPr>
-              <a:defRPr lang="pl-PL"/>
-            </a:defPPr>
-          </a:lstStyle>
-          <a:p>
-            <a:pPr rtl="0"/>
-            <a:endParaRPr lang="pl-PL" dirty="0"/>
-          </a:p>
-        </p:txBody>
-      </p:sp>
-      <p:sp>
-        <p:nvSpPr>
-          <p:cNvPr id="4" name="Numer slajdu — symbol zastępczy 3"/>
-          <p:cNvSpPr>
-            <a:spLocks noGrp="1"/>
-          </p:cNvSpPr>
-          <p:nvPr>
-            <p:ph type="sldNum" sz="quarter" idx="5"/>
-          </p:nvPr>
-        </p:nvSpPr>
-        <p:spPr/>
-        <p:txBody>
-          <a:bodyPr rtlCol="0"/>
-          <a:lstStyle>
-            <a:defPPr>
-              <a:defRPr lang="pl-PL"/>
-            </a:defPPr>
-          </a:lstStyle>
-          <a:p>
-            <a:pPr rtl="0"/>
-            <a:fld id="{339D21CC-DD94-204E-93C8-E1AAF3084C8D}" type="slidenum">
-              <a:rPr lang="pl-PL" smtClean="0"/>
-              <a:t>11</a:t>
+              <a:t>12</a:t>
             </a:fld>
             <a:endParaRPr lang="pl-PL"/>
           </a:p>
@@ -23380,6 +23287,208 @@
       </p:grpSpPr>
       <p:sp>
         <p:nvSpPr>
+          <p:cNvPr id="13" name="Tytuł 12">
+            <a:extLst>
+              <a:ext uri="{FF2B5EF4-FFF2-40B4-BE49-F238E27FC236}">
+                <a16:creationId xmlns:a16="http://schemas.microsoft.com/office/drawing/2014/main" id="{E729A509-992F-8C10-902D-182448B5A1AE}"/>
+              </a:ext>
+            </a:extLst>
+          </p:cNvPr>
+          <p:cNvSpPr>
+            <a:spLocks noGrp="1"/>
+          </p:cNvSpPr>
+          <p:nvPr>
+            <p:ph type="title"/>
+          </p:nvPr>
+        </p:nvSpPr>
+        <p:spPr/>
+        <p:txBody>
+          <a:bodyPr rtlCol="0"/>
+          <a:lstStyle>
+            <a:defPPr>
+              <a:defRPr lang="pl-PL"/>
+            </a:defPPr>
+          </a:lstStyle>
+          <a:p>
+            <a:pPr rtl="0"/>
+            <a:r>
+              <a:rPr lang="pl-PL" dirty="0"/>
+              <a:t>Podsumowanie</a:t>
+            </a:r>
+          </a:p>
+        </p:txBody>
+      </p:sp>
+      <p:sp>
+        <p:nvSpPr>
+          <p:cNvPr id="12" name="Zawartość — symbol zastępczy 11">
+            <a:extLst>
+              <a:ext uri="{FF2B5EF4-FFF2-40B4-BE49-F238E27FC236}">
+                <a16:creationId xmlns:a16="http://schemas.microsoft.com/office/drawing/2014/main" id="{84FA0F1E-A920-0194-981E-4B573643BB48}"/>
+              </a:ext>
+            </a:extLst>
+          </p:cNvPr>
+          <p:cNvSpPr>
+            <a:spLocks noGrp="1"/>
+          </p:cNvSpPr>
+          <p:nvPr>
+            <p:ph idx="1"/>
+          </p:nvPr>
+        </p:nvSpPr>
+        <p:spPr/>
+        <p:txBody>
+          <a:bodyPr rtlCol="0"/>
+          <a:lstStyle>
+            <a:defPPr>
+              <a:defRPr lang="pl-PL"/>
+            </a:defPPr>
+          </a:lstStyle>
+          <a:p>
+            <a:pPr rtl="0"/>
+            <a:r>
+              <a:rPr lang="pl-PL" dirty="0"/>
+              <a:t>Aplikacja „Sports </a:t>
+            </a:r>
+            <a:r>
+              <a:rPr lang="pl-PL" dirty="0" err="1"/>
+              <a:t>Joiner</a:t>
+            </a:r>
+            <a:r>
+              <a:rPr lang="pl-PL" dirty="0"/>
+              <a:t>” jest rewolucyjnym rozwiązaniem, mającym na celu poprawę zdrowia oraz zacieśniania więzi wśród wszystkich jej użytkowników. Głównym celem, przyświecającym tej idei technologicznej, jest pomoc w odnalezieniu chętnych do uprawiania tego samego sportu. Projekt ten jest także narzędziem dla osób, którym brakuje motywacji do poszerzania swoich możliwości ruchowych w pojedynkę.</a:t>
+            </a:r>
+          </a:p>
+          <a:p>
+            <a:pPr algn="l" rtl="0" fontAlgn="base"/>
+            <a:r>
+              <a:rPr lang="pl-PL" b="0" i="0" dirty="0">
+                <a:solidFill>
+                  <a:srgbClr val="000000"/>
+                </a:solidFill>
+                <a:effectLst/>
+                <a:latin typeface="Calibri" panose="020F0502020204030204" pitchFamily="34" charset="0"/>
+              </a:rPr>
+              <a:t>​</a:t>
+            </a:r>
+            <a:endParaRPr lang="pl-PL" b="0" i="0" dirty="0">
+              <a:solidFill>
+                <a:srgbClr val="000000"/>
+              </a:solidFill>
+              <a:effectLst/>
+              <a:latin typeface="Segoe UI" panose="020B0502040204020203" pitchFamily="34" charset="0"/>
+            </a:endParaRPr>
+          </a:p>
+          <a:p>
+            <a:pPr rtl="0"/>
+            <a:endParaRPr lang="pl-PL" b="1" dirty="0">
+              <a:latin typeface="Arial Black" panose="020B0604020202020204" pitchFamily="34" charset="0"/>
+              <a:cs typeface="Arial Black" panose="020B0604020202020204" pitchFamily="34" charset="0"/>
+            </a:endParaRPr>
+          </a:p>
+        </p:txBody>
+      </p:sp>
+      <p:sp>
+        <p:nvSpPr>
+          <p:cNvPr id="19" name="Tekst — symbol zastępczy 18">
+            <a:extLst>
+              <a:ext uri="{FF2B5EF4-FFF2-40B4-BE49-F238E27FC236}">
+                <a16:creationId xmlns:a16="http://schemas.microsoft.com/office/drawing/2014/main" id="{1A502D19-C614-886C-4945-5880F36E0998}"/>
+              </a:ext>
+            </a:extLst>
+          </p:cNvPr>
+          <p:cNvSpPr>
+            <a:spLocks noGrp="1"/>
+          </p:cNvSpPr>
+          <p:nvPr>
+            <p:ph type="body" sz="quarter" idx="13"/>
+          </p:nvPr>
+        </p:nvSpPr>
+        <p:spPr/>
+        <p:txBody>
+          <a:bodyPr rtlCol="0"/>
+          <a:lstStyle>
+            <a:defPPr>
+              <a:defRPr lang="pl-PL"/>
+            </a:defPPr>
+          </a:lstStyle>
+          <a:p>
+            <a:pPr rtl="0"/>
+            <a:endParaRPr lang="pl-PL"/>
+          </a:p>
+        </p:txBody>
+      </p:sp>
+      <p:sp>
+        <p:nvSpPr>
+          <p:cNvPr id="17" name="Numer slajdu — symbol zastępczy 16">
+            <a:extLst>
+              <a:ext uri="{FF2B5EF4-FFF2-40B4-BE49-F238E27FC236}">
+                <a16:creationId xmlns:a16="http://schemas.microsoft.com/office/drawing/2014/main" id="{E46CC291-411B-349C-8657-ED39C084F877}"/>
+              </a:ext>
+            </a:extLst>
+          </p:cNvPr>
+          <p:cNvSpPr>
+            <a:spLocks noGrp="1"/>
+          </p:cNvSpPr>
+          <p:nvPr>
+            <p:ph type="sldNum" sz="quarter" idx="15"/>
+          </p:nvPr>
+        </p:nvSpPr>
+        <p:spPr/>
+        <p:txBody>
+          <a:bodyPr rtlCol="0"/>
+          <a:lstStyle>
+            <a:defPPr>
+              <a:defRPr lang="pl-PL"/>
+            </a:defPPr>
+          </a:lstStyle>
+          <a:p>
+            <a:pPr rtl="0"/>
+            <a:r>
+              <a:rPr lang="pl-PL" dirty="0"/>
+              <a:t>10</a:t>
+            </a:r>
+          </a:p>
+        </p:txBody>
+      </p:sp>
+    </p:spTree>
+    <p:extLst>
+      <p:ext uri="{BB962C8B-B14F-4D97-AF65-F5344CB8AC3E}">
+        <p14:creationId xmlns:p14="http://schemas.microsoft.com/office/powerpoint/2010/main" val="893108741"/>
+      </p:ext>
+    </p:extLst>
+  </p:cSld>
+  <p:clrMapOvr>
+    <a:masterClrMapping/>
+  </p:clrMapOvr>
+</p:sld>
+</file>
+
+<file path=ppt/slides/slide12.xml><?xml version="1.0" encoding="utf-8"?>
+<p:sld xmlns:a="http://schemas.openxmlformats.org/drawingml/2006/main" xmlns:r="http://schemas.openxmlformats.org/officeDocument/2006/relationships" xmlns:p="http://schemas.openxmlformats.org/presentationml/2006/main">
+  <p:cSld>
+    <p:bg>
+      <p:bgPr>
+        <a:solidFill>
+          <a:schemeClr val="bg2"/>
+        </a:solidFill>
+        <a:effectLst/>
+      </p:bgPr>
+    </p:bg>
+    <p:spTree>
+      <p:nvGrpSpPr>
+        <p:cNvPr id="1" name=""/>
+        <p:cNvGrpSpPr/>
+        <p:nvPr/>
+      </p:nvGrpSpPr>
+      <p:grpSpPr>
+        <a:xfrm>
+          <a:off x="0" y="0"/>
+          <a:ext cx="0" cy="0"/>
+          <a:chOff x="0" y="0"/>
+          <a:chExt cx="0" cy="0"/>
+        </a:xfrm>
+      </p:grpSpPr>
+      <p:sp>
+        <p:nvSpPr>
           <p:cNvPr id="3" name="Tytuł 2">
             <a:extLst>
               <a:ext uri="{FF2B5EF4-FFF2-40B4-BE49-F238E27FC236}">
@@ -24517,7 +24626,7 @@
             <p:ph idx="1"/>
             <p:extLst>
               <p:ext uri="{D42A27DB-BD31-4B8C-83A1-F6EECF244321}">
-                <p14:modId xmlns:p14="http://schemas.microsoft.com/office/powerpoint/2010/main" val="924364001"/>
+                <p14:modId xmlns:p14="http://schemas.microsoft.com/office/powerpoint/2010/main" val="2359752038"/>
               </p:ext>
             </p:extLst>
           </p:nvPr>
@@ -24623,6 +24732,41 @@
             <a:r>
               <a:rPr lang="pl-PL" sz="2000" dirty="0"/>
               <a:t>Starsi</a:t>
+            </a:r>
+          </a:p>
+        </p:txBody>
+      </p:sp>
+      <p:sp>
+        <p:nvSpPr>
+          <p:cNvPr id="3" name="pole tekstowe 2">
+            <a:extLst>
+              <a:ext uri="{FF2B5EF4-FFF2-40B4-BE49-F238E27FC236}">
+                <a16:creationId xmlns:a16="http://schemas.microsoft.com/office/drawing/2014/main" id="{56600E01-2FD8-BFEC-18DA-11538C1E7B1E}"/>
+              </a:ext>
+            </a:extLst>
+          </p:cNvPr>
+          <p:cNvSpPr txBox="1"/>
+          <p:nvPr/>
+        </p:nvSpPr>
+        <p:spPr>
+          <a:xfrm>
+            <a:off x="1114097" y="1797269"/>
+            <a:ext cx="8187558" cy="369332"/>
+          </a:xfrm>
+          <a:prstGeom prst="rect">
+            <a:avLst/>
+          </a:prstGeom>
+          <a:noFill/>
+        </p:spPr>
+        <p:txBody>
+          <a:bodyPr wrap="square" rtlCol="0">
+            <a:spAutoFit/>
+          </a:bodyPr>
+          <a:lstStyle/>
+          <a:p>
+            <a:r>
+              <a:rPr lang="pl-PL" dirty="0"/>
+              <a:t>Notatka o tym, że dla każdego jest taka sama funkcjonalność</a:t>
             </a:r>
           </a:p>
         </p:txBody>
@@ -24928,10 +25072,10 @@
       </p:grpSpPr>
       <p:sp>
         <p:nvSpPr>
-          <p:cNvPr id="3" name="Tytuł 2">
-            <a:extLst>
-              <a:ext uri="{FF2B5EF4-FFF2-40B4-BE49-F238E27FC236}">
-                <a16:creationId xmlns:a16="http://schemas.microsoft.com/office/drawing/2014/main" id="{87264F79-95B4-7ADF-2A8F-BEF6FEFDACEE}"/>
+          <p:cNvPr id="2" name="Tytuł 1">
+            <a:extLst>
+              <a:ext uri="{FF2B5EF4-FFF2-40B4-BE49-F238E27FC236}">
+                <a16:creationId xmlns:a16="http://schemas.microsoft.com/office/drawing/2014/main" id="{BE70DD43-5D3B-588D-38B0-6B4556796A53}"/>
               </a:ext>
             </a:extLst>
           </p:cNvPr>
@@ -24944,27 +25088,111 @@
         </p:nvSpPr>
         <p:spPr/>
         <p:txBody>
-          <a:bodyPr rtlCol="0"/>
-          <a:lstStyle>
-            <a:defPPr>
-              <a:defRPr lang="pl-PL"/>
-            </a:defPPr>
-          </a:lstStyle>
-          <a:p>
-            <a:pPr rtl="0"/>
+          <a:bodyPr/>
+          <a:lstStyle/>
+          <a:p>
             <a:r>
-              <a:rPr lang="pl-PL"/>
-              <a:t>Oś czasu </a:t>
+              <a:rPr lang="pl-PL" dirty="0"/>
+              <a:t>Problemy i ograniczenia</a:t>
             </a:r>
           </a:p>
         </p:txBody>
       </p:sp>
       <p:sp>
         <p:nvSpPr>
-          <p:cNvPr id="45" name="Tekst — symbol zastępczy 44">
-            <a:extLst>
-              <a:ext uri="{FF2B5EF4-FFF2-40B4-BE49-F238E27FC236}">
-                <a16:creationId xmlns:a16="http://schemas.microsoft.com/office/drawing/2014/main" id="{69F5F0D3-B131-4CB7-0B2A-26B4F86A2B02}"/>
+          <p:cNvPr id="3" name="Symbol zastępczy zawartości 2">
+            <a:extLst>
+              <a:ext uri="{FF2B5EF4-FFF2-40B4-BE49-F238E27FC236}">
+                <a16:creationId xmlns:a16="http://schemas.microsoft.com/office/drawing/2014/main" id="{FBEDC8E8-AC73-2074-202D-222CF5907068}"/>
+              </a:ext>
+            </a:extLst>
+          </p:cNvPr>
+          <p:cNvSpPr>
+            <a:spLocks noGrp="1"/>
+          </p:cNvSpPr>
+          <p:nvPr>
+            <p:ph idx="1"/>
+          </p:nvPr>
+        </p:nvSpPr>
+        <p:spPr/>
+        <p:txBody>
+          <a:bodyPr/>
+          <a:lstStyle/>
+          <a:p>
+            <a:pPr marL="285750" indent="-285750">
+              <a:lnSpc>
+                <a:spcPct val="150000"/>
+              </a:lnSpc>
+              <a:buFont typeface="Arial" panose="020B0604020202020204" pitchFamily="34" charset="0"/>
+              <a:buChar char="•"/>
+            </a:pPr>
+            <a:r>
+              <a:rPr lang="pl-PL" dirty="0"/>
+              <a:t>Aplikacja nie bierze pod uwagę osób korzystających z boisk na co dzień</a:t>
+            </a:r>
+          </a:p>
+          <a:p>
+            <a:pPr marL="285750" indent="-285750">
+              <a:lnSpc>
+                <a:spcPct val="150000"/>
+              </a:lnSpc>
+              <a:buFont typeface="Arial" panose="020B0604020202020204" pitchFamily="34" charset="0"/>
+              <a:buChar char="•"/>
+            </a:pPr>
+            <a:r>
+              <a:rPr lang="pl-PL" dirty="0"/>
+              <a:t>Brak systemu na obsługę zwrotów rezerwacji</a:t>
+            </a:r>
+          </a:p>
+          <a:p>
+            <a:pPr marL="285750" indent="-285750">
+              <a:lnSpc>
+                <a:spcPct val="150000"/>
+              </a:lnSpc>
+              <a:buFont typeface="Arial" panose="020B0604020202020204" pitchFamily="34" charset="0"/>
+              <a:buChar char="•"/>
+            </a:pPr>
+            <a:r>
+              <a:rPr lang="pl-PL" dirty="0"/>
+              <a:t>Ilość obiektów sportowych jest ograniczona, a także nie w każdym mieście występują boiska do wszystkich dostępnych sportów</a:t>
+            </a:r>
+          </a:p>
+          <a:p>
+            <a:pPr marL="285750" indent="-285750">
+              <a:lnSpc>
+                <a:spcPct val="150000"/>
+              </a:lnSpc>
+              <a:buFont typeface="Arial" panose="020B0604020202020204" pitchFamily="34" charset="0"/>
+              <a:buChar char="•"/>
+            </a:pPr>
+            <a:r>
+              <a:rPr lang="pl-PL" dirty="0"/>
+              <a:t>Konieczny dostęp do </a:t>
+            </a:r>
+            <a:r>
+              <a:rPr lang="pl-PL" dirty="0" err="1"/>
+              <a:t>internetu</a:t>
+            </a:r>
+            <a:r>
+              <a:rPr lang="pl-PL" dirty="0"/>
+              <a:t> podczas korzystania ze wszystkich funkcji aplikacji</a:t>
+            </a:r>
+          </a:p>
+          <a:p>
+            <a:pPr marL="285750" indent="-285750">
+              <a:buFont typeface="Arial" panose="020B0604020202020204" pitchFamily="34" charset="0"/>
+              <a:buChar char="•"/>
+            </a:pPr>
+            <a:endParaRPr lang="pl-PL" dirty="0"/>
+          </a:p>
+        </p:txBody>
+      </p:sp>
+      <p:sp>
+        <p:nvSpPr>
+          <p:cNvPr id="4" name="Symbol zastępczy tekstu 3">
+            <a:extLst>
+              <a:ext uri="{FF2B5EF4-FFF2-40B4-BE49-F238E27FC236}">
+                <a16:creationId xmlns:a16="http://schemas.microsoft.com/office/drawing/2014/main" id="{8B8FD94F-A593-0EB4-BD3B-A0D5515E1249}"/>
               </a:ext>
             </a:extLst>
           </p:cNvPr>
@@ -24977,24 +25205,19 @@
         </p:nvSpPr>
         <p:spPr/>
         <p:txBody>
-          <a:bodyPr rtlCol="0"/>
-          <a:lstStyle>
-            <a:defPPr>
-              <a:defRPr lang="pl-PL"/>
-            </a:defPPr>
-          </a:lstStyle>
-          <a:p>
-            <a:pPr rtl="0"/>
+          <a:bodyPr/>
+          <a:lstStyle/>
+          <a:p>
             <a:endParaRPr lang="pl-PL"/>
           </a:p>
         </p:txBody>
       </p:sp>
       <p:sp>
         <p:nvSpPr>
-          <p:cNvPr id="42" name="Numer slajdu — symbol zastępczy 41">
-            <a:extLst>
-              <a:ext uri="{FF2B5EF4-FFF2-40B4-BE49-F238E27FC236}">
-                <a16:creationId xmlns:a16="http://schemas.microsoft.com/office/drawing/2014/main" id="{019C8FDA-6404-F188-D702-F6E466BD3C80}"/>
+          <p:cNvPr id="5" name="Symbol zastępczy numeru slajdu 4">
+            <a:extLst>
+              <a:ext uri="{FF2B5EF4-FFF2-40B4-BE49-F238E27FC236}">
+                <a16:creationId xmlns:a16="http://schemas.microsoft.com/office/drawing/2014/main" id="{320974EC-246D-2D96-1053-5F42228C5EF2}"/>
               </a:ext>
             </a:extLst>
           </p:cNvPr>
@@ -25002,509 +25225,28 @@
             <a:spLocks noGrp="1"/>
           </p:cNvSpPr>
           <p:nvPr>
-            <p:ph type="sldNum" sz="quarter" idx="28"/>
+            <p:ph type="sldNum" sz="quarter" idx="15"/>
           </p:nvPr>
         </p:nvSpPr>
         <p:spPr/>
         <p:txBody>
-          <a:bodyPr rtlCol="0"/>
-          <a:lstStyle>
-            <a:defPPr>
-              <a:defRPr lang="pl-PL"/>
-            </a:defPPr>
-          </a:lstStyle>
+          <a:bodyPr/>
+          <a:lstStyle/>
           <a:p>
             <a:pPr rtl="0"/>
-            <a:r>
-              <a:rPr lang="pl-PL" dirty="0"/>
-              <a:t>8</a:t>
-            </a:r>
-          </a:p>
-        </p:txBody>
-      </p:sp>
-      <p:sp>
-        <p:nvSpPr>
-          <p:cNvPr id="46" name="Tekst — symbol zastępczy 45">
-            <a:extLst>
-              <a:ext uri="{FF2B5EF4-FFF2-40B4-BE49-F238E27FC236}">
-                <a16:creationId xmlns:a16="http://schemas.microsoft.com/office/drawing/2014/main" id="{75FAFF48-ECD7-B806-073D-92FF0C921A04}"/>
-              </a:ext>
-              <a:ext uri="{C183D7F6-B498-43B3-948B-1728B52AA6E4}">
-                <adec:decorative xmlns:adec="http://schemas.microsoft.com/office/drawing/2017/decorative" val="1"/>
-              </a:ext>
-            </a:extLst>
-          </p:cNvPr>
-          <p:cNvSpPr>
-            <a:spLocks noGrp="1"/>
-          </p:cNvSpPr>
-          <p:nvPr>
-            <p:ph type="body" sz="quarter" idx="23"/>
-          </p:nvPr>
-        </p:nvSpPr>
-        <p:spPr/>
-        <p:txBody>
-          <a:bodyPr rtlCol="0"/>
-          <a:lstStyle>
-            <a:defPPr>
-              <a:defRPr lang="pl-PL"/>
-            </a:defPPr>
-          </a:lstStyle>
-          <a:p>
-            <a:pPr rtl="0"/>
-            <a:endParaRPr lang="pl-PL"/>
-          </a:p>
-        </p:txBody>
-      </p:sp>
-      <p:sp>
-        <p:nvSpPr>
-          <p:cNvPr id="47" name="Tekst — symbol zastępczy 46">
-            <a:extLst>
-              <a:ext uri="{FF2B5EF4-FFF2-40B4-BE49-F238E27FC236}">
-                <a16:creationId xmlns:a16="http://schemas.microsoft.com/office/drawing/2014/main" id="{3F91A9F2-2D44-0F31-0AD2-6603CE85725B}"/>
-              </a:ext>
-              <a:ext uri="{C183D7F6-B498-43B3-948B-1728B52AA6E4}">
-                <adec:decorative xmlns:adec="http://schemas.microsoft.com/office/drawing/2017/decorative" val="1"/>
-              </a:ext>
-            </a:extLst>
-          </p:cNvPr>
-          <p:cNvSpPr>
-            <a:spLocks noGrp="1"/>
-          </p:cNvSpPr>
-          <p:nvPr>
-            <p:ph type="body" sz="quarter" idx="24"/>
-          </p:nvPr>
-        </p:nvSpPr>
-        <p:spPr/>
-        <p:txBody>
-          <a:bodyPr rtlCol="0"/>
-          <a:lstStyle>
-            <a:defPPr>
-              <a:defRPr lang="pl-PL"/>
-            </a:defPPr>
-          </a:lstStyle>
-          <a:p>
-            <a:pPr rtl="0"/>
-            <a:endParaRPr lang="pl-PL"/>
-          </a:p>
-        </p:txBody>
-      </p:sp>
-      <p:sp>
-        <p:nvSpPr>
-          <p:cNvPr id="48" name="Tekst — symbol zastępczy 47">
-            <a:extLst>
-              <a:ext uri="{FF2B5EF4-FFF2-40B4-BE49-F238E27FC236}">
-                <a16:creationId xmlns:a16="http://schemas.microsoft.com/office/drawing/2014/main" id="{A3E1C905-1F78-C80C-C9A7-A645D9B8A89D}"/>
-              </a:ext>
-              <a:ext uri="{C183D7F6-B498-43B3-948B-1728B52AA6E4}">
-                <adec:decorative xmlns:adec="http://schemas.microsoft.com/office/drawing/2017/decorative" val="1"/>
-              </a:ext>
-            </a:extLst>
-          </p:cNvPr>
-          <p:cNvSpPr>
-            <a:spLocks noGrp="1"/>
-          </p:cNvSpPr>
-          <p:nvPr>
-            <p:ph type="body" sz="quarter" idx="25"/>
-          </p:nvPr>
-        </p:nvSpPr>
-        <p:spPr/>
-        <p:txBody>
-          <a:bodyPr rtlCol="0"/>
-          <a:lstStyle>
-            <a:defPPr>
-              <a:defRPr lang="pl-PL"/>
-            </a:defPPr>
-          </a:lstStyle>
-          <a:p>
-            <a:pPr rtl="0"/>
-            <a:endParaRPr lang="pl-PL"/>
-          </a:p>
-        </p:txBody>
-      </p:sp>
-      <p:sp>
-        <p:nvSpPr>
-          <p:cNvPr id="49" name="Tekst — symbol zastępczy 48">
-            <a:extLst>
-              <a:ext uri="{FF2B5EF4-FFF2-40B4-BE49-F238E27FC236}">
-                <a16:creationId xmlns:a16="http://schemas.microsoft.com/office/drawing/2014/main" id="{8CA99796-00AA-C484-557A-B978DA4DDDCC}"/>
-              </a:ext>
-              <a:ext uri="{C183D7F6-B498-43B3-948B-1728B52AA6E4}">
-                <adec:decorative xmlns:adec="http://schemas.microsoft.com/office/drawing/2017/decorative" val="1"/>
-              </a:ext>
-            </a:extLst>
-          </p:cNvPr>
-          <p:cNvSpPr>
-            <a:spLocks noGrp="1"/>
-          </p:cNvSpPr>
-          <p:nvPr>
-            <p:ph type="body" sz="quarter" idx="26"/>
-          </p:nvPr>
-        </p:nvSpPr>
-        <p:spPr/>
-        <p:txBody>
-          <a:bodyPr rtlCol="0"/>
-          <a:lstStyle>
-            <a:defPPr>
-              <a:defRPr lang="pl-PL"/>
-            </a:defPPr>
-          </a:lstStyle>
-          <a:p>
-            <a:pPr rtl="0"/>
-            <a:endParaRPr lang="pl-PL"/>
-          </a:p>
-        </p:txBody>
-      </p:sp>
-      <p:sp>
-        <p:nvSpPr>
-          <p:cNvPr id="8" name="Tekst — symbol zastępczy 7">
-            <a:extLst>
-              <a:ext uri="{FF2B5EF4-FFF2-40B4-BE49-F238E27FC236}">
-                <a16:creationId xmlns:a16="http://schemas.microsoft.com/office/drawing/2014/main" id="{E080D02F-F3D4-FF0B-2D0E-64F8B50DCAA6}"/>
-              </a:ext>
-            </a:extLst>
-          </p:cNvPr>
-          <p:cNvSpPr>
-            <a:spLocks noGrp="1"/>
-          </p:cNvSpPr>
-          <p:nvPr>
-            <p:ph type="body" sz="quarter" idx="15"/>
-          </p:nvPr>
-        </p:nvSpPr>
-        <p:spPr/>
-        <p:txBody>
-          <a:bodyPr rtlCol="0"/>
-          <a:lstStyle>
-            <a:defPPr>
-              <a:defRPr lang="pl-PL"/>
-            </a:defPPr>
-          </a:lstStyle>
-          <a:p>
-            <a:pPr rtl="0"/>
-            <a:r>
-              <a:rPr lang="pl-PL" dirty="0" err="1"/>
-              <a:t>Gru</a:t>
-            </a:r>
-            <a:endParaRPr lang="pl-PL" dirty="0"/>
-          </a:p>
-        </p:txBody>
-      </p:sp>
-      <p:sp>
-        <p:nvSpPr>
-          <p:cNvPr id="4" name="Tekst — symbol zastępczy 3">
-            <a:extLst>
-              <a:ext uri="{FF2B5EF4-FFF2-40B4-BE49-F238E27FC236}">
-                <a16:creationId xmlns:a16="http://schemas.microsoft.com/office/drawing/2014/main" id="{4AEDC641-DB48-7215-91E0-5C72AED4E060}"/>
-              </a:ext>
-            </a:extLst>
-          </p:cNvPr>
-          <p:cNvSpPr>
-            <a:spLocks noGrp="1"/>
-          </p:cNvSpPr>
-          <p:nvPr>
-            <p:ph type="body" idx="1"/>
-          </p:nvPr>
-        </p:nvSpPr>
-        <p:spPr/>
-        <p:txBody>
-          <a:bodyPr rtlCol="0"/>
-          <a:lstStyle>
-            <a:defPPr>
-              <a:defRPr lang="pl-PL"/>
-            </a:defPPr>
-          </a:lstStyle>
-          <a:p>
-            <a:pPr rtl="0"/>
-            <a:r>
-              <a:rPr lang="pl-PL" dirty="0"/>
-              <a:t>Planowanie projektu z zespołem informatyków</a:t>
-            </a:r>
-          </a:p>
-        </p:txBody>
-      </p:sp>
-      <p:sp>
-        <p:nvSpPr>
-          <p:cNvPr id="9" name="Tekst — symbol zastępczy 8">
-            <a:extLst>
-              <a:ext uri="{FF2B5EF4-FFF2-40B4-BE49-F238E27FC236}">
-                <a16:creationId xmlns:a16="http://schemas.microsoft.com/office/drawing/2014/main" id="{345C6D13-CF93-C1B2-1F70-67C4F6E71841}"/>
-              </a:ext>
-            </a:extLst>
-          </p:cNvPr>
-          <p:cNvSpPr>
-            <a:spLocks noGrp="1"/>
-          </p:cNvSpPr>
-          <p:nvPr>
-            <p:ph type="body" sz="quarter" idx="16"/>
-          </p:nvPr>
-        </p:nvSpPr>
-        <p:spPr/>
-        <p:txBody>
-          <a:bodyPr rtlCol="0"/>
-          <a:lstStyle>
-            <a:defPPr>
-              <a:defRPr lang="pl-PL"/>
-            </a:defPPr>
-          </a:lstStyle>
-          <a:p>
-            <a:pPr rtl="0"/>
-            <a:r>
-              <a:rPr lang="pl-PL" dirty="0"/>
-              <a:t>Sty</a:t>
-            </a:r>
-          </a:p>
-        </p:txBody>
-      </p:sp>
-      <p:sp>
-        <p:nvSpPr>
-          <p:cNvPr id="5" name="Tekst — symbol zastępczy 4">
-            <a:extLst>
-              <a:ext uri="{FF2B5EF4-FFF2-40B4-BE49-F238E27FC236}">
-                <a16:creationId xmlns:a16="http://schemas.microsoft.com/office/drawing/2014/main" id="{0F83D82D-5102-8004-C3B7-FEE3A62802E1}"/>
-              </a:ext>
-            </a:extLst>
-          </p:cNvPr>
-          <p:cNvSpPr>
-            <a:spLocks noGrp="1"/>
-          </p:cNvSpPr>
-          <p:nvPr>
-            <p:ph type="body" sz="quarter" idx="3"/>
-          </p:nvPr>
-        </p:nvSpPr>
-        <p:spPr/>
-        <p:txBody>
-          <a:bodyPr rtlCol="0"/>
-          <a:lstStyle>
-            <a:defPPr>
-              <a:defRPr lang="pl-PL"/>
-            </a:defPPr>
-          </a:lstStyle>
-          <a:p>
-            <a:pPr rtl="0"/>
-            <a:r>
-              <a:rPr lang="pl-PL" dirty="0"/>
-              <a:t>Strategia marketingowa na następne 2 lata</a:t>
-            </a:r>
-          </a:p>
-        </p:txBody>
-      </p:sp>
-      <p:sp>
-        <p:nvSpPr>
-          <p:cNvPr id="10" name="Tekst — symbol zastępczy 9">
-            <a:extLst>
-              <a:ext uri="{FF2B5EF4-FFF2-40B4-BE49-F238E27FC236}">
-                <a16:creationId xmlns:a16="http://schemas.microsoft.com/office/drawing/2014/main" id="{1C9A283B-9E49-B36A-FE51-8E72C9F394EB}"/>
-              </a:ext>
-            </a:extLst>
-          </p:cNvPr>
-          <p:cNvSpPr>
-            <a:spLocks noGrp="1"/>
-          </p:cNvSpPr>
-          <p:nvPr>
-            <p:ph type="body" sz="quarter" idx="17"/>
-          </p:nvPr>
-        </p:nvSpPr>
-        <p:spPr/>
-        <p:txBody>
-          <a:bodyPr rtlCol="0"/>
-          <a:lstStyle>
-            <a:defPPr>
-              <a:defRPr lang="pl-PL"/>
-            </a:defPPr>
-          </a:lstStyle>
-          <a:p>
-            <a:pPr rtl="0"/>
-            <a:r>
-              <a:rPr lang="pl-PL" dirty="0"/>
-              <a:t>Mar</a:t>
-            </a:r>
-          </a:p>
-        </p:txBody>
-      </p:sp>
-      <p:sp>
-        <p:nvSpPr>
-          <p:cNvPr id="13" name="Tekst — symbol zastępczy 12">
-            <a:extLst>
-              <a:ext uri="{FF2B5EF4-FFF2-40B4-BE49-F238E27FC236}">
-                <a16:creationId xmlns:a16="http://schemas.microsoft.com/office/drawing/2014/main" id="{C2055FE9-29DC-BC97-64D3-F9745578B47E}"/>
-              </a:ext>
-            </a:extLst>
-          </p:cNvPr>
-          <p:cNvSpPr>
-            <a:spLocks noGrp="1"/>
-          </p:cNvSpPr>
-          <p:nvPr>
-            <p:ph type="body" sz="quarter" idx="20"/>
-          </p:nvPr>
-        </p:nvSpPr>
-        <p:spPr/>
-        <p:txBody>
-          <a:bodyPr rtlCol="0"/>
-          <a:lstStyle>
-            <a:defPPr>
-              <a:defRPr lang="pl-PL"/>
-            </a:defPPr>
-          </a:lstStyle>
-          <a:p>
-            <a:pPr rtl="0"/>
-            <a:r>
-              <a:rPr lang="pl-PL" dirty="0"/>
-              <a:t>Widoczne postępy w kodzie</a:t>
-            </a:r>
-          </a:p>
-          <a:p>
-            <a:pPr rtl="0"/>
-            <a:endParaRPr lang="pl-PL" dirty="0"/>
-          </a:p>
-        </p:txBody>
-      </p:sp>
-      <p:sp>
-        <p:nvSpPr>
-          <p:cNvPr id="11" name="Tekst — symbol zastępczy 10">
-            <a:extLst>
-              <a:ext uri="{FF2B5EF4-FFF2-40B4-BE49-F238E27FC236}">
-                <a16:creationId xmlns:a16="http://schemas.microsoft.com/office/drawing/2014/main" id="{6450CD75-C694-C125-BD13-EF17DEB46B25}"/>
-              </a:ext>
-            </a:extLst>
-          </p:cNvPr>
-          <p:cNvSpPr>
-            <a:spLocks noGrp="1"/>
-          </p:cNvSpPr>
-          <p:nvPr>
-            <p:ph type="body" sz="quarter" idx="18"/>
-          </p:nvPr>
-        </p:nvSpPr>
-        <p:spPr/>
-        <p:txBody>
-          <a:bodyPr rtlCol="0"/>
-          <a:lstStyle>
-            <a:defPPr>
-              <a:defRPr lang="pl-PL"/>
-            </a:defPPr>
-          </a:lstStyle>
-          <a:p>
-            <a:pPr rtl="0"/>
-            <a:r>
-              <a:rPr lang="pl-PL" dirty="0"/>
-              <a:t>Maj</a:t>
-            </a:r>
-          </a:p>
-        </p:txBody>
-      </p:sp>
-      <p:sp>
-        <p:nvSpPr>
-          <p:cNvPr id="14" name="Tekst — symbol zastępczy 13">
-            <a:extLst>
-              <a:ext uri="{FF2B5EF4-FFF2-40B4-BE49-F238E27FC236}">
-                <a16:creationId xmlns:a16="http://schemas.microsoft.com/office/drawing/2014/main" id="{36278598-FCCB-FFAE-8D0C-C6E865B7A96B}"/>
-              </a:ext>
-            </a:extLst>
-          </p:cNvPr>
-          <p:cNvSpPr>
-            <a:spLocks noGrp="1"/>
-          </p:cNvSpPr>
-          <p:nvPr>
-            <p:ph type="body" sz="quarter" idx="21"/>
-          </p:nvPr>
-        </p:nvSpPr>
-        <p:spPr/>
-        <p:txBody>
-          <a:bodyPr rtlCol="0"/>
-          <a:lstStyle>
-            <a:defPPr>
-              <a:defRPr lang="pl-PL"/>
-            </a:defPPr>
-          </a:lstStyle>
-          <a:p>
-            <a:r>
-              <a:rPr lang="pl-PL" dirty="0"/>
-              <a:t>Gotowa aplikacja „Sports </a:t>
-            </a:r>
-            <a:r>
-              <a:rPr lang="pl-PL" dirty="0" err="1"/>
-              <a:t>Joiner</a:t>
-            </a:r>
-            <a:r>
-              <a:rPr lang="pl-PL" dirty="0"/>
-              <a:t>” wraz ze startem kampanii marketingowej</a:t>
-            </a:r>
-          </a:p>
-          <a:p>
-            <a:pPr rtl="0"/>
-            <a:endParaRPr lang="pl-PL" dirty="0"/>
-          </a:p>
-        </p:txBody>
-      </p:sp>
-      <p:sp>
-        <p:nvSpPr>
-          <p:cNvPr id="12" name="Tekst — symbol zastępczy 11">
-            <a:extLst>
-              <a:ext uri="{FF2B5EF4-FFF2-40B4-BE49-F238E27FC236}">
-                <a16:creationId xmlns:a16="http://schemas.microsoft.com/office/drawing/2014/main" id="{3F9092E2-3437-76F7-8811-79E2775979C6}"/>
-              </a:ext>
-            </a:extLst>
-          </p:cNvPr>
-          <p:cNvSpPr>
-            <a:spLocks noGrp="1"/>
-          </p:cNvSpPr>
-          <p:nvPr>
-            <p:ph type="body" sz="quarter" idx="19"/>
-          </p:nvPr>
-        </p:nvSpPr>
-        <p:spPr/>
-        <p:txBody>
-          <a:bodyPr rtlCol="0"/>
-          <a:lstStyle>
-            <a:defPPr>
-              <a:defRPr lang="pl-PL"/>
-            </a:defPPr>
-          </a:lstStyle>
-          <a:p>
-            <a:pPr rtl="0"/>
-            <a:r>
-              <a:rPr lang="pl-PL" dirty="0" err="1"/>
-              <a:t>Cze</a:t>
-            </a:r>
-            <a:endParaRPr lang="pl-PL" dirty="0"/>
-          </a:p>
-        </p:txBody>
-      </p:sp>
-      <p:sp>
-        <p:nvSpPr>
-          <p:cNvPr id="15" name="Tekst — symbol zastępczy 14">
-            <a:extLst>
-              <a:ext uri="{FF2B5EF4-FFF2-40B4-BE49-F238E27FC236}">
-                <a16:creationId xmlns:a16="http://schemas.microsoft.com/office/drawing/2014/main" id="{C74894D9-3816-D634-32FA-4C32368D5317}"/>
-              </a:ext>
-            </a:extLst>
-          </p:cNvPr>
-          <p:cNvSpPr>
-            <a:spLocks noGrp="1"/>
-          </p:cNvSpPr>
-          <p:nvPr>
-            <p:ph type="body" sz="quarter" idx="22"/>
-          </p:nvPr>
-        </p:nvSpPr>
-        <p:spPr/>
-        <p:txBody>
-          <a:bodyPr rIns="0" rtlCol="0"/>
-          <a:lstStyle>
-            <a:defPPr>
-              <a:defRPr lang="pl-PL"/>
-            </a:defPPr>
-          </a:lstStyle>
-          <a:p>
-            <a:pPr rtl="0"/>
-            <a:r>
-              <a:rPr lang="pl-PL" dirty="0"/>
-              <a:t>Wdrażanie projektu w życie</a:t>
-            </a:r>
+            <a:fld id="{CC43B8D3-9A08-F84C-9DD4-44948BA52D4B}" type="slidenum">
+              <a:rPr lang="pl-PL" noProof="0" smtClean="0"/>
+              <a:pPr rtl="0"/>
+              <a:t>7</a:t>
+            </a:fld>
+            <a:endParaRPr lang="pl-PL" noProof="0"/>
           </a:p>
         </p:txBody>
       </p:sp>
     </p:spTree>
     <p:extLst>
       <p:ext uri="{BB962C8B-B14F-4D97-AF65-F5344CB8AC3E}">
-        <p14:creationId xmlns:p14="http://schemas.microsoft.com/office/powerpoint/2010/main" val="1030146655"/>
+        <p14:creationId xmlns:p14="http://schemas.microsoft.com/office/powerpoint/2010/main" val="3162972259"/>
       </p:ext>
     </p:extLst>
   </p:cSld>
@@ -25533,10 +25275,176 @@
       </p:grpSpPr>
       <p:sp>
         <p:nvSpPr>
-          <p:cNvPr id="2" name="Tytuł 1">
-            <a:extLst>
-              <a:ext uri="{FF2B5EF4-FFF2-40B4-BE49-F238E27FC236}">
-                <a16:creationId xmlns:a16="http://schemas.microsoft.com/office/drawing/2014/main" id="{BE70DD43-5D3B-588D-38B0-6B4556796A53}"/>
+          <p:cNvPr id="24" name="Symbol zastępczy tekstu 23">
+            <a:extLst>
+              <a:ext uri="{FF2B5EF4-FFF2-40B4-BE49-F238E27FC236}">
+                <a16:creationId xmlns:a16="http://schemas.microsoft.com/office/drawing/2014/main" id="{299B3567-CB7B-8C50-4577-EED77BDFA076}"/>
+              </a:ext>
+            </a:extLst>
+          </p:cNvPr>
+          <p:cNvSpPr>
+            <a:spLocks noGrp="1"/>
+          </p:cNvSpPr>
+          <p:nvPr>
+            <p:ph type="body" sz="quarter" idx="23"/>
+          </p:nvPr>
+        </p:nvSpPr>
+        <p:spPr/>
+        <p:txBody>
+          <a:bodyPr/>
+          <a:lstStyle/>
+          <a:p>
+            <a:endParaRPr lang="pl-PL"/>
+          </a:p>
+        </p:txBody>
+      </p:sp>
+      <p:sp>
+        <p:nvSpPr>
+          <p:cNvPr id="25" name="Symbol zastępczy tekstu 24">
+            <a:extLst>
+              <a:ext uri="{FF2B5EF4-FFF2-40B4-BE49-F238E27FC236}">
+                <a16:creationId xmlns:a16="http://schemas.microsoft.com/office/drawing/2014/main" id="{8CC9B934-49FB-9F38-C3C5-ABC92B13FE59}"/>
+              </a:ext>
+            </a:extLst>
+          </p:cNvPr>
+          <p:cNvSpPr>
+            <a:spLocks noGrp="1"/>
+          </p:cNvSpPr>
+          <p:nvPr>
+            <p:ph type="body" sz="quarter" idx="24"/>
+          </p:nvPr>
+        </p:nvSpPr>
+        <p:spPr/>
+        <p:txBody>
+          <a:bodyPr/>
+          <a:lstStyle/>
+          <a:p>
+            <a:endParaRPr lang="pl-PL"/>
+          </a:p>
+        </p:txBody>
+      </p:sp>
+      <p:sp>
+        <p:nvSpPr>
+          <p:cNvPr id="26" name="Symbol zastępczy tekstu 25">
+            <a:extLst>
+              <a:ext uri="{FF2B5EF4-FFF2-40B4-BE49-F238E27FC236}">
+                <a16:creationId xmlns:a16="http://schemas.microsoft.com/office/drawing/2014/main" id="{AB90F681-2CEF-6A69-AF9B-CB31B5FFC304}"/>
+              </a:ext>
+            </a:extLst>
+          </p:cNvPr>
+          <p:cNvSpPr>
+            <a:spLocks noGrp="1"/>
+          </p:cNvSpPr>
+          <p:nvPr>
+            <p:ph type="body" sz="quarter" idx="25"/>
+          </p:nvPr>
+        </p:nvSpPr>
+        <p:spPr/>
+        <p:txBody>
+          <a:bodyPr/>
+          <a:lstStyle/>
+          <a:p>
+            <a:endParaRPr lang="pl-PL"/>
+          </a:p>
+        </p:txBody>
+      </p:sp>
+      <p:sp>
+        <p:nvSpPr>
+          <p:cNvPr id="27" name="Symbol zastępczy tekstu 26">
+            <a:extLst>
+              <a:ext uri="{FF2B5EF4-FFF2-40B4-BE49-F238E27FC236}">
+                <a16:creationId xmlns:a16="http://schemas.microsoft.com/office/drawing/2014/main" id="{BF2F528F-9E20-8A46-788E-DA4D4C438ADA}"/>
+              </a:ext>
+            </a:extLst>
+          </p:cNvPr>
+          <p:cNvSpPr>
+            <a:spLocks noGrp="1"/>
+          </p:cNvSpPr>
+          <p:nvPr>
+            <p:ph type="body" sz="quarter" idx="26"/>
+          </p:nvPr>
+        </p:nvSpPr>
+        <p:spPr/>
+        <p:txBody>
+          <a:bodyPr/>
+          <a:lstStyle/>
+          <a:p>
+            <a:endParaRPr lang="pl-PL"/>
+          </a:p>
+        </p:txBody>
+      </p:sp>
+      <p:sp>
+        <p:nvSpPr>
+          <p:cNvPr id="10" name="Symbol zastępczy tekstu 9">
+            <a:extLst>
+              <a:ext uri="{FF2B5EF4-FFF2-40B4-BE49-F238E27FC236}">
+                <a16:creationId xmlns:a16="http://schemas.microsoft.com/office/drawing/2014/main" id="{26442601-97B9-A954-2408-717FA0F304B0}"/>
+              </a:ext>
+            </a:extLst>
+          </p:cNvPr>
+          <p:cNvSpPr>
+            <a:spLocks noGrp="1"/>
+          </p:cNvSpPr>
+          <p:nvPr>
+            <p:ph type="body" idx="1"/>
+          </p:nvPr>
+        </p:nvSpPr>
+        <p:spPr>
+          <a:xfrm>
+            <a:off x="630936" y="4041648"/>
+            <a:ext cx="1822704" cy="2180476"/>
+          </a:xfrm>
+        </p:spPr>
+        <p:txBody>
+          <a:bodyPr/>
+          <a:lstStyle/>
+          <a:p>
+            <a:r>
+              <a:rPr lang="pl-PL" dirty="0"/>
+              <a:t>Pierwsze kilka tygodni należy poświęcić na szczegółowe omówienie struktury aplikacji z całym zespołem programistów.</a:t>
+            </a:r>
+          </a:p>
+        </p:txBody>
+      </p:sp>
+      <p:sp>
+        <p:nvSpPr>
+          <p:cNvPr id="11" name="Symbol zastępczy tekstu 10">
+            <a:extLst>
+              <a:ext uri="{FF2B5EF4-FFF2-40B4-BE49-F238E27FC236}">
+                <a16:creationId xmlns:a16="http://schemas.microsoft.com/office/drawing/2014/main" id="{37F5A1F3-EB3E-AD21-AA90-CF3DBF9136D7}"/>
+              </a:ext>
+            </a:extLst>
+          </p:cNvPr>
+          <p:cNvSpPr>
+            <a:spLocks noGrp="1"/>
+          </p:cNvSpPr>
+          <p:nvPr>
+            <p:ph type="body" sz="quarter" idx="3"/>
+          </p:nvPr>
+        </p:nvSpPr>
+        <p:spPr>
+          <a:xfrm>
+            <a:off x="3054096" y="4041647"/>
+            <a:ext cx="1822704" cy="2180475"/>
+          </a:xfrm>
+        </p:spPr>
+        <p:txBody>
+          <a:bodyPr/>
+          <a:lstStyle/>
+          <a:p>
+            <a:r>
+              <a:rPr lang="pl-PL" dirty="0"/>
+              <a:t>Jest to najdłuższy z okresów przygotowania. Kilka miesięcy jest potrzebne na wytworzenie aplikacji zdatnej do użytku.</a:t>
+            </a:r>
+          </a:p>
+        </p:txBody>
+      </p:sp>
+      <p:sp>
+        <p:nvSpPr>
+          <p:cNvPr id="9" name="Tytuł 8">
+            <a:extLst>
+              <a:ext uri="{FF2B5EF4-FFF2-40B4-BE49-F238E27FC236}">
+                <a16:creationId xmlns:a16="http://schemas.microsoft.com/office/drawing/2014/main" id="{31788C71-7A7A-84B3-C2CC-89F2CF7AACA5}"/>
               </a:ext>
             </a:extLst>
           </p:cNvPr>
@@ -25554,17 +25462,17 @@
           <a:p>
             <a:r>
               <a:rPr lang="pl-PL" dirty="0"/>
-              <a:t>Problemy i ograniczenia</a:t>
+              <a:t>Oś czasu projektu</a:t>
             </a:r>
           </a:p>
         </p:txBody>
       </p:sp>
       <p:sp>
         <p:nvSpPr>
-          <p:cNvPr id="3" name="Symbol zastępczy zawartości 2">
-            <a:extLst>
-              <a:ext uri="{FF2B5EF4-FFF2-40B4-BE49-F238E27FC236}">
-                <a16:creationId xmlns:a16="http://schemas.microsoft.com/office/drawing/2014/main" id="{FBEDC8E8-AC73-2074-202D-222CF5907068}"/>
+          <p:cNvPr id="14" name="Symbol zastępczy tekstu 13">
+            <a:extLst>
+              <a:ext uri="{FF2B5EF4-FFF2-40B4-BE49-F238E27FC236}">
+                <a16:creationId xmlns:a16="http://schemas.microsoft.com/office/drawing/2014/main" id="{C46428CF-C6BF-B5C4-4834-FFF66AD52D79}"/>
               </a:ext>
             </a:extLst>
           </p:cNvPr>
@@ -25572,88 +25480,263 @@
             <a:spLocks noGrp="1"/>
           </p:cNvSpPr>
           <p:nvPr>
-            <p:ph idx="1"/>
+            <p:ph type="body" sz="quarter" idx="15"/>
           </p:nvPr>
         </p:nvSpPr>
-        <p:spPr/>
+        <p:spPr>
+          <a:xfrm>
+            <a:off x="722375" y="2706624"/>
+            <a:ext cx="1432245" cy="1014984"/>
+          </a:xfrm>
+        </p:spPr>
         <p:txBody>
           <a:bodyPr/>
           <a:lstStyle/>
           <a:p>
-            <a:pPr marL="285750" indent="-285750">
-              <a:lnSpc>
-                <a:spcPct val="150000"/>
-              </a:lnSpc>
-              <a:buFont typeface="Arial" panose="020B0604020202020204" pitchFamily="34" charset="0"/>
-              <a:buChar char="•"/>
-            </a:pPr>
             <a:r>
               <a:rPr lang="pl-PL" dirty="0"/>
-              <a:t>Aplikacja nie bierze pod uwagę osób korzystających z boisk na co dzień</a:t>
+              <a:t>12.2024</a:t>
             </a:r>
           </a:p>
-          <a:p>
-            <a:pPr marL="285750" indent="-285750">
-              <a:lnSpc>
-                <a:spcPct val="150000"/>
-              </a:lnSpc>
-              <a:buFont typeface="Arial" panose="020B0604020202020204" pitchFamily="34" charset="0"/>
-              <a:buChar char="•"/>
-            </a:pPr>
+        </p:txBody>
+      </p:sp>
+      <p:sp>
+        <p:nvSpPr>
+          <p:cNvPr id="16" name="Symbol zastępczy tekstu 15">
+            <a:extLst>
+              <a:ext uri="{FF2B5EF4-FFF2-40B4-BE49-F238E27FC236}">
+                <a16:creationId xmlns:a16="http://schemas.microsoft.com/office/drawing/2014/main" id="{6A7B8C2F-C309-86E4-DFC0-18B8F1009280}"/>
+              </a:ext>
+            </a:extLst>
+          </p:cNvPr>
+          <p:cNvSpPr>
+            <a:spLocks noGrp="1"/>
+          </p:cNvSpPr>
+          <p:nvPr>
+            <p:ph type="body" sz="quarter" idx="16"/>
+          </p:nvPr>
+        </p:nvSpPr>
+        <p:spPr>
+          <a:xfrm>
+            <a:off x="3163824" y="2706624"/>
+            <a:ext cx="1432244" cy="1014984"/>
+          </a:xfrm>
+        </p:spPr>
+        <p:txBody>
+          <a:bodyPr/>
+          <a:lstStyle/>
+          <a:p>
             <a:r>
               <a:rPr lang="pl-PL" dirty="0"/>
-              <a:t>Brak systemu na obsługę zwrotów rezerwacji</a:t>
+              <a:t>01.2024</a:t>
             </a:r>
           </a:p>
-          <a:p>
-            <a:pPr marL="285750" indent="-285750">
-              <a:lnSpc>
-                <a:spcPct val="150000"/>
-              </a:lnSpc>
-              <a:buFont typeface="Arial" panose="020B0604020202020204" pitchFamily="34" charset="0"/>
-              <a:buChar char="•"/>
-            </a:pPr>
+        </p:txBody>
+      </p:sp>
+      <p:sp>
+        <p:nvSpPr>
+          <p:cNvPr id="18" name="Symbol zastępczy tekstu 17">
+            <a:extLst>
+              <a:ext uri="{FF2B5EF4-FFF2-40B4-BE49-F238E27FC236}">
+                <a16:creationId xmlns:a16="http://schemas.microsoft.com/office/drawing/2014/main" id="{C497ED4D-34D8-0476-836C-ACE125B279F9}"/>
+              </a:ext>
+            </a:extLst>
+          </p:cNvPr>
+          <p:cNvSpPr>
+            <a:spLocks noGrp="1"/>
+          </p:cNvSpPr>
+          <p:nvPr>
+            <p:ph type="body" sz="quarter" idx="17"/>
+          </p:nvPr>
+        </p:nvSpPr>
+        <p:spPr>
+          <a:xfrm>
+            <a:off x="5596128" y="2706624"/>
+            <a:ext cx="1432244" cy="1014984"/>
+          </a:xfrm>
+        </p:spPr>
+        <p:txBody>
+          <a:bodyPr/>
+          <a:lstStyle/>
+          <a:p>
             <a:r>
               <a:rPr lang="pl-PL" dirty="0"/>
-              <a:t>Ilość obiektów sportowych jest ograniczona, a także nie w każdym mieście występują boiska do wszystkich dostępnych sportów</a:t>
+              <a:t>05.2024</a:t>
             </a:r>
           </a:p>
-          <a:p>
-            <a:pPr marL="285750" indent="-285750">
-              <a:lnSpc>
-                <a:spcPct val="150000"/>
-              </a:lnSpc>
-              <a:buFont typeface="Arial" panose="020B0604020202020204" pitchFamily="34" charset="0"/>
-              <a:buChar char="•"/>
-            </a:pPr>
+        </p:txBody>
+      </p:sp>
+      <p:sp>
+        <p:nvSpPr>
+          <p:cNvPr id="19" name="Symbol zastępczy tekstu 18">
+            <a:extLst>
+              <a:ext uri="{FF2B5EF4-FFF2-40B4-BE49-F238E27FC236}">
+                <a16:creationId xmlns:a16="http://schemas.microsoft.com/office/drawing/2014/main" id="{8411AF74-3909-94D6-E6AD-43AC52EE4A78}"/>
+              </a:ext>
+            </a:extLst>
+          </p:cNvPr>
+          <p:cNvSpPr>
+            <a:spLocks noGrp="1"/>
+          </p:cNvSpPr>
+          <p:nvPr>
+            <p:ph type="body" sz="quarter" idx="18"/>
+          </p:nvPr>
+        </p:nvSpPr>
+        <p:spPr>
+          <a:xfrm>
+            <a:off x="8028432" y="2706624"/>
+            <a:ext cx="1432244" cy="1014984"/>
+          </a:xfrm>
+        </p:spPr>
+        <p:txBody>
+          <a:bodyPr/>
+          <a:lstStyle/>
+          <a:p>
             <a:r>
               <a:rPr lang="pl-PL" dirty="0"/>
-              <a:t>Konieczny dostęp do </a:t>
+              <a:t>06.2024</a:t>
             </a:r>
-            <a:r>
-              <a:rPr lang="pl-PL" dirty="0" err="1"/>
-              <a:t>internetu</a:t>
-            </a:r>
+          </a:p>
+        </p:txBody>
+      </p:sp>
+      <p:sp>
+        <p:nvSpPr>
+          <p:cNvPr id="20" name="Symbol zastępczy tekstu 19">
+            <a:extLst>
+              <a:ext uri="{FF2B5EF4-FFF2-40B4-BE49-F238E27FC236}">
+                <a16:creationId xmlns:a16="http://schemas.microsoft.com/office/drawing/2014/main" id="{35577C54-609A-EE73-9733-C3B06C3933F9}"/>
+              </a:ext>
+            </a:extLst>
+          </p:cNvPr>
+          <p:cNvSpPr>
+            <a:spLocks noGrp="1"/>
+          </p:cNvSpPr>
+          <p:nvPr>
+            <p:ph type="body" sz="quarter" idx="19"/>
+          </p:nvPr>
+        </p:nvSpPr>
+        <p:spPr>
+          <a:xfrm>
+            <a:off x="10460736" y="2706624"/>
+            <a:ext cx="1432244" cy="1014984"/>
+          </a:xfrm>
+        </p:spPr>
+        <p:txBody>
+          <a:bodyPr/>
+          <a:lstStyle/>
+          <a:p>
             <a:r>
               <a:rPr lang="pl-PL" dirty="0"/>
-              <a:t> podczas korzystania ze wszystkich funkcji aplikacji</a:t>
+              <a:t>07.2024</a:t>
             </a:r>
           </a:p>
-          <a:p>
-            <a:pPr marL="285750" indent="-285750">
-              <a:buFont typeface="Arial" panose="020B0604020202020204" pitchFamily="34" charset="0"/>
-              <a:buChar char="•"/>
-            </a:pPr>
-            <a:endParaRPr lang="pl-PL" dirty="0"/>
-          </a:p>
-        </p:txBody>
-      </p:sp>
-      <p:sp>
-        <p:nvSpPr>
-          <p:cNvPr id="4" name="Symbol zastępczy tekstu 3">
-            <a:extLst>
-              <a:ext uri="{FF2B5EF4-FFF2-40B4-BE49-F238E27FC236}">
-                <a16:creationId xmlns:a16="http://schemas.microsoft.com/office/drawing/2014/main" id="{8B8FD94F-A593-0EB4-BD3B-A0D5515E1249}"/>
+        </p:txBody>
+      </p:sp>
+      <p:sp>
+        <p:nvSpPr>
+          <p:cNvPr id="21" name="Symbol zastępczy tekstu 20">
+            <a:extLst>
+              <a:ext uri="{FF2B5EF4-FFF2-40B4-BE49-F238E27FC236}">
+                <a16:creationId xmlns:a16="http://schemas.microsoft.com/office/drawing/2014/main" id="{5926BC8D-74CA-6968-C91B-AC508AD92C44}"/>
+              </a:ext>
+            </a:extLst>
+          </p:cNvPr>
+          <p:cNvSpPr>
+            <a:spLocks noGrp="1"/>
+          </p:cNvSpPr>
+          <p:nvPr>
+            <p:ph type="body" sz="quarter" idx="20"/>
+          </p:nvPr>
+        </p:nvSpPr>
+        <p:spPr>
+          <a:xfrm>
+            <a:off x="5504688" y="4041648"/>
+            <a:ext cx="1936636" cy="2474766"/>
+          </a:xfrm>
+        </p:spPr>
+        <p:txBody>
+          <a:bodyPr/>
+          <a:lstStyle/>
+          <a:p>
+            <a:r>
+              <a:rPr lang="pl-PL" dirty="0"/>
+              <a:t>Testy jednostkowe tworzymy już na etapie kodowania, aczkolwiek warto wydzielić dodatkowy czas na rzetelne sprawdzenie produktu.</a:t>
+            </a:r>
+          </a:p>
+        </p:txBody>
+      </p:sp>
+      <p:sp>
+        <p:nvSpPr>
+          <p:cNvPr id="22" name="Symbol zastępczy tekstu 21">
+            <a:extLst>
+              <a:ext uri="{FF2B5EF4-FFF2-40B4-BE49-F238E27FC236}">
+                <a16:creationId xmlns:a16="http://schemas.microsoft.com/office/drawing/2014/main" id="{2D780A24-D33E-A56F-AE78-DC508FCE4B70}"/>
+              </a:ext>
+            </a:extLst>
+          </p:cNvPr>
+          <p:cNvSpPr>
+            <a:spLocks noGrp="1"/>
+          </p:cNvSpPr>
+          <p:nvPr>
+            <p:ph type="body" sz="quarter" idx="21"/>
+          </p:nvPr>
+        </p:nvSpPr>
+        <p:spPr>
+          <a:xfrm>
+            <a:off x="7918704" y="4041648"/>
+            <a:ext cx="1822704" cy="2180474"/>
+          </a:xfrm>
+        </p:spPr>
+        <p:txBody>
+          <a:bodyPr/>
+          <a:lstStyle/>
+          <a:p>
+            <a:r>
+              <a:rPr lang="pl-PL" dirty="0"/>
+              <a:t>Końcowy etap, w którym wprowadzamy aplikację na rynek. Realizujemy uprzednią przygotowaną kampanię reklamową.</a:t>
+            </a:r>
+          </a:p>
+        </p:txBody>
+      </p:sp>
+      <p:sp>
+        <p:nvSpPr>
+          <p:cNvPr id="23" name="Symbol zastępczy tekstu 22">
+            <a:extLst>
+              <a:ext uri="{FF2B5EF4-FFF2-40B4-BE49-F238E27FC236}">
+                <a16:creationId xmlns:a16="http://schemas.microsoft.com/office/drawing/2014/main" id="{035278E8-35CE-DA53-BA3C-CA498A5753B7}"/>
+              </a:ext>
+            </a:extLst>
+          </p:cNvPr>
+          <p:cNvSpPr>
+            <a:spLocks noGrp="1"/>
+          </p:cNvSpPr>
+          <p:nvPr>
+            <p:ph type="body" sz="quarter" idx="22"/>
+          </p:nvPr>
+        </p:nvSpPr>
+        <p:spPr>
+          <a:xfrm>
+            <a:off x="10369296" y="4041648"/>
+            <a:ext cx="1563624" cy="2180474"/>
+          </a:xfrm>
+        </p:spPr>
+        <p:txBody>
+          <a:bodyPr/>
+          <a:lstStyle/>
+          <a:p>
+            <a:r>
+              <a:rPr lang="pl-PL" dirty="0"/>
+              <a:t>Przyszłościowo tworzymy kolejne funkcjonalności do podtrzymania produktu na rynku.</a:t>
+            </a:r>
+          </a:p>
+        </p:txBody>
+      </p:sp>
+      <p:sp>
+        <p:nvSpPr>
+          <p:cNvPr id="12" name="Symbol zastępczy tekstu 11">
+            <a:extLst>
+              <a:ext uri="{FF2B5EF4-FFF2-40B4-BE49-F238E27FC236}">
+                <a16:creationId xmlns:a16="http://schemas.microsoft.com/office/drawing/2014/main" id="{60EDFC7B-A6A5-E48E-741C-05804258911B}"/>
               </a:ext>
             </a:extLst>
           </p:cNvPr>
@@ -25678,7 +25761,7 @@
           <p:cNvPr id="5" name="Symbol zastępczy numeru slajdu 4">
             <a:extLst>
               <a:ext uri="{FF2B5EF4-FFF2-40B4-BE49-F238E27FC236}">
-                <a16:creationId xmlns:a16="http://schemas.microsoft.com/office/drawing/2014/main" id="{320974EC-246D-2D96-1053-5F42228C5EF2}"/>
+                <a16:creationId xmlns:a16="http://schemas.microsoft.com/office/drawing/2014/main" id="{D8188AF0-2222-3B11-C4B7-6C8378058CC5}"/>
               </a:ext>
             </a:extLst>
           </p:cNvPr>
@@ -25686,28 +25769,230 @@
             <a:spLocks noGrp="1"/>
           </p:cNvSpPr>
           <p:nvPr>
-            <p:ph type="sldNum" sz="quarter" idx="15"/>
+            <p:ph type="sldNum" sz="quarter" idx="28"/>
           </p:nvPr>
         </p:nvSpPr>
         <p:spPr/>
         <p:txBody>
-          <a:bodyPr/>
+          <a:bodyPr anchor="ctr">
+            <a:normAutofit/>
+          </a:bodyPr>
           <a:lstStyle/>
           <a:p>
-            <a:pPr rtl="0"/>
+            <a:pPr rtl="0">
+              <a:spcAft>
+                <a:spcPts val="600"/>
+              </a:spcAft>
+            </a:pPr>
             <a:fld id="{CC43B8D3-9A08-F84C-9DD4-44948BA52D4B}" type="slidenum">
               <a:rPr lang="pl-PL" noProof="0" smtClean="0"/>
-              <a:pPr rtl="0"/>
+              <a:pPr rtl="0">
+                <a:spcAft>
+                  <a:spcPts val="600"/>
+                </a:spcAft>
+              </a:pPr>
               <a:t>8</a:t>
             </a:fld>
-            <a:endParaRPr lang="pl-PL" noProof="0"/>
+            <a:endParaRPr lang="pl-PL" noProof="0" dirty="0"/>
+          </a:p>
+        </p:txBody>
+      </p:sp>
+      <p:sp>
+        <p:nvSpPr>
+          <p:cNvPr id="28" name="pole tekstowe 27">
+            <a:extLst>
+              <a:ext uri="{FF2B5EF4-FFF2-40B4-BE49-F238E27FC236}">
+                <a16:creationId xmlns:a16="http://schemas.microsoft.com/office/drawing/2014/main" id="{C370102B-E4DA-DDED-5FD0-0CFF904069B7}"/>
+              </a:ext>
+            </a:extLst>
+          </p:cNvPr>
+          <p:cNvSpPr txBox="1"/>
+          <p:nvPr/>
+        </p:nvSpPr>
+        <p:spPr>
+          <a:xfrm>
+            <a:off x="5491214" y="2321053"/>
+            <a:ext cx="1642071" cy="369332"/>
+          </a:xfrm>
+          <a:prstGeom prst="rect">
+            <a:avLst/>
+          </a:prstGeom>
+          <a:noFill/>
+        </p:spPr>
+        <p:txBody>
+          <a:bodyPr wrap="square" rtlCol="0">
+            <a:spAutoFit/>
+          </a:bodyPr>
+          <a:lstStyle/>
+          <a:p>
+            <a:r>
+              <a:rPr lang="pl-PL" b="1" i="1" dirty="0">
+                <a:solidFill>
+                  <a:schemeClr val="accent4"/>
+                </a:solidFill>
+              </a:rPr>
+              <a:t>Testowanie</a:t>
+            </a:r>
+          </a:p>
+        </p:txBody>
+      </p:sp>
+      <p:sp>
+        <p:nvSpPr>
+          <p:cNvPr id="29" name="pole tekstowe 28">
+            <a:extLst>
+              <a:ext uri="{FF2B5EF4-FFF2-40B4-BE49-F238E27FC236}">
+                <a16:creationId xmlns:a16="http://schemas.microsoft.com/office/drawing/2014/main" id="{1E02143C-4842-A652-91EF-BFE53798CD8E}"/>
+              </a:ext>
+            </a:extLst>
+          </p:cNvPr>
+          <p:cNvSpPr txBox="1"/>
+          <p:nvPr/>
+        </p:nvSpPr>
+        <p:spPr>
+          <a:xfrm>
+            <a:off x="3144412" y="2321053"/>
+            <a:ext cx="1642071" cy="369332"/>
+          </a:xfrm>
+          <a:prstGeom prst="rect">
+            <a:avLst/>
+          </a:prstGeom>
+          <a:noFill/>
+        </p:spPr>
+        <p:txBody>
+          <a:bodyPr wrap="square" rtlCol="0">
+            <a:spAutoFit/>
+          </a:bodyPr>
+          <a:lstStyle/>
+          <a:p>
+            <a:r>
+              <a:rPr lang="pl-PL" b="1" i="1" dirty="0">
+                <a:solidFill>
+                  <a:srgbClr val="00B0F0"/>
+                </a:solidFill>
+              </a:rPr>
+              <a:t>Kodowanie</a:t>
+            </a:r>
+          </a:p>
+        </p:txBody>
+      </p:sp>
+      <p:sp>
+        <p:nvSpPr>
+          <p:cNvPr id="30" name="pole tekstowe 29">
+            <a:extLst>
+              <a:ext uri="{FF2B5EF4-FFF2-40B4-BE49-F238E27FC236}">
+                <a16:creationId xmlns:a16="http://schemas.microsoft.com/office/drawing/2014/main" id="{EBBABA54-5E5E-9094-F240-2E73298E9A72}"/>
+              </a:ext>
+            </a:extLst>
+          </p:cNvPr>
+          <p:cNvSpPr txBox="1"/>
+          <p:nvPr/>
+        </p:nvSpPr>
+        <p:spPr>
+          <a:xfrm>
+            <a:off x="722375" y="2321053"/>
+            <a:ext cx="1642071" cy="369332"/>
+          </a:xfrm>
+          <a:prstGeom prst="rect">
+            <a:avLst/>
+          </a:prstGeom>
+          <a:noFill/>
+        </p:spPr>
+        <p:txBody>
+          <a:bodyPr wrap="square" rtlCol="0">
+            <a:spAutoFit/>
+          </a:bodyPr>
+          <a:lstStyle/>
+          <a:p>
+            <a:r>
+              <a:rPr lang="pl-PL" b="1" i="1" dirty="0">
+                <a:solidFill>
+                  <a:srgbClr val="FF0000"/>
+                </a:solidFill>
+              </a:rPr>
+              <a:t>Planowanie</a:t>
+            </a:r>
+          </a:p>
+        </p:txBody>
+      </p:sp>
+      <p:sp>
+        <p:nvSpPr>
+          <p:cNvPr id="31" name="pole tekstowe 30">
+            <a:extLst>
+              <a:ext uri="{FF2B5EF4-FFF2-40B4-BE49-F238E27FC236}">
+                <a16:creationId xmlns:a16="http://schemas.microsoft.com/office/drawing/2014/main" id="{6FD1050C-EB71-9D90-8D22-8556455654E8}"/>
+              </a:ext>
+            </a:extLst>
+          </p:cNvPr>
+          <p:cNvSpPr txBox="1"/>
+          <p:nvPr/>
+        </p:nvSpPr>
+        <p:spPr>
+          <a:xfrm>
+            <a:off x="7836408" y="2077400"/>
+            <a:ext cx="1987296" cy="646331"/>
+          </a:xfrm>
+          <a:prstGeom prst="rect">
+            <a:avLst/>
+          </a:prstGeom>
+          <a:noFill/>
+        </p:spPr>
+        <p:txBody>
+          <a:bodyPr wrap="square" rtlCol="0">
+            <a:spAutoFit/>
+          </a:bodyPr>
+          <a:lstStyle/>
+          <a:p>
+            <a:pPr algn="ctr"/>
+            <a:r>
+              <a:rPr lang="pl-PL" b="1" i="1" dirty="0">
+                <a:solidFill>
+                  <a:schemeClr val="accent3"/>
+                </a:solidFill>
+              </a:rPr>
+              <a:t>Kampania marketingowa</a:t>
+            </a:r>
+          </a:p>
+        </p:txBody>
+      </p:sp>
+      <p:sp>
+        <p:nvSpPr>
+          <p:cNvPr id="32" name="pole tekstowe 31">
+            <a:extLst>
+              <a:ext uri="{FF2B5EF4-FFF2-40B4-BE49-F238E27FC236}">
+                <a16:creationId xmlns:a16="http://schemas.microsoft.com/office/drawing/2014/main" id="{0642485F-0A77-79BF-5362-5153B93851B9}"/>
+              </a:ext>
+            </a:extLst>
+          </p:cNvPr>
+          <p:cNvSpPr txBox="1"/>
+          <p:nvPr/>
+        </p:nvSpPr>
+        <p:spPr>
+          <a:xfrm>
+            <a:off x="10355822" y="2321053"/>
+            <a:ext cx="1642071" cy="369332"/>
+          </a:xfrm>
+          <a:prstGeom prst="rect">
+            <a:avLst/>
+          </a:prstGeom>
+          <a:noFill/>
+        </p:spPr>
+        <p:txBody>
+          <a:bodyPr wrap="square" rtlCol="0">
+            <a:spAutoFit/>
+          </a:bodyPr>
+          <a:lstStyle/>
+          <a:p>
+            <a:r>
+              <a:rPr lang="pl-PL" b="1" i="1" dirty="0"/>
+              <a:t>Utrzymanie</a:t>
+            </a:r>
           </a:p>
         </p:txBody>
       </p:sp>
     </p:spTree>
     <p:extLst>
       <p:ext uri="{BB962C8B-B14F-4D97-AF65-F5344CB8AC3E}">
-        <p14:creationId xmlns:p14="http://schemas.microsoft.com/office/powerpoint/2010/main" val="3162972259"/>
+        <p14:creationId xmlns:p14="http://schemas.microsoft.com/office/powerpoint/2010/main" val="24438550"/>
       </p:ext>
     </p:extLst>
   </p:cSld>
@@ -25720,14 +26005,6 @@
 <file path=ppt/slides/slide9.xml><?xml version="1.0" encoding="utf-8"?>
 <p:sld xmlns:a="http://schemas.openxmlformats.org/drawingml/2006/main" xmlns:r="http://schemas.openxmlformats.org/officeDocument/2006/relationships" xmlns:p="http://schemas.openxmlformats.org/presentationml/2006/main">
   <p:cSld>
-    <p:bg>
-      <p:bgPr>
-        <a:solidFill>
-          <a:schemeClr val="bg2"/>
-        </a:solidFill>
-        <a:effectLst/>
-      </p:bgPr>
-    </p:bg>
     <p:spTree>
       <p:nvGrpSpPr>
         <p:cNvPr id="1" name=""/>
@@ -25744,111 +26021,10 @@
       </p:grpSpPr>
       <p:sp>
         <p:nvSpPr>
-          <p:cNvPr id="13" name="Tytuł 12">
-            <a:extLst>
-              <a:ext uri="{FF2B5EF4-FFF2-40B4-BE49-F238E27FC236}">
-                <a16:creationId xmlns:a16="http://schemas.microsoft.com/office/drawing/2014/main" id="{E729A509-992F-8C10-902D-182448B5A1AE}"/>
-              </a:ext>
-            </a:extLst>
-          </p:cNvPr>
-          <p:cNvSpPr>
-            <a:spLocks noGrp="1"/>
-          </p:cNvSpPr>
-          <p:nvPr>
-            <p:ph type="title"/>
-          </p:nvPr>
-        </p:nvSpPr>
-        <p:spPr/>
-        <p:txBody>
-          <a:bodyPr rtlCol="0"/>
-          <a:lstStyle>
-            <a:defPPr>
-              <a:defRPr lang="pl-PL"/>
-            </a:defPPr>
-          </a:lstStyle>
-          <a:p>
-            <a:pPr rtl="0"/>
-            <a:r>
-              <a:rPr lang="pl-PL" dirty="0"/>
-              <a:t>Podsumowanie</a:t>
-            </a:r>
-          </a:p>
-        </p:txBody>
-      </p:sp>
-      <p:sp>
-        <p:nvSpPr>
-          <p:cNvPr id="12" name="Zawartość — symbol zastępczy 11">
-            <a:extLst>
-              <a:ext uri="{FF2B5EF4-FFF2-40B4-BE49-F238E27FC236}">
-                <a16:creationId xmlns:a16="http://schemas.microsoft.com/office/drawing/2014/main" id="{84FA0F1E-A920-0194-981E-4B573643BB48}"/>
-              </a:ext>
-            </a:extLst>
-          </p:cNvPr>
-          <p:cNvSpPr>
-            <a:spLocks noGrp="1"/>
-          </p:cNvSpPr>
-          <p:nvPr>
-            <p:ph idx="1"/>
-          </p:nvPr>
-        </p:nvSpPr>
-        <p:spPr/>
-        <p:txBody>
-          <a:bodyPr rtlCol="0"/>
-          <a:lstStyle>
-            <a:defPPr>
-              <a:defRPr lang="pl-PL"/>
-            </a:defPPr>
-          </a:lstStyle>
-          <a:p>
-            <a:pPr rtl="0"/>
-            <a:r>
-              <a:rPr lang="pl-PL" dirty="0"/>
-              <a:t>Aplikacja „Sports </a:t>
-            </a:r>
-            <a:r>
-              <a:rPr lang="pl-PL" dirty="0" err="1"/>
-              <a:t>Joiner</a:t>
-            </a:r>
-            <a:r>
-              <a:rPr lang="pl-PL" dirty="0"/>
-              <a:t>” jest rewolucyjnym rozwiązaniem, mającym na celu poprawę zdrowia oraz zacieśniania więzi wśród wszystkich jej użytkowników. Głównym celem, przyświecającym tej idei technologicznej, jest pomoc w odnalezieniu chętnych do uprawiania tego samego sportu. Projekt ten jest także narzędziem dla osób, którym brakuje motywacji do poszerzania swoich możliwości ruchowych w pojedynkę.</a:t>
-            </a:r>
-          </a:p>
-          <a:p>
-            <a:pPr algn="l" rtl="0" fontAlgn="base"/>
-            <a:r>
-              <a:rPr lang="pl-PL" b="0" i="0" dirty="0">
-                <a:solidFill>
-                  <a:srgbClr val="000000"/>
-                </a:solidFill>
-                <a:effectLst/>
-                <a:latin typeface="Calibri" panose="020F0502020204030204" pitchFamily="34" charset="0"/>
-              </a:rPr>
-              <a:t>​</a:t>
-            </a:r>
-            <a:endParaRPr lang="pl-PL" b="0" i="0" dirty="0">
-              <a:solidFill>
-                <a:srgbClr val="000000"/>
-              </a:solidFill>
-              <a:effectLst/>
-              <a:latin typeface="Segoe UI" panose="020B0502040204020203" pitchFamily="34" charset="0"/>
-            </a:endParaRPr>
-          </a:p>
-          <a:p>
-            <a:pPr rtl="0"/>
-            <a:endParaRPr lang="pl-PL" b="1" dirty="0">
-              <a:latin typeface="Arial Black" panose="020B0604020202020204" pitchFamily="34" charset="0"/>
-              <a:cs typeface="Arial Black" panose="020B0604020202020204" pitchFamily="34" charset="0"/>
-            </a:endParaRPr>
-          </a:p>
-        </p:txBody>
-      </p:sp>
-      <p:sp>
-        <p:nvSpPr>
-          <p:cNvPr id="19" name="Tekst — symbol zastępczy 18">
-            <a:extLst>
-              <a:ext uri="{FF2B5EF4-FFF2-40B4-BE49-F238E27FC236}">
-                <a16:creationId xmlns:a16="http://schemas.microsoft.com/office/drawing/2014/main" id="{1A502D19-C614-886C-4945-5880F36E0998}"/>
+          <p:cNvPr id="2" name="Symbol zastępczy tekstu 1">
+            <a:extLst>
+              <a:ext uri="{FF2B5EF4-FFF2-40B4-BE49-F238E27FC236}">
+                <a16:creationId xmlns:a16="http://schemas.microsoft.com/office/drawing/2014/main" id="{7E7C8BF0-9D0A-B803-0BCF-0FA611683AEE}"/>
               </a:ext>
             </a:extLst>
           </p:cNvPr>
@@ -25861,24 +26037,19 @@
         </p:nvSpPr>
         <p:spPr/>
         <p:txBody>
-          <a:bodyPr rtlCol="0"/>
-          <a:lstStyle>
-            <a:defPPr>
-              <a:defRPr lang="pl-PL"/>
-            </a:defPPr>
-          </a:lstStyle>
-          <a:p>
-            <a:pPr rtl="0"/>
+          <a:bodyPr/>
+          <a:lstStyle/>
+          <a:p>
             <a:endParaRPr lang="pl-PL"/>
           </a:p>
         </p:txBody>
       </p:sp>
       <p:sp>
         <p:nvSpPr>
-          <p:cNvPr id="17" name="Numer slajdu — symbol zastępczy 16">
-            <a:extLst>
-              <a:ext uri="{FF2B5EF4-FFF2-40B4-BE49-F238E27FC236}">
-                <a16:creationId xmlns:a16="http://schemas.microsoft.com/office/drawing/2014/main" id="{E46CC291-411B-349C-8657-ED39C084F877}"/>
+          <p:cNvPr id="3" name="Symbol zastępczy numeru slajdu 2">
+            <a:extLst>
+              <a:ext uri="{FF2B5EF4-FFF2-40B4-BE49-F238E27FC236}">
+                <a16:creationId xmlns:a16="http://schemas.microsoft.com/office/drawing/2014/main" id="{4BB4267B-ED30-D376-2D3E-FF809594508F}"/>
               </a:ext>
             </a:extLst>
           </p:cNvPr>
@@ -25886,30 +26057,483 @@
             <a:spLocks noGrp="1"/>
           </p:cNvSpPr>
           <p:nvPr>
-            <p:ph type="sldNum" sz="quarter" idx="15"/>
+            <p:ph type="sldNum" sz="quarter" idx="11"/>
           </p:nvPr>
         </p:nvSpPr>
         <p:spPr/>
         <p:txBody>
-          <a:bodyPr rtlCol="0"/>
-          <a:lstStyle>
-            <a:defPPr>
-              <a:defRPr lang="pl-PL"/>
-            </a:defPPr>
-          </a:lstStyle>
+          <a:bodyPr/>
+          <a:lstStyle/>
           <a:p>
             <a:pPr rtl="0"/>
-            <a:r>
-              <a:rPr lang="pl-PL" dirty="0"/>
-              <a:t>10</a:t>
-            </a:r>
-          </a:p>
-        </p:txBody>
-      </p:sp>
+            <a:fld id="{CC43B8D3-9A08-F84C-9DD4-44948BA52D4B}" type="slidenum">
+              <a:rPr lang="pl-PL" noProof="0" smtClean="0"/>
+              <a:pPr rtl="0"/>
+              <a:t>9</a:t>
+            </a:fld>
+            <a:endParaRPr lang="pl-PL" noProof="0"/>
+          </a:p>
+        </p:txBody>
+      </p:sp>
+      <p:sp>
+        <p:nvSpPr>
+          <p:cNvPr id="4" name="Prostokąt 3">
+            <a:extLst>
+              <a:ext uri="{FF2B5EF4-FFF2-40B4-BE49-F238E27FC236}">
+                <a16:creationId xmlns:a16="http://schemas.microsoft.com/office/drawing/2014/main" id="{7E608FD2-62D9-6924-3E72-FFC76B635A95}"/>
+              </a:ext>
+            </a:extLst>
+          </p:cNvPr>
+          <p:cNvSpPr/>
+          <p:nvPr/>
+        </p:nvSpPr>
+        <p:spPr>
+          <a:xfrm>
+            <a:off x="0" y="0"/>
+            <a:ext cx="12192000" cy="6858000"/>
+          </a:xfrm>
+          <a:prstGeom prst="rect">
+            <a:avLst/>
+          </a:prstGeom>
+          <a:solidFill>
+            <a:schemeClr val="bg2"/>
+          </a:solidFill>
+        </p:spPr>
+        <p:style>
+          <a:lnRef idx="2">
+            <a:schemeClr val="accent1">
+              <a:shade val="15000"/>
+            </a:schemeClr>
+          </a:lnRef>
+          <a:fillRef idx="1">
+            <a:schemeClr val="accent1"/>
+          </a:fillRef>
+          <a:effectRef idx="0">
+            <a:schemeClr val="accent1"/>
+          </a:effectRef>
+          <a:fontRef idx="minor">
+            <a:schemeClr val="lt1"/>
+          </a:fontRef>
+        </p:style>
+        <p:txBody>
+          <a:bodyPr rtlCol="0" anchor="ctr"/>
+          <a:lstStyle/>
+          <a:p>
+            <a:pPr algn="ctr"/>
+            <a:endParaRPr lang="pl-PL"/>
+          </a:p>
+        </p:txBody>
+      </p:sp>
+      <p:graphicFrame>
+        <p:nvGraphicFramePr>
+          <p:cNvPr id="9" name="Tabela 8">
+            <a:extLst>
+              <a:ext uri="{FF2B5EF4-FFF2-40B4-BE49-F238E27FC236}">
+                <a16:creationId xmlns:a16="http://schemas.microsoft.com/office/drawing/2014/main" id="{CEABEB0C-E3EF-744E-12F8-58C79E86D2B8}"/>
+              </a:ext>
+            </a:extLst>
+          </p:cNvPr>
+          <p:cNvGraphicFramePr>
+            <a:graphicFrameLocks noGrp="1"/>
+          </p:cNvGraphicFramePr>
+          <p:nvPr>
+            <p:extLst>
+              <p:ext uri="{D42A27DB-BD31-4B8C-83A1-F6EECF244321}">
+                <p14:modId xmlns:p14="http://schemas.microsoft.com/office/powerpoint/2010/main" val="2311515000"/>
+              </p:ext>
+            </p:extLst>
+          </p:nvPr>
+        </p:nvGraphicFramePr>
+        <p:xfrm>
+          <a:off x="110360" y="159250"/>
+          <a:ext cx="11971280" cy="6539499"/>
+        </p:xfrm>
+        <a:graphic>
+          <a:graphicData uri="http://schemas.openxmlformats.org/drawingml/2006/table">
+            <a:tbl>
+              <a:tblPr firstRow="1" firstCol="1">
+                <a:tableStyleId>{93296810-A885-4BE3-A3E7-6D5BEEA58F35}</a:tableStyleId>
+              </a:tblPr>
+              <a:tblGrid>
+                <a:gridCol w="2394256">
+                  <a:extLst>
+                    <a:ext uri="{9D8B030D-6E8A-4147-A177-3AD203B41FA5}">
+                      <a16:colId xmlns:a16="http://schemas.microsoft.com/office/drawing/2014/main" val="1203179305"/>
+                    </a:ext>
+                  </a:extLst>
+                </a:gridCol>
+                <a:gridCol w="2394256">
+                  <a:extLst>
+                    <a:ext uri="{9D8B030D-6E8A-4147-A177-3AD203B41FA5}">
+                      <a16:colId xmlns:a16="http://schemas.microsoft.com/office/drawing/2014/main" val="2427513210"/>
+                    </a:ext>
+                  </a:extLst>
+                </a:gridCol>
+                <a:gridCol w="2342756">
+                  <a:extLst>
+                    <a:ext uri="{9D8B030D-6E8A-4147-A177-3AD203B41FA5}">
+                      <a16:colId xmlns:a16="http://schemas.microsoft.com/office/drawing/2014/main" val="653935483"/>
+                    </a:ext>
+                  </a:extLst>
+                </a:gridCol>
+                <a:gridCol w="2445756">
+                  <a:extLst>
+                    <a:ext uri="{9D8B030D-6E8A-4147-A177-3AD203B41FA5}">
+                      <a16:colId xmlns:a16="http://schemas.microsoft.com/office/drawing/2014/main" val="924383811"/>
+                    </a:ext>
+                  </a:extLst>
+                </a:gridCol>
+                <a:gridCol w="2394256">
+                  <a:extLst>
+                    <a:ext uri="{9D8B030D-6E8A-4147-A177-3AD203B41FA5}">
+                      <a16:colId xmlns:a16="http://schemas.microsoft.com/office/drawing/2014/main" val="4035549800"/>
+                    </a:ext>
+                  </a:extLst>
+                </a:gridCol>
+              </a:tblGrid>
+              <a:tr h="1417833">
+                <a:tc>
+                  <a:txBody>
+                    <a:bodyPr/>
+                    <a:lstStyle/>
+                    <a:p>
+                      <a:pPr algn="ctr"/>
+                      <a:endParaRPr lang="pl-PL" dirty="0"/>
+                    </a:p>
+                  </a:txBody>
+                  <a:tcPr anchor="ctr"/>
+                </a:tc>
+                <a:tc>
+                  <a:txBody>
+                    <a:bodyPr/>
+                    <a:lstStyle/>
+                    <a:p>
+                      <a:pPr algn="ctr"/>
+                      <a:r>
+                        <a:rPr lang="pl-PL" dirty="0"/>
+                        <a:t>Planowanie</a:t>
+                      </a:r>
+                    </a:p>
+                  </a:txBody>
+                  <a:tcPr anchor="ctr"/>
+                </a:tc>
+                <a:tc>
+                  <a:txBody>
+                    <a:bodyPr/>
+                    <a:lstStyle/>
+                    <a:p>
+                      <a:pPr algn="ctr"/>
+                      <a:r>
+                        <a:rPr lang="pl-PL" dirty="0"/>
+                        <a:t>Kodowanie</a:t>
+                      </a:r>
+                    </a:p>
+                  </a:txBody>
+                  <a:tcPr anchor="ctr"/>
+                </a:tc>
+                <a:tc>
+                  <a:txBody>
+                    <a:bodyPr/>
+                    <a:lstStyle/>
+                    <a:p>
+                      <a:pPr algn="ctr"/>
+                      <a:r>
+                        <a:rPr lang="pl-PL" dirty="0"/>
+                        <a:t>Testowanie</a:t>
+                      </a:r>
+                    </a:p>
+                  </a:txBody>
+                  <a:tcPr anchor="ctr"/>
+                </a:tc>
+                <a:tc>
+                  <a:txBody>
+                    <a:bodyPr/>
+                    <a:lstStyle/>
+                    <a:p>
+                      <a:pPr algn="ctr"/>
+                      <a:r>
+                        <a:rPr lang="pl-PL" dirty="0"/>
+                        <a:t>Kampania marketingowa</a:t>
+                      </a:r>
+                    </a:p>
+                  </a:txBody>
+                  <a:tcPr anchor="ctr"/>
+                </a:tc>
+                <a:extLst>
+                  <a:ext uri="{0D108BD9-81ED-4DB2-BD59-A6C34878D82A}">
+                    <a16:rowId xmlns:a16="http://schemas.microsoft.com/office/drawing/2014/main" val="2586868232"/>
+                  </a:ext>
+                </a:extLst>
+              </a:tr>
+              <a:tr h="1417833">
+                <a:tc>
+                  <a:txBody>
+                    <a:bodyPr/>
+                    <a:lstStyle/>
+                    <a:p>
+                      <a:pPr algn="ctr"/>
+                      <a:r>
+                        <a:rPr lang="pl-PL" dirty="0"/>
+                        <a:t>Szacowany czas</a:t>
+                      </a:r>
+                    </a:p>
+                  </a:txBody>
+                  <a:tcPr anchor="ctr"/>
+                </a:tc>
+                <a:tc>
+                  <a:txBody>
+                    <a:bodyPr/>
+                    <a:lstStyle/>
+                    <a:p>
+                      <a:pPr algn="ctr"/>
+                      <a:r>
+                        <a:rPr lang="pl-PL" dirty="0"/>
+                        <a:t>3-4 tygodnie</a:t>
+                      </a:r>
+                    </a:p>
+                  </a:txBody>
+                  <a:tcPr anchor="ctr"/>
+                </a:tc>
+                <a:tc>
+                  <a:txBody>
+                    <a:bodyPr/>
+                    <a:lstStyle/>
+                    <a:p>
+                      <a:pPr algn="ctr"/>
+                      <a:r>
+                        <a:rPr lang="pl-PL" dirty="0"/>
+                        <a:t>4-5 miesięcy</a:t>
+                      </a:r>
+                    </a:p>
+                  </a:txBody>
+                  <a:tcPr anchor="ctr"/>
+                </a:tc>
+                <a:tc>
+                  <a:txBody>
+                    <a:bodyPr/>
+                    <a:lstStyle/>
+                    <a:p>
+                      <a:pPr algn="ctr"/>
+                      <a:r>
+                        <a:rPr lang="pl-PL" dirty="0"/>
+                        <a:t>4 tygodnie</a:t>
+                      </a:r>
+                    </a:p>
+                  </a:txBody>
+                  <a:tcPr anchor="ctr"/>
+                </a:tc>
+                <a:tc>
+                  <a:txBody>
+                    <a:bodyPr/>
+                    <a:lstStyle/>
+                    <a:p>
+                      <a:pPr algn="ctr"/>
+                      <a:r>
+                        <a:rPr lang="pl-PL" dirty="0"/>
+                        <a:t>3 tygodnie</a:t>
+                      </a:r>
+                    </a:p>
+                  </a:txBody>
+                  <a:tcPr anchor="ctr"/>
+                </a:tc>
+                <a:extLst>
+                  <a:ext uri="{0D108BD9-81ED-4DB2-BD59-A6C34878D82A}">
+                    <a16:rowId xmlns:a16="http://schemas.microsoft.com/office/drawing/2014/main" val="2885320944"/>
+                  </a:ext>
+                </a:extLst>
+              </a:tr>
+              <a:tr h="2084238">
+                <a:tc>
+                  <a:txBody>
+                    <a:bodyPr/>
+                    <a:lstStyle/>
+                    <a:p>
+                      <a:pPr algn="ctr"/>
+                      <a:r>
+                        <a:rPr lang="pl-PL" dirty="0"/>
+                        <a:t>Najważniejsze zadania</a:t>
+                      </a:r>
+                    </a:p>
+                  </a:txBody>
+                  <a:tcPr anchor="ctr"/>
+                </a:tc>
+                <a:tc>
+                  <a:txBody>
+                    <a:bodyPr/>
+                    <a:lstStyle/>
+                    <a:p>
+                      <a:pPr marL="285750" indent="-285750" algn="ctr">
+                        <a:buFont typeface="Arial" panose="020B0604020202020204" pitchFamily="34" charset="0"/>
+                        <a:buChar char="•"/>
+                      </a:pPr>
+                      <a:r>
+                        <a:rPr lang="pl-PL" sz="1600" dirty="0"/>
+                        <a:t>Przygotowanie szczegółowego planu</a:t>
+                      </a:r>
+                    </a:p>
+                    <a:p>
+                      <a:pPr marL="285750" indent="-285750" algn="ctr">
+                        <a:buFont typeface="Arial" panose="020B0604020202020204" pitchFamily="34" charset="0"/>
+                        <a:buChar char="•"/>
+                      </a:pPr>
+                      <a:r>
+                        <a:rPr lang="pl-PL" sz="1600" dirty="0"/>
+                        <a:t>Przygotowanie narzędzi dla programistów</a:t>
+                      </a:r>
+                    </a:p>
+                  </a:txBody>
+                  <a:tcPr anchor="ctr"/>
+                </a:tc>
+                <a:tc>
+                  <a:txBody>
+                    <a:bodyPr/>
+                    <a:lstStyle/>
+                    <a:p>
+                      <a:pPr marL="285750" indent="-285750" algn="ctr">
+                        <a:buFont typeface="Arial" panose="020B0604020202020204" pitchFamily="34" charset="0"/>
+                        <a:buChar char="•"/>
+                      </a:pPr>
+                      <a:r>
+                        <a:rPr lang="pl-PL" sz="1600" dirty="0"/>
+                        <a:t>Implementacja wszystkich funkcjonalności zwartych w MVP</a:t>
+                      </a:r>
+                    </a:p>
+                  </a:txBody>
+                  <a:tcPr anchor="ctr"/>
+                </a:tc>
+                <a:tc>
+                  <a:txBody>
+                    <a:bodyPr/>
+                    <a:lstStyle/>
+                    <a:p>
+                      <a:pPr marL="285750" indent="-285750" algn="ctr">
+                        <a:buFont typeface="Arial" panose="020B0604020202020204" pitchFamily="34" charset="0"/>
+                        <a:buChar char="•"/>
+                      </a:pPr>
+                      <a:r>
+                        <a:rPr lang="pl-PL" sz="1600" dirty="0"/>
+                        <a:t>Akceptacja wszystkich wytworzonych testów</a:t>
+                      </a:r>
+                    </a:p>
+                    <a:p>
+                      <a:pPr marL="285750" indent="-285750" algn="ctr">
+                        <a:buFont typeface="Arial" panose="020B0604020202020204" pitchFamily="34" charset="0"/>
+                        <a:buChar char="•"/>
+                      </a:pPr>
+                      <a:r>
+                        <a:rPr lang="pl-PL" sz="1600" dirty="0"/>
+                        <a:t>Korzystanie z aplikacji w celu wyszukania ewentualnych błędów</a:t>
+                      </a:r>
+                    </a:p>
+                  </a:txBody>
+                  <a:tcPr anchor="ctr"/>
+                </a:tc>
+                <a:tc>
+                  <a:txBody>
+                    <a:bodyPr/>
+                    <a:lstStyle/>
+                    <a:p>
+                      <a:pPr marL="285750" indent="-285750" algn="ctr">
+                        <a:buFont typeface="Arial" panose="020B0604020202020204" pitchFamily="34" charset="0"/>
+                        <a:buChar char="•"/>
+                      </a:pPr>
+                      <a:r>
+                        <a:rPr lang="pl-PL" sz="1600" dirty="0"/>
+                        <a:t>Realizacja zaplanowanej kampanii marketingowej</a:t>
+                      </a:r>
+                    </a:p>
+                    <a:p>
+                      <a:pPr marL="285750" indent="-285750" algn="ctr">
+                        <a:buFont typeface="Arial" panose="020B0604020202020204" pitchFamily="34" charset="0"/>
+                        <a:buChar char="•"/>
+                      </a:pPr>
+                      <a:r>
+                        <a:rPr lang="pl-PL" sz="1600" dirty="0"/>
+                        <a:t>Pozyskanie jak największej liczby użytkowników</a:t>
+                      </a:r>
+                    </a:p>
+                  </a:txBody>
+                  <a:tcPr anchor="ctr"/>
+                </a:tc>
+                <a:extLst>
+                  <a:ext uri="{0D108BD9-81ED-4DB2-BD59-A6C34878D82A}">
+                    <a16:rowId xmlns:a16="http://schemas.microsoft.com/office/drawing/2014/main" val="3407618385"/>
+                  </a:ext>
+                </a:extLst>
+              </a:tr>
+              <a:tr h="1417833">
+                <a:tc>
+                  <a:txBody>
+                    <a:bodyPr/>
+                    <a:lstStyle/>
+                    <a:p>
+                      <a:pPr algn="ctr"/>
+                      <a:r>
+                        <a:rPr lang="pl-PL" dirty="0"/>
+                        <a:t>Zależności</a:t>
+                      </a:r>
+                    </a:p>
+                  </a:txBody>
+                  <a:tcPr anchor="ctr"/>
+                </a:tc>
+                <a:tc>
+                  <a:txBody>
+                    <a:bodyPr/>
+                    <a:lstStyle/>
+                    <a:p>
+                      <a:pPr algn="ctr"/>
+                      <a:endParaRPr lang="pl-PL" dirty="0"/>
+                    </a:p>
+                  </a:txBody>
+                  <a:tcPr anchor="ctr"/>
+                </a:tc>
+                <a:tc>
+                  <a:txBody>
+                    <a:bodyPr/>
+                    <a:lstStyle/>
+                    <a:p>
+                      <a:pPr algn="ctr"/>
+                      <a:endParaRPr lang="pl-PL" dirty="0"/>
+                    </a:p>
+                  </a:txBody>
+                  <a:tcPr anchor="ctr"/>
+                </a:tc>
+                <a:tc>
+                  <a:txBody>
+                    <a:bodyPr/>
+                    <a:lstStyle/>
+                    <a:p>
+                      <a:pPr algn="ctr"/>
+                      <a:endParaRPr lang="pl-PL" dirty="0"/>
+                    </a:p>
+                  </a:txBody>
+                  <a:tcPr anchor="ctr"/>
+                </a:tc>
+                <a:tc>
+                  <a:txBody>
+                    <a:bodyPr/>
+                    <a:lstStyle/>
+                    <a:p>
+                      <a:pPr algn="ctr"/>
+                      <a:endParaRPr lang="pl-PL" dirty="0"/>
+                    </a:p>
+                  </a:txBody>
+                  <a:tcPr anchor="ctr"/>
+                </a:tc>
+                <a:extLst>
+                  <a:ext uri="{0D108BD9-81ED-4DB2-BD59-A6C34878D82A}">
+                    <a16:rowId xmlns:a16="http://schemas.microsoft.com/office/drawing/2014/main" val="3981848324"/>
+                  </a:ext>
+                </a:extLst>
+              </a:tr>
+            </a:tbl>
+          </a:graphicData>
+        </a:graphic>
+      </p:graphicFrame>
     </p:spTree>
     <p:extLst>
       <p:ext uri="{BB962C8B-B14F-4D97-AF65-F5344CB8AC3E}">
-        <p14:creationId xmlns:p14="http://schemas.microsoft.com/office/powerpoint/2010/main" val="893108741"/>
+        <p14:creationId xmlns:p14="http://schemas.microsoft.com/office/powerpoint/2010/main" val="2396269021"/>
       </p:ext>
     </p:extLst>
   </p:cSld>
@@ -26711,15 +27335,6 @@
 </file>
 
 <file path=customXml/item1.xml><?xml version="1.0" encoding="utf-8"?>
-<?mso-contentType ?>
-<FormTemplates xmlns="http://schemas.microsoft.com/sharepoint/v3/contenttype/forms">
-  <Display>DocumentLibraryForm</Display>
-  <Edit>DocumentLibraryForm</Edit>
-  <New>DocumentLibraryForm</New>
-</FormTemplates>
-</file>
-
-<file path=customXml/item2.xml><?xml version="1.0" encoding="utf-8"?>
 <ct:contentTypeSchema xmlns:ct="http://schemas.microsoft.com/office/2006/metadata/contentType" xmlns:ma="http://schemas.microsoft.com/office/2006/metadata/properties/metaAttributes" ct:_="" ma:_="" ma:contentTypeName="Document" ma:contentTypeID="0x0101003AB9CED55E8F8543BEFD54205924B97E" ma:contentTypeVersion="15" ma:contentTypeDescription="Create a new document." ma:contentTypeScope="" ma:versionID="7934cfc98febfa177962bc8a36be076c">
   <xsd:schema xmlns:xsd="http://www.w3.org/2001/XMLSchema" xmlns:xs="http://www.w3.org/2001/XMLSchema" xmlns:p="http://schemas.microsoft.com/office/2006/metadata/properties" xmlns:ns2="4f0d45a2-344c-4fe0-9811-4277bf2c2e17" xmlns:ns3="bb13cd20-357b-48a5-aff4-3bb4b52aae3e" targetNamespace="http://schemas.microsoft.com/office/2006/metadata/properties" ma:root="true" ma:fieldsID="aa190bc864bcebc737c679dbb323a16d" ns2:_="" ns3:_="">
     <xsd:import namespace="4f0d45a2-344c-4fe0-9811-4277bf2c2e17"/>
@@ -26956,6 +27571,15 @@
 </ct:contentTypeSchema>
 </file>
 
+<file path=customXml/item2.xml><?xml version="1.0" encoding="utf-8"?>
+<?mso-contentType ?>
+<FormTemplates xmlns="http://schemas.microsoft.com/sharepoint/v3/contenttype/forms">
+  <Display>DocumentLibraryForm</Display>
+  <Edit>DocumentLibraryForm</Edit>
+  <New>DocumentLibraryForm</New>
+</FormTemplates>
+</file>
+
 <file path=customXml/item3.xml><?xml version="1.0" encoding="utf-8"?>
 <p:properties xmlns:p="http://schemas.microsoft.com/office/2006/metadata/properties" xmlns:xsi="http://www.w3.org/2001/XMLSchema-instance" xmlns:pc="http://schemas.microsoft.com/office/infopath/2007/PartnerControls">
   <documentManagement>
@@ -26969,14 +27593,6 @@
 </file>
 
 <file path=customXml/itemProps1.xml><?xml version="1.0" encoding="utf-8"?>
-<ds:datastoreItem xmlns:ds="http://schemas.openxmlformats.org/officeDocument/2006/customXml" ds:itemID="{83441F37-C10B-49C7-9131-D813AD6E9480}">
-  <ds:schemaRefs>
-    <ds:schemaRef ds:uri="http://schemas.microsoft.com/sharepoint/v3/contenttype/forms"/>
-  </ds:schemaRefs>
-</ds:datastoreItem>
-</file>
-
-<file path=customXml/itemProps2.xml><?xml version="1.0" encoding="utf-8"?>
 <ds:datastoreItem xmlns:ds="http://schemas.openxmlformats.org/officeDocument/2006/customXml" ds:itemID="{40F892F8-B153-4A37-BD5F-A2BAB7375010}">
   <ds:schemaRefs>
     <ds:schemaRef ds:uri="http://schemas.microsoft.com/office/2006/metadata/contentType"/>
@@ -26991,6 +27607,14 @@
     <ds:schemaRef ds:uri="http://purl.org/dc/elements/1.1/"/>
     <ds:schemaRef ds:uri="http://purl.org/dc/terms/"/>
     <ds:schemaRef ds:uri="http://schemas.microsoft.com/internal/obd"/>
+  </ds:schemaRefs>
+</ds:datastoreItem>
+</file>
+
+<file path=customXml/itemProps2.xml><?xml version="1.0" encoding="utf-8"?>
+<ds:datastoreItem xmlns:ds="http://schemas.openxmlformats.org/officeDocument/2006/customXml" ds:itemID="{83441F37-C10B-49C7-9131-D813AD6E9480}">
+  <ds:schemaRefs>
+    <ds:schemaRef ds:uri="http://schemas.microsoft.com/sharepoint/v3/contenttype/forms"/>
   </ds:schemaRefs>
 </ds:datastoreItem>
 </file>

</xml_diff>

<commit_message>
Project Timeline and Schedule F
</commit_message>
<xml_diff>
--- a/Aplikacja Sports Joiner.pptx
+++ b/Aplikacja Sports Joiner.pptx
@@ -4788,7 +4788,7 @@
             <a:pPr rtl="0"/>
             <a:fld id="{DAB64803-BE99-4D11-92FE-DB0D80E992EC}" type="datetime1">
               <a:rPr lang="pl-PL" smtClean="0"/>
-              <a:t>06.11.2024</a:t>
+              <a:t>10.11.2024</a:t>
             </a:fld>
             <a:endParaRPr lang="pl-PL" dirty="0"/>
           </a:p>
@@ -4969,7 +4969,7 @@
             <a:fld id="{DB090C74-F23A-4A01-B61B-B7FE422EF232}" type="datetime1">
               <a:rPr lang="pl-PL" smtClean="0"/>
               <a:pPr/>
-              <a:t>06.11.2024</a:t>
+              <a:t>10.11.2024</a:t>
             </a:fld>
             <a:endParaRPr lang="pl-PL" dirty="0"/>
           </a:p>
@@ -26139,7 +26139,7 @@
           <p:nvPr>
             <p:extLst>
               <p:ext uri="{D42A27DB-BD31-4B8C-83A1-F6EECF244321}">
-                <p14:modId xmlns:p14="http://schemas.microsoft.com/office/powerpoint/2010/main" val="2311515000"/>
+                <p14:modId xmlns:p14="http://schemas.microsoft.com/office/powerpoint/2010/main" val="3382515911"/>
               </p:ext>
             </p:extLst>
           </p:nvPr>
@@ -26363,8 +26363,8 @@
                     <a:lstStyle/>
                     <a:p>
                       <a:pPr marL="285750" indent="-285750" algn="ctr">
-                        <a:buFont typeface="Arial" panose="020B0604020202020204" pitchFamily="34" charset="0"/>
-                        <a:buChar char="•"/>
+                        <a:buFont typeface="Wingdings" panose="05000000000000000000" pitchFamily="2" charset="2"/>
+                        <a:buChar char="Ø"/>
                       </a:pPr>
                       <a:r>
                         <a:rPr lang="pl-PL" sz="1600" dirty="0"/>
@@ -26373,8 +26373,8 @@
                     </a:p>
                     <a:p>
                       <a:pPr marL="285750" indent="-285750" algn="ctr">
-                        <a:buFont typeface="Arial" panose="020B0604020202020204" pitchFamily="34" charset="0"/>
-                        <a:buChar char="•"/>
+                        <a:buFont typeface="Wingdings" panose="05000000000000000000" pitchFamily="2" charset="2"/>
+                        <a:buChar char="Ø"/>
                       </a:pPr>
                       <a:r>
                         <a:rPr lang="pl-PL" sz="1600" dirty="0"/>
@@ -26390,8 +26390,8 @@
                     <a:lstStyle/>
                     <a:p>
                       <a:pPr marL="285750" indent="-285750" algn="ctr">
-                        <a:buFont typeface="Arial" panose="020B0604020202020204" pitchFamily="34" charset="0"/>
-                        <a:buChar char="•"/>
+                        <a:buFont typeface="Wingdings" panose="05000000000000000000" pitchFamily="2" charset="2"/>
+                        <a:buChar char="Ø"/>
                       </a:pPr>
                       <a:r>
                         <a:rPr lang="pl-PL" sz="1600" dirty="0"/>
@@ -26407,8 +26407,8 @@
                     <a:lstStyle/>
                     <a:p>
                       <a:pPr marL="285750" indent="-285750" algn="ctr">
-                        <a:buFont typeface="Arial" panose="020B0604020202020204" pitchFamily="34" charset="0"/>
-                        <a:buChar char="•"/>
+                        <a:buFont typeface="Wingdings" panose="05000000000000000000" pitchFamily="2" charset="2"/>
+                        <a:buChar char="Ø"/>
                       </a:pPr>
                       <a:r>
                         <a:rPr lang="pl-PL" sz="1600" dirty="0"/>
@@ -26417,8 +26417,8 @@
                     </a:p>
                     <a:p>
                       <a:pPr marL="285750" indent="-285750" algn="ctr">
-                        <a:buFont typeface="Arial" panose="020B0604020202020204" pitchFamily="34" charset="0"/>
-                        <a:buChar char="•"/>
+                        <a:buFont typeface="Wingdings" panose="05000000000000000000" pitchFamily="2" charset="2"/>
+                        <a:buChar char="Ø"/>
                       </a:pPr>
                       <a:r>
                         <a:rPr lang="pl-PL" sz="1600" dirty="0"/>
@@ -26434,8 +26434,8 @@
                     <a:lstStyle/>
                     <a:p>
                       <a:pPr marL="285750" indent="-285750" algn="ctr">
-                        <a:buFont typeface="Arial" panose="020B0604020202020204" pitchFamily="34" charset="0"/>
-                        <a:buChar char="•"/>
+                        <a:buFont typeface="Wingdings" panose="05000000000000000000" pitchFamily="2" charset="2"/>
+                        <a:buChar char="Ø"/>
                       </a:pPr>
                       <a:r>
                         <a:rPr lang="pl-PL" sz="1600" dirty="0"/>
@@ -26444,8 +26444,8 @@
                     </a:p>
                     <a:p>
                       <a:pPr marL="285750" indent="-285750" algn="ctr">
-                        <a:buFont typeface="Arial" panose="020B0604020202020204" pitchFamily="34" charset="0"/>
-                        <a:buChar char="•"/>
+                        <a:buFont typeface="Wingdings" panose="05000000000000000000" pitchFamily="2" charset="2"/>
+                        <a:buChar char="Ø"/>
                       </a:pPr>
                       <a:r>
                         <a:rPr lang="pl-PL" sz="1600" dirty="0"/>
@@ -26482,7 +26482,10 @@
                     <a:lstStyle/>
                     <a:p>
                       <a:pPr algn="ctr"/>
-                      <a:endParaRPr lang="pl-PL" dirty="0"/>
+                      <a:r>
+                        <a:rPr lang="pl-PL" dirty="0"/>
+                        <a:t>-</a:t>
+                      </a:r>
                     </a:p>
                   </a:txBody>
                   <a:tcPr anchor="ctr"/>
@@ -26493,7 +26496,10 @@
                     <a:lstStyle/>
                     <a:p>
                       <a:pPr algn="ctr"/>
-                      <a:endParaRPr lang="pl-PL" dirty="0"/>
+                      <a:r>
+                        <a:rPr lang="pl-PL" dirty="0"/>
+                        <a:t>-</a:t>
+                      </a:r>
                     </a:p>
                   </a:txBody>
                   <a:tcPr anchor="ctr"/>
@@ -26504,7 +26510,10 @@
                     <a:lstStyle/>
                     <a:p>
                       <a:pPr algn="ctr"/>
-                      <a:endParaRPr lang="pl-PL" dirty="0"/>
+                      <a:r>
+                        <a:rPr lang="pl-PL" dirty="0"/>
+                        <a:t>Oczekiwanie na gotową aplikację</a:t>
+                      </a:r>
                     </a:p>
                   </a:txBody>
                   <a:tcPr anchor="ctr"/>
@@ -26515,7 +26524,10 @@
                     <a:lstStyle/>
                     <a:p>
                       <a:pPr algn="ctr"/>
-                      <a:endParaRPr lang="pl-PL" dirty="0"/>
+                      <a:r>
+                        <a:rPr lang="pl-PL" dirty="0"/>
+                        <a:t>Oczekiwanie na zakończone powodzeniem testy</a:t>
+                      </a:r>
                     </a:p>
                   </a:txBody>
                   <a:tcPr anchor="ctr"/>
@@ -27335,6 +27347,15 @@
 </file>
 
 <file path=customXml/item1.xml><?xml version="1.0" encoding="utf-8"?>
+<?mso-contentType ?>
+<FormTemplates xmlns="http://schemas.microsoft.com/sharepoint/v3/contenttype/forms">
+  <Display>DocumentLibraryForm</Display>
+  <Edit>DocumentLibraryForm</Edit>
+  <New>DocumentLibraryForm</New>
+</FormTemplates>
+</file>
+
+<file path=customXml/item2.xml><?xml version="1.0" encoding="utf-8"?>
 <ct:contentTypeSchema xmlns:ct="http://schemas.microsoft.com/office/2006/metadata/contentType" xmlns:ma="http://schemas.microsoft.com/office/2006/metadata/properties/metaAttributes" ct:_="" ma:_="" ma:contentTypeName="Document" ma:contentTypeID="0x0101003AB9CED55E8F8543BEFD54205924B97E" ma:contentTypeVersion="15" ma:contentTypeDescription="Create a new document." ma:contentTypeScope="" ma:versionID="7934cfc98febfa177962bc8a36be076c">
   <xsd:schema xmlns:xsd="http://www.w3.org/2001/XMLSchema" xmlns:xs="http://www.w3.org/2001/XMLSchema" xmlns:p="http://schemas.microsoft.com/office/2006/metadata/properties" xmlns:ns2="4f0d45a2-344c-4fe0-9811-4277bf2c2e17" xmlns:ns3="bb13cd20-357b-48a5-aff4-3bb4b52aae3e" targetNamespace="http://schemas.microsoft.com/office/2006/metadata/properties" ma:root="true" ma:fieldsID="aa190bc864bcebc737c679dbb323a16d" ns2:_="" ns3:_="">
     <xsd:import namespace="4f0d45a2-344c-4fe0-9811-4277bf2c2e17"/>
@@ -27571,15 +27592,6 @@
 </ct:contentTypeSchema>
 </file>
 
-<file path=customXml/item2.xml><?xml version="1.0" encoding="utf-8"?>
-<?mso-contentType ?>
-<FormTemplates xmlns="http://schemas.microsoft.com/sharepoint/v3/contenttype/forms">
-  <Display>DocumentLibraryForm</Display>
-  <Edit>DocumentLibraryForm</Edit>
-  <New>DocumentLibraryForm</New>
-</FormTemplates>
-</file>
-
 <file path=customXml/item3.xml><?xml version="1.0" encoding="utf-8"?>
 <p:properties xmlns:p="http://schemas.microsoft.com/office/2006/metadata/properties" xmlns:xsi="http://www.w3.org/2001/XMLSchema-instance" xmlns:pc="http://schemas.microsoft.com/office/infopath/2007/PartnerControls">
   <documentManagement>
@@ -27593,6 +27605,14 @@
 </file>
 
 <file path=customXml/itemProps1.xml><?xml version="1.0" encoding="utf-8"?>
+<ds:datastoreItem xmlns:ds="http://schemas.openxmlformats.org/officeDocument/2006/customXml" ds:itemID="{83441F37-C10B-49C7-9131-D813AD6E9480}">
+  <ds:schemaRefs>
+    <ds:schemaRef ds:uri="http://schemas.microsoft.com/sharepoint/v3/contenttype/forms"/>
+  </ds:schemaRefs>
+</ds:datastoreItem>
+</file>
+
+<file path=customXml/itemProps2.xml><?xml version="1.0" encoding="utf-8"?>
 <ds:datastoreItem xmlns:ds="http://schemas.openxmlformats.org/officeDocument/2006/customXml" ds:itemID="{40F892F8-B153-4A37-BD5F-A2BAB7375010}">
   <ds:schemaRefs>
     <ds:schemaRef ds:uri="http://schemas.microsoft.com/office/2006/metadata/contentType"/>
@@ -27607,14 +27627,6 @@
     <ds:schemaRef ds:uri="http://purl.org/dc/elements/1.1/"/>
     <ds:schemaRef ds:uri="http://purl.org/dc/terms/"/>
     <ds:schemaRef ds:uri="http://schemas.microsoft.com/internal/obd"/>
-  </ds:schemaRefs>
-</ds:datastoreItem>
-</file>
-
-<file path=customXml/itemProps2.xml><?xml version="1.0" encoding="utf-8"?>
-<ds:datastoreItem xmlns:ds="http://schemas.openxmlformats.org/officeDocument/2006/customXml" ds:itemID="{83441F37-C10B-49C7-9131-D813AD6E9480}">
-  <ds:schemaRefs>
-    <ds:schemaRef ds:uri="http://schemas.microsoft.com/sharepoint/v3/contenttype/forms"/>
   </ds:schemaRefs>
 </ds:datastoreItem>
 </file>

</xml_diff>

<commit_message>
Functional and Non-Functional Requirements
</commit_message>
<xml_diff>
--- a/Aplikacja Sports Joiner.pptx
+++ b/Aplikacja Sports Joiner.pptx
@@ -5,10 +5,10 @@
     <p:sldMasterId id="2147483648" r:id="rId4"/>
   </p:sldMasterIdLst>
   <p:notesMasterIdLst>
-    <p:notesMasterId r:id="rId17"/>
+    <p:notesMasterId r:id="rId19"/>
   </p:notesMasterIdLst>
   <p:handoutMasterIdLst>
-    <p:handoutMasterId r:id="rId18"/>
+    <p:handoutMasterId r:id="rId20"/>
   </p:handoutMasterIdLst>
   <p:sldIdLst>
     <p:sldId id="258" r:id="rId5"/>
@@ -21,8 +21,10 @@
     <p:sldId id="289" r:id="rId12"/>
     <p:sldId id="290" r:id="rId13"/>
     <p:sldId id="288" r:id="rId14"/>
-    <p:sldId id="279" r:id="rId15"/>
-    <p:sldId id="274" r:id="rId16"/>
+    <p:sldId id="291" r:id="rId15"/>
+    <p:sldId id="292" r:id="rId16"/>
+    <p:sldId id="279" r:id="rId17"/>
+    <p:sldId id="274" r:id="rId18"/>
   </p:sldIdLst>
   <p:sldSz cx="12192000" cy="6858000"/>
   <p:notesSz cx="6858000" cy="9144000"/>
@@ -2089,8 +2091,8 @@
       </dsp:nvSpPr>
       <dsp:spPr>
         <a:xfrm>
-          <a:off x="0" y="486"/>
-          <a:ext cx="8283575" cy="0"/>
+          <a:off x="0" y="417"/>
+          <a:ext cx="8337517" cy="0"/>
         </a:xfrm>
         <a:prstGeom prst="line">
           <a:avLst/>
@@ -2139,8 +2141,8 @@
       </dsp:nvSpPr>
       <dsp:spPr>
         <a:xfrm>
-          <a:off x="0" y="486"/>
-          <a:ext cx="1651861" cy="797047"/>
+          <a:off x="0" y="417"/>
+          <a:ext cx="1662618" cy="683605"/>
         </a:xfrm>
         <a:prstGeom prst="rect">
           <a:avLst/>
@@ -2191,8 +2193,8 @@
         </a:p>
       </dsp:txBody>
       <dsp:txXfrm>
-        <a:off x="0" y="486"/>
-        <a:ext cx="1651861" cy="797047"/>
+        <a:off x="0" y="417"/>
+        <a:ext cx="1662618" cy="683605"/>
       </dsp:txXfrm>
     </dsp:sp>
     <dsp:sp modelId="{4586F0D8-A120-274B-BE51-856FCB4AC43F}">
@@ -2202,8 +2204,8 @@
       </dsp:nvSpPr>
       <dsp:spPr>
         <a:xfrm>
-          <a:off x="1778493" y="36680"/>
-          <a:ext cx="6505081" cy="723881"/>
+          <a:off x="1790075" y="31459"/>
+          <a:ext cx="6547441" cy="620852"/>
         </a:xfrm>
         <a:prstGeom prst="rect">
           <a:avLst/>
@@ -2254,8 +2256,8 @@
         </a:p>
       </dsp:txBody>
       <dsp:txXfrm>
-        <a:off x="1778493" y="36680"/>
-        <a:ext cx="6505081" cy="723881"/>
+        <a:off x="1790075" y="31459"/>
+        <a:ext cx="6547441" cy="620852"/>
       </dsp:txXfrm>
     </dsp:sp>
     <dsp:sp modelId="{D32907E9-4487-C641-A90B-8734AF86410A}">
@@ -2265,8 +2267,8 @@
       </dsp:nvSpPr>
       <dsp:spPr>
         <a:xfrm>
-          <a:off x="1643800" y="675416"/>
-          <a:ext cx="6607445" cy="0"/>
+          <a:off x="1654504" y="574161"/>
+          <a:ext cx="6650472" cy="0"/>
         </a:xfrm>
         <a:prstGeom prst="line">
           <a:avLst/>
@@ -2314,8 +2316,8 @@
       </dsp:nvSpPr>
       <dsp:spPr>
         <a:xfrm>
-          <a:off x="0" y="797534"/>
-          <a:ext cx="8283575" cy="0"/>
+          <a:off x="0" y="684022"/>
+          <a:ext cx="8337517" cy="0"/>
         </a:xfrm>
         <a:prstGeom prst="line">
           <a:avLst/>
@@ -2359,8 +2361,8 @@
       </dsp:nvSpPr>
       <dsp:spPr>
         <a:xfrm>
-          <a:off x="0" y="797534"/>
-          <a:ext cx="1645389" cy="797047"/>
+          <a:off x="0" y="684022"/>
+          <a:ext cx="1656104" cy="683605"/>
         </a:xfrm>
         <a:prstGeom prst="rect">
           <a:avLst/>
@@ -2411,8 +2413,8 @@
         </a:p>
       </dsp:txBody>
       <dsp:txXfrm>
-        <a:off x="0" y="797534"/>
-        <a:ext cx="1645389" cy="797047"/>
+        <a:off x="0" y="684022"/>
+        <a:ext cx="1656104" cy="683605"/>
       </dsp:txXfrm>
     </dsp:sp>
     <dsp:sp modelId="{40AD39FF-552E-3645-816F-DA192029EE94}">
@@ -2422,8 +2424,8 @@
       </dsp:nvSpPr>
       <dsp:spPr>
         <a:xfrm>
-          <a:off x="1771494" y="833728"/>
-          <a:ext cx="6512080" cy="723881"/>
+          <a:off x="1783030" y="715065"/>
+          <a:ext cx="6554486" cy="620852"/>
         </a:xfrm>
         <a:prstGeom prst="rect">
           <a:avLst/>
@@ -2474,8 +2476,8 @@
         </a:p>
       </dsp:txBody>
       <dsp:txXfrm>
-        <a:off x="1771494" y="833728"/>
-        <a:ext cx="6512080" cy="723881"/>
+        <a:off x="1783030" y="715065"/>
+        <a:ext cx="6554486" cy="620852"/>
       </dsp:txXfrm>
     </dsp:sp>
     <dsp:sp modelId="{3C32CEDB-4D51-DE42-A3D8-8AC9E88624F2}">
@@ -2485,8 +2487,8 @@
       </dsp:nvSpPr>
       <dsp:spPr>
         <a:xfrm>
-          <a:off x="1645389" y="1557610"/>
-          <a:ext cx="6581559" cy="0"/>
+          <a:off x="1656104" y="1335917"/>
+          <a:ext cx="6624417" cy="0"/>
         </a:xfrm>
         <a:prstGeom prst="line">
           <a:avLst/>
@@ -2534,8 +2536,8 @@
       </dsp:nvSpPr>
       <dsp:spPr>
         <a:xfrm>
-          <a:off x="0" y="1594582"/>
-          <a:ext cx="8283575" cy="0"/>
+          <a:off x="0" y="1367627"/>
+          <a:ext cx="8337517" cy="0"/>
         </a:xfrm>
         <a:prstGeom prst="line">
           <a:avLst/>
@@ -2579,8 +2581,8 @@
       </dsp:nvSpPr>
       <dsp:spPr>
         <a:xfrm>
-          <a:off x="0" y="1594582"/>
-          <a:ext cx="1655097" cy="797047"/>
+          <a:off x="0" y="1367627"/>
+          <a:ext cx="1665874" cy="683605"/>
         </a:xfrm>
         <a:prstGeom prst="rect">
           <a:avLst/>
@@ -2631,8 +2633,8 @@
         </a:p>
       </dsp:txBody>
       <dsp:txXfrm>
-        <a:off x="0" y="1594582"/>
-        <a:ext cx="1655097" cy="797047"/>
+        <a:off x="0" y="1367627"/>
+        <a:ext cx="1665874" cy="683605"/>
       </dsp:txXfrm>
     </dsp:sp>
     <dsp:sp modelId="{C5AD48B0-9931-9B4D-A60B-A844B7F448FC}">
@@ -2642,8 +2644,8 @@
       </dsp:nvSpPr>
       <dsp:spPr>
         <a:xfrm>
-          <a:off x="1779393" y="1630776"/>
-          <a:ext cx="6504181" cy="723881"/>
+          <a:off x="1790980" y="1398670"/>
+          <a:ext cx="6546536" cy="620852"/>
         </a:xfrm>
         <a:prstGeom prst="rect">
           <a:avLst/>
@@ -2698,8 +2700,8 @@
         </a:p>
       </dsp:txBody>
       <dsp:txXfrm>
-        <a:off x="1779393" y="1630776"/>
-        <a:ext cx="6504181" cy="723881"/>
+        <a:off x="1790980" y="1398670"/>
+        <a:ext cx="6546536" cy="620852"/>
       </dsp:txXfrm>
     </dsp:sp>
     <dsp:sp modelId="{1486AE56-865C-6E48-9D6E-6B6DFA851578}">
@@ -2709,8 +2711,8 @@
       </dsp:nvSpPr>
       <dsp:spPr>
         <a:xfrm>
-          <a:off x="1655097" y="2354658"/>
-          <a:ext cx="6620388" cy="0"/>
+          <a:off x="1665874" y="2019522"/>
+          <a:ext cx="6663499" cy="0"/>
         </a:xfrm>
         <a:prstGeom prst="line">
           <a:avLst/>
@@ -2758,8 +2760,8 @@
       </dsp:nvSpPr>
       <dsp:spPr>
         <a:xfrm>
-          <a:off x="0" y="2391630"/>
-          <a:ext cx="8283575" cy="0"/>
+          <a:off x="0" y="2051232"/>
+          <a:ext cx="8337517" cy="0"/>
         </a:xfrm>
         <a:prstGeom prst="line">
           <a:avLst/>
@@ -2803,8 +2805,8 @@
       </dsp:nvSpPr>
       <dsp:spPr>
         <a:xfrm>
-          <a:off x="0" y="2391630"/>
-          <a:ext cx="1868499" cy="797047"/>
+          <a:off x="0" y="2051232"/>
+          <a:ext cx="1880666" cy="683605"/>
         </a:xfrm>
         <a:prstGeom prst="rect">
           <a:avLst/>
@@ -2852,8 +2854,8 @@
         </a:p>
       </dsp:txBody>
       <dsp:txXfrm>
-        <a:off x="0" y="2391630"/>
-        <a:ext cx="1868499" cy="797047"/>
+        <a:off x="0" y="2051232"/>
+        <a:ext cx="1880666" cy="683605"/>
       </dsp:txXfrm>
     </dsp:sp>
     <dsp:sp modelId="{4249D1DC-A83D-314A-B537-01066820A2A2}">
@@ -2863,8 +2865,8 @@
       </dsp:nvSpPr>
       <dsp:spPr>
         <a:xfrm>
-          <a:off x="1981990" y="2412586"/>
-          <a:ext cx="6293587" cy="723881"/>
+          <a:off x="1994897" y="2069206"/>
+          <a:ext cx="6334570" cy="620852"/>
         </a:xfrm>
         <a:prstGeom prst="rect">
           <a:avLst/>
@@ -2915,8 +2917,8 @@
         </a:p>
       </dsp:txBody>
       <dsp:txXfrm>
-        <a:off x="1981990" y="2412586"/>
-        <a:ext cx="6293587" cy="723881"/>
+        <a:off x="1994897" y="2069206"/>
+        <a:ext cx="6334570" cy="620852"/>
       </dsp:txXfrm>
     </dsp:sp>
     <dsp:sp modelId="{0D57756D-529C-2140-A977-BD0E25A5CF9F}">
@@ -2926,8 +2928,8 @@
       </dsp:nvSpPr>
       <dsp:spPr>
         <a:xfrm>
-          <a:off x="1868499" y="3151706"/>
-          <a:ext cx="6348583" cy="0"/>
+          <a:off x="1880666" y="2703127"/>
+          <a:ext cx="6389925" cy="0"/>
         </a:xfrm>
         <a:prstGeom prst="line">
           <a:avLst/>
@@ -2975,8 +2977,8 @@
       </dsp:nvSpPr>
       <dsp:spPr>
         <a:xfrm>
-          <a:off x="0" y="3188678"/>
-          <a:ext cx="8283575" cy="0"/>
+          <a:off x="0" y="2734837"/>
+          <a:ext cx="8337517" cy="0"/>
         </a:xfrm>
         <a:prstGeom prst="line">
           <a:avLst/>
@@ -3020,8 +3022,8 @@
       </dsp:nvSpPr>
       <dsp:spPr>
         <a:xfrm>
-          <a:off x="0" y="3189165"/>
-          <a:ext cx="1604942" cy="797047"/>
+          <a:off x="0" y="2735254"/>
+          <a:ext cx="1615393" cy="683605"/>
         </a:xfrm>
         <a:prstGeom prst="rect">
           <a:avLst/>
@@ -3072,8 +3074,8 @@
         </a:p>
       </dsp:txBody>
       <dsp:txXfrm>
-        <a:off x="0" y="3189165"/>
-        <a:ext cx="1604942" cy="797047"/>
+        <a:off x="0" y="2735254"/>
+        <a:ext cx="1615393" cy="683605"/>
       </dsp:txXfrm>
     </dsp:sp>
     <dsp:sp modelId="{FDF61795-EF4F-DD4D-9159-4AAF6F881146}">
@@ -3083,8 +3085,8 @@
       </dsp:nvSpPr>
       <dsp:spPr>
         <a:xfrm>
-          <a:off x="1727852" y="3224872"/>
-          <a:ext cx="6555722" cy="723881"/>
+          <a:off x="1739104" y="2765880"/>
+          <a:ext cx="6598412" cy="620852"/>
         </a:xfrm>
         <a:prstGeom prst="rect">
           <a:avLst/>
@@ -3135,8 +3137,8 @@
         </a:p>
       </dsp:txBody>
       <dsp:txXfrm>
-        <a:off x="1727852" y="3224872"/>
-        <a:ext cx="6555722" cy="723881"/>
+        <a:off x="1739104" y="2765880"/>
+        <a:ext cx="6598412" cy="620852"/>
       </dsp:txXfrm>
     </dsp:sp>
     <dsp:sp modelId="{C75E1AE3-DD31-AD48-9D72-710374FAA08B}">
@@ -3146,8 +3148,8 @@
       </dsp:nvSpPr>
       <dsp:spPr>
         <a:xfrm>
-          <a:off x="1604942" y="3948753"/>
-          <a:ext cx="6419770" cy="0"/>
+          <a:off x="1615393" y="3386732"/>
+          <a:ext cx="6461575" cy="0"/>
         </a:xfrm>
         <a:prstGeom prst="line">
           <a:avLst/>
@@ -4788,7 +4790,7 @@
             <a:pPr rtl="0"/>
             <a:fld id="{DAB64803-BE99-4D11-92FE-DB0D80E992EC}" type="datetime1">
               <a:rPr lang="pl-PL" smtClean="0"/>
-              <a:t>10.11.2024</a:t>
+              <a:t>17.11.2024</a:t>
             </a:fld>
             <a:endParaRPr lang="pl-PL" dirty="0"/>
           </a:p>
@@ -4969,7 +4971,7 @@
             <a:fld id="{DB090C74-F23A-4A01-B61B-B7FE422EF232}" type="datetime1">
               <a:rPr lang="pl-PL" smtClean="0"/>
               <a:pPr/>
-              <a:t>10.11.2024</a:t>
+              <a:t>17.11.2024</a:t>
             </a:fld>
             <a:endParaRPr lang="pl-PL" dirty="0"/>
           </a:p>
@@ -5792,7 +5794,7 @@
             <a:pPr rtl="0"/>
             <a:fld id="{339D21CC-DD94-204E-93C8-E1AAF3084C8D}" type="slidenum">
               <a:rPr lang="pl-PL" smtClean="0"/>
-              <a:t>11</a:t>
+              <a:t>13</a:t>
             </a:fld>
             <a:endParaRPr lang="pl-PL"/>
           </a:p>
@@ -5886,7 +5888,7 @@
             <a:pPr rtl="0"/>
             <a:fld id="{339D21CC-DD94-204E-93C8-E1AAF3084C8D}" type="slidenum">
               <a:rPr lang="pl-PL" smtClean="0"/>
-              <a:t>12</a:t>
+              <a:t>14</a:t>
             </a:fld>
             <a:endParaRPr lang="pl-PL"/>
           </a:p>
@@ -23263,6 +23265,864 @@
 <file path=ppt/slides/slide11.xml><?xml version="1.0" encoding="utf-8"?>
 <p:sld xmlns:a="http://schemas.openxmlformats.org/drawingml/2006/main" xmlns:r="http://schemas.openxmlformats.org/officeDocument/2006/relationships" xmlns:p="http://schemas.openxmlformats.org/presentationml/2006/main">
   <p:cSld>
+    <p:spTree>
+      <p:nvGrpSpPr>
+        <p:cNvPr id="1" name=""/>
+        <p:cNvGrpSpPr/>
+        <p:nvPr/>
+      </p:nvGrpSpPr>
+      <p:grpSpPr>
+        <a:xfrm>
+          <a:off x="0" y="0"/>
+          <a:ext cx="0" cy="0"/>
+          <a:chOff x="0" y="0"/>
+          <a:chExt cx="0" cy="0"/>
+        </a:xfrm>
+      </p:grpSpPr>
+      <p:sp>
+        <p:nvSpPr>
+          <p:cNvPr id="14" name="Title 1">
+            <a:extLst>
+              <a:ext uri="{FF2B5EF4-FFF2-40B4-BE49-F238E27FC236}">
+                <a16:creationId xmlns:a16="http://schemas.microsoft.com/office/drawing/2014/main" id="{2803390F-A9AD-AE99-5F21-FE57ACBBF7D0}"/>
+              </a:ext>
+            </a:extLst>
+          </p:cNvPr>
+          <p:cNvSpPr>
+            <a:spLocks noGrp="1"/>
+          </p:cNvSpPr>
+          <p:nvPr>
+            <p:ph type="title"/>
+          </p:nvPr>
+        </p:nvSpPr>
+        <p:spPr>
+          <a:xfrm>
+            <a:off x="2597336" y="722376"/>
+            <a:ext cx="8870656" cy="764982"/>
+          </a:xfrm>
+        </p:spPr>
+        <p:txBody>
+          <a:bodyPr/>
+          <a:lstStyle/>
+          <a:p>
+            <a:r>
+              <a:rPr lang="pl-PL" sz="2800" dirty="0"/>
+              <a:t>Funkcjonalne i niefunkcjonalne wymagania</a:t>
+            </a:r>
+            <a:endParaRPr lang="en-US" sz="2800" dirty="0"/>
+          </a:p>
+        </p:txBody>
+      </p:sp>
+      <p:sp>
+        <p:nvSpPr>
+          <p:cNvPr id="18" name="Text Placeholder 3">
+            <a:extLst>
+              <a:ext uri="{FF2B5EF4-FFF2-40B4-BE49-F238E27FC236}">
+                <a16:creationId xmlns:a16="http://schemas.microsoft.com/office/drawing/2014/main" id="{0A167967-D984-B464-1DD7-54B43EDA6364}"/>
+              </a:ext>
+            </a:extLst>
+          </p:cNvPr>
+          <p:cNvSpPr>
+            <a:spLocks noGrp="1"/>
+          </p:cNvSpPr>
+          <p:nvPr>
+            <p:ph type="body" sz="quarter" idx="13"/>
+          </p:nvPr>
+        </p:nvSpPr>
+        <p:spPr>
+          <a:xfrm>
+            <a:off x="1815806" y="793971"/>
+            <a:ext cx="621792" cy="621792"/>
+          </a:xfrm>
+        </p:spPr>
+        <p:txBody>
+          <a:bodyPr/>
+          <a:lstStyle/>
+          <a:p>
+            <a:endParaRPr lang="en-US"/>
+          </a:p>
+        </p:txBody>
+      </p:sp>
+      <p:sp>
+        <p:nvSpPr>
+          <p:cNvPr id="5" name="Symbol zastępczy numeru slajdu 4">
+            <a:extLst>
+              <a:ext uri="{FF2B5EF4-FFF2-40B4-BE49-F238E27FC236}">
+                <a16:creationId xmlns:a16="http://schemas.microsoft.com/office/drawing/2014/main" id="{4173D998-E2FC-CD6C-22D9-5C45049D7FDD}"/>
+              </a:ext>
+            </a:extLst>
+          </p:cNvPr>
+          <p:cNvSpPr>
+            <a:spLocks noGrp="1"/>
+          </p:cNvSpPr>
+          <p:nvPr>
+            <p:ph type="sldNum" sz="quarter" idx="15"/>
+          </p:nvPr>
+        </p:nvSpPr>
+        <p:spPr>
+          <a:xfrm>
+            <a:off x="1651903" y="809244"/>
+            <a:ext cx="941832" cy="621792"/>
+          </a:xfrm>
+        </p:spPr>
+        <p:txBody>
+          <a:bodyPr anchor="ctr">
+            <a:normAutofit/>
+          </a:bodyPr>
+          <a:lstStyle/>
+          <a:p>
+            <a:pPr rtl="0">
+              <a:spcAft>
+                <a:spcPts val="600"/>
+              </a:spcAft>
+            </a:pPr>
+            <a:fld id="{CC43B8D3-9A08-F84C-9DD4-44948BA52D4B}" type="slidenum">
+              <a:rPr lang="pl-PL" noProof="0" smtClean="0"/>
+              <a:pPr rtl="0">
+                <a:spcAft>
+                  <a:spcPts val="600"/>
+                </a:spcAft>
+              </a:pPr>
+              <a:t>11</a:t>
+            </a:fld>
+            <a:endParaRPr lang="pl-PL" noProof="0"/>
+          </a:p>
+        </p:txBody>
+      </p:sp>
+      <p:sp>
+        <p:nvSpPr>
+          <p:cNvPr id="17" name="pole tekstowe 16">
+            <a:extLst>
+              <a:ext uri="{FF2B5EF4-FFF2-40B4-BE49-F238E27FC236}">
+                <a16:creationId xmlns:a16="http://schemas.microsoft.com/office/drawing/2014/main" id="{902D69E9-BFA9-3E13-2198-22140486FAA9}"/>
+              </a:ext>
+            </a:extLst>
+          </p:cNvPr>
+          <p:cNvSpPr txBox="1"/>
+          <p:nvPr/>
+        </p:nvSpPr>
+        <p:spPr>
+          <a:xfrm>
+            <a:off x="3101354" y="2418824"/>
+            <a:ext cx="3439544" cy="523220"/>
+          </a:xfrm>
+          <a:prstGeom prst="rect">
+            <a:avLst/>
+          </a:prstGeom>
+          <a:noFill/>
+        </p:spPr>
+        <p:txBody>
+          <a:bodyPr wrap="square" rtlCol="0">
+            <a:spAutoFit/>
+          </a:bodyPr>
+          <a:lstStyle/>
+          <a:p>
+            <a:pPr algn="ctr"/>
+            <a:r>
+              <a:rPr lang="pl-PL" sz="2800" b="1" dirty="0">
+                <a:solidFill>
+                  <a:schemeClr val="accent4"/>
+                </a:solidFill>
+              </a:rPr>
+              <a:t>Niefunkcjonalne</a:t>
+            </a:r>
+          </a:p>
+        </p:txBody>
+      </p:sp>
+      <p:sp>
+        <p:nvSpPr>
+          <p:cNvPr id="25" name="Symbol zastępczy zawartości 11">
+            <a:extLst>
+              <a:ext uri="{FF2B5EF4-FFF2-40B4-BE49-F238E27FC236}">
+                <a16:creationId xmlns:a16="http://schemas.microsoft.com/office/drawing/2014/main" id="{9ADE7CE2-C034-53D7-A723-F1A164371757}"/>
+              </a:ext>
+            </a:extLst>
+          </p:cNvPr>
+          <p:cNvSpPr txBox="1">
+            <a:spLocks/>
+          </p:cNvSpPr>
+          <p:nvPr/>
+        </p:nvSpPr>
+        <p:spPr>
+          <a:xfrm>
+            <a:off x="1112208" y="3429000"/>
+            <a:ext cx="7417837" cy="2528597"/>
+          </a:xfrm>
+          <a:prstGeom prst="rect">
+            <a:avLst/>
+          </a:prstGeom>
+        </p:spPr>
+        <p:txBody>
+          <a:bodyPr vert="horz" lIns="91440" tIns="45720" rIns="91440" bIns="45720" rtlCol="0">
+            <a:normAutofit/>
+          </a:bodyPr>
+          <a:lstStyle>
+            <a:defPPr>
+              <a:defRPr lang="pl-PL"/>
+            </a:defPPr>
+            <a:lvl1pPr marL="0" indent="0" algn="l" defTabSz="914400" rtl="0" eaLnBrk="1" latinLnBrk="0" hangingPunct="1">
+              <a:lnSpc>
+                <a:spcPct val="100000"/>
+              </a:lnSpc>
+              <a:spcBef>
+                <a:spcPts val="0"/>
+              </a:spcBef>
+              <a:buFont typeface="Arial" panose="020B0604020202020204" pitchFamily="34" charset="0"/>
+              <a:buNone/>
+              <a:defRPr lang="pl-PL" sz="1800" kern="1200">
+                <a:solidFill>
+                  <a:schemeClr val="tx1"/>
+                </a:solidFill>
+                <a:latin typeface="+mn-lt"/>
+                <a:ea typeface="+mn-ea"/>
+                <a:cs typeface="+mn-cs"/>
+              </a:defRPr>
+            </a:lvl1pPr>
+            <a:lvl2pPr marL="457200" indent="0" algn="l" defTabSz="914400" rtl="0" eaLnBrk="1" latinLnBrk="0" hangingPunct="1">
+              <a:lnSpc>
+                <a:spcPct val="90000"/>
+              </a:lnSpc>
+              <a:spcBef>
+                <a:spcPts val="500"/>
+              </a:spcBef>
+              <a:buFont typeface="Arial" panose="020B0604020202020204" pitchFamily="34" charset="0"/>
+              <a:buNone/>
+              <a:defRPr lang="pl-PL" sz="2000" kern="1200">
+                <a:solidFill>
+                  <a:schemeClr val="tx1">
+                    <a:tint val="75000"/>
+                  </a:schemeClr>
+                </a:solidFill>
+                <a:latin typeface="+mn-lt"/>
+                <a:ea typeface="+mn-ea"/>
+                <a:cs typeface="+mn-cs"/>
+              </a:defRPr>
+            </a:lvl2pPr>
+            <a:lvl3pPr marL="914400" indent="0" algn="l" defTabSz="914400" rtl="0" eaLnBrk="1" latinLnBrk="0" hangingPunct="1">
+              <a:lnSpc>
+                <a:spcPct val="90000"/>
+              </a:lnSpc>
+              <a:spcBef>
+                <a:spcPts val="500"/>
+              </a:spcBef>
+              <a:buFont typeface="Arial" panose="020B0604020202020204" pitchFamily="34" charset="0"/>
+              <a:buNone/>
+              <a:defRPr lang="pl-PL" sz="1800" kern="1200">
+                <a:solidFill>
+                  <a:schemeClr val="tx1">
+                    <a:tint val="75000"/>
+                  </a:schemeClr>
+                </a:solidFill>
+                <a:latin typeface="+mn-lt"/>
+                <a:ea typeface="+mn-ea"/>
+                <a:cs typeface="+mn-cs"/>
+              </a:defRPr>
+            </a:lvl3pPr>
+            <a:lvl4pPr marL="1371600" indent="0" algn="l" defTabSz="914400" rtl="0" eaLnBrk="1" latinLnBrk="0" hangingPunct="1">
+              <a:lnSpc>
+                <a:spcPct val="90000"/>
+              </a:lnSpc>
+              <a:spcBef>
+                <a:spcPts val="500"/>
+              </a:spcBef>
+              <a:buFont typeface="Arial" panose="020B0604020202020204" pitchFamily="34" charset="0"/>
+              <a:buNone/>
+              <a:defRPr lang="pl-PL" sz="1600" kern="1200">
+                <a:solidFill>
+                  <a:schemeClr val="tx1">
+                    <a:tint val="75000"/>
+                  </a:schemeClr>
+                </a:solidFill>
+                <a:latin typeface="+mn-lt"/>
+                <a:ea typeface="+mn-ea"/>
+                <a:cs typeface="+mn-cs"/>
+              </a:defRPr>
+            </a:lvl4pPr>
+            <a:lvl5pPr marL="1828800" indent="0" algn="l" defTabSz="914400" rtl="0" eaLnBrk="1" latinLnBrk="0" hangingPunct="1">
+              <a:lnSpc>
+                <a:spcPct val="90000"/>
+              </a:lnSpc>
+              <a:spcBef>
+                <a:spcPts val="500"/>
+              </a:spcBef>
+              <a:buFont typeface="Arial" panose="020B0604020202020204" pitchFamily="34" charset="0"/>
+              <a:buNone/>
+              <a:defRPr lang="pl-PL" sz="1600" kern="1200">
+                <a:solidFill>
+                  <a:schemeClr val="tx1">
+                    <a:tint val="75000"/>
+                  </a:schemeClr>
+                </a:solidFill>
+                <a:latin typeface="+mn-lt"/>
+                <a:ea typeface="+mn-ea"/>
+                <a:cs typeface="+mn-cs"/>
+              </a:defRPr>
+            </a:lvl5pPr>
+            <a:lvl6pPr marL="2286000" indent="0" algn="l" defTabSz="914400" rtl="0" eaLnBrk="1" latinLnBrk="0" hangingPunct="1">
+              <a:lnSpc>
+                <a:spcPct val="90000"/>
+              </a:lnSpc>
+              <a:spcBef>
+                <a:spcPts val="500"/>
+              </a:spcBef>
+              <a:buFont typeface="Arial" panose="020B0604020202020204" pitchFamily="34" charset="0"/>
+              <a:buNone/>
+              <a:defRPr lang="pl-PL" sz="1600" kern="1200">
+                <a:solidFill>
+                  <a:schemeClr val="tx1">
+                    <a:tint val="75000"/>
+                  </a:schemeClr>
+                </a:solidFill>
+                <a:latin typeface="+mn-lt"/>
+                <a:ea typeface="+mn-ea"/>
+                <a:cs typeface="+mn-cs"/>
+              </a:defRPr>
+            </a:lvl6pPr>
+            <a:lvl7pPr marL="2743200" indent="0" algn="l" defTabSz="914400" rtl="0" eaLnBrk="1" latinLnBrk="0" hangingPunct="1">
+              <a:lnSpc>
+                <a:spcPct val="90000"/>
+              </a:lnSpc>
+              <a:spcBef>
+                <a:spcPts val="500"/>
+              </a:spcBef>
+              <a:buFont typeface="Arial" panose="020B0604020202020204" pitchFamily="34" charset="0"/>
+              <a:buNone/>
+              <a:defRPr lang="pl-PL" sz="1600" kern="1200">
+                <a:solidFill>
+                  <a:schemeClr val="tx1">
+                    <a:tint val="75000"/>
+                  </a:schemeClr>
+                </a:solidFill>
+                <a:latin typeface="+mn-lt"/>
+                <a:ea typeface="+mn-ea"/>
+                <a:cs typeface="+mn-cs"/>
+              </a:defRPr>
+            </a:lvl7pPr>
+            <a:lvl8pPr marL="3200400" indent="0" algn="l" defTabSz="914400" rtl="0" eaLnBrk="1" latinLnBrk="0" hangingPunct="1">
+              <a:lnSpc>
+                <a:spcPct val="90000"/>
+              </a:lnSpc>
+              <a:spcBef>
+                <a:spcPts val="500"/>
+              </a:spcBef>
+              <a:buFont typeface="Arial" panose="020B0604020202020204" pitchFamily="34" charset="0"/>
+              <a:buNone/>
+              <a:defRPr lang="pl-PL" sz="1600" kern="1200">
+                <a:solidFill>
+                  <a:schemeClr val="tx1">
+                    <a:tint val="75000"/>
+                  </a:schemeClr>
+                </a:solidFill>
+                <a:latin typeface="+mn-lt"/>
+                <a:ea typeface="+mn-ea"/>
+                <a:cs typeface="+mn-cs"/>
+              </a:defRPr>
+            </a:lvl8pPr>
+            <a:lvl9pPr marL="3657600" indent="0" algn="l" defTabSz="914400" rtl="0" eaLnBrk="1" latinLnBrk="0" hangingPunct="1">
+              <a:lnSpc>
+                <a:spcPct val="90000"/>
+              </a:lnSpc>
+              <a:spcBef>
+                <a:spcPts val="500"/>
+              </a:spcBef>
+              <a:buFont typeface="Arial" panose="020B0604020202020204" pitchFamily="34" charset="0"/>
+              <a:buNone/>
+              <a:defRPr lang="pl-PL" sz="1600" kern="1200">
+                <a:solidFill>
+                  <a:schemeClr val="tx1">
+                    <a:tint val="75000"/>
+                  </a:schemeClr>
+                </a:solidFill>
+                <a:latin typeface="+mn-lt"/>
+                <a:ea typeface="+mn-ea"/>
+                <a:cs typeface="+mn-cs"/>
+              </a:defRPr>
+            </a:lvl9pPr>
+          </a:lstStyle>
+          <a:p>
+            <a:r>
+              <a:rPr lang="pl-PL" sz="1600" i="1" dirty="0"/>
+              <a:t>Bezpieczeństwo </a:t>
+            </a:r>
+            <a:r>
+              <a:rPr lang="pl-PL" sz="1600" dirty="0">
+                <a:latin typeface="Abadi" panose="020B0604020104020204" pitchFamily="34" charset="0"/>
+              </a:rPr>
+              <a:t>– dane użytkowników przechowywane w bazie danych powinny być ściśle chronione.</a:t>
+            </a:r>
+          </a:p>
+          <a:p>
+            <a:endParaRPr lang="pl-PL" sz="1400" dirty="0"/>
+          </a:p>
+          <a:p>
+            <a:r>
+              <a:rPr lang="pl-PL" sz="1600" i="1" dirty="0"/>
+              <a:t>Skalowalność </a:t>
+            </a:r>
+            <a:r>
+              <a:rPr lang="pl-PL" sz="1600" dirty="0">
+                <a:latin typeface="Abadi" panose="020B0604020104020204" pitchFamily="34" charset="0"/>
+              </a:rPr>
+              <a:t>– aplikacja wraz ze wzrostem liczby użytkowników powinna rozszerzać swoje działanie o nowe funkcjonalności, tj. zrzutki na rezerwację płatnych obiektów. Poza tym system powinien nie zwalniać przy wzroście liczby użytkowników co najmniej do 5 milionów.</a:t>
+            </a:r>
+          </a:p>
+          <a:p>
+            <a:endParaRPr lang="pl-PL" sz="1400" dirty="0"/>
+          </a:p>
+          <a:p>
+            <a:r>
+              <a:rPr lang="pl-PL" sz="1600" i="1" dirty="0"/>
+              <a:t>Szybkość i wydajność </a:t>
+            </a:r>
+            <a:r>
+              <a:rPr lang="pl-PL" sz="1600" dirty="0">
+                <a:latin typeface="Abadi" panose="020B0604020104020204" pitchFamily="34" charset="0"/>
+              </a:rPr>
+              <a:t>– aplikacja musi szybko reagować, zapewniając płynne przeglądanie, wyszukiwanie i tworzenie wydarzeń.</a:t>
+            </a:r>
+            <a:endParaRPr lang="pl-PL" sz="1400" dirty="0"/>
+          </a:p>
+          <a:p>
+            <a:endParaRPr lang="pl-PL" sz="1600" dirty="0"/>
+          </a:p>
+        </p:txBody>
+      </p:sp>
+    </p:spTree>
+    <p:extLst>
+      <p:ext uri="{BB962C8B-B14F-4D97-AF65-F5344CB8AC3E}">
+        <p14:creationId xmlns:p14="http://schemas.microsoft.com/office/powerpoint/2010/main" val="3819842574"/>
+      </p:ext>
+    </p:extLst>
+  </p:cSld>
+  <p:clrMapOvr>
+    <a:masterClrMapping/>
+  </p:clrMapOvr>
+</p:sld>
+</file>
+
+<file path=ppt/slides/slide12.xml><?xml version="1.0" encoding="utf-8"?>
+<p:sld xmlns:a="http://schemas.openxmlformats.org/drawingml/2006/main" xmlns:r="http://schemas.openxmlformats.org/officeDocument/2006/relationships" xmlns:p="http://schemas.openxmlformats.org/presentationml/2006/main">
+  <p:cSld>
+    <p:spTree>
+      <p:nvGrpSpPr>
+        <p:cNvPr id="1" name=""/>
+        <p:cNvGrpSpPr/>
+        <p:nvPr/>
+      </p:nvGrpSpPr>
+      <p:grpSpPr>
+        <a:xfrm>
+          <a:off x="0" y="0"/>
+          <a:ext cx="0" cy="0"/>
+          <a:chOff x="0" y="0"/>
+          <a:chExt cx="0" cy="0"/>
+        </a:xfrm>
+      </p:grpSpPr>
+      <p:sp>
+        <p:nvSpPr>
+          <p:cNvPr id="5" name="Symbol zastępczy numeru slajdu 4">
+            <a:extLst>
+              <a:ext uri="{FF2B5EF4-FFF2-40B4-BE49-F238E27FC236}">
+                <a16:creationId xmlns:a16="http://schemas.microsoft.com/office/drawing/2014/main" id="{6D8DA220-3A6D-8CE5-F21E-0E3B9E13DF24}"/>
+              </a:ext>
+            </a:extLst>
+          </p:cNvPr>
+          <p:cNvSpPr>
+            <a:spLocks noGrp="1"/>
+          </p:cNvSpPr>
+          <p:nvPr>
+            <p:ph type="sldNum" sz="quarter" idx="4294967295"/>
+          </p:nvPr>
+        </p:nvSpPr>
+        <p:spPr>
+          <a:xfrm>
+            <a:off x="0" y="809625"/>
+            <a:ext cx="941388" cy="620713"/>
+          </a:xfrm>
+        </p:spPr>
+        <p:txBody>
+          <a:bodyPr/>
+          <a:lstStyle/>
+          <a:p>
+            <a:pPr rtl="0"/>
+            <a:fld id="{CC43B8D3-9A08-F84C-9DD4-44948BA52D4B}" type="slidenum">
+              <a:rPr lang="pl-PL" noProof="0" smtClean="0"/>
+              <a:pPr rtl="0"/>
+              <a:t>12</a:t>
+            </a:fld>
+            <a:endParaRPr lang="pl-PL" noProof="0" dirty="0"/>
+          </a:p>
+        </p:txBody>
+      </p:sp>
+      <p:sp>
+        <p:nvSpPr>
+          <p:cNvPr id="15" name="pole tekstowe 14">
+            <a:extLst>
+              <a:ext uri="{FF2B5EF4-FFF2-40B4-BE49-F238E27FC236}">
+                <a16:creationId xmlns:a16="http://schemas.microsoft.com/office/drawing/2014/main" id="{6721F6E2-092F-E411-8C0C-DCDEF48450B0}"/>
+              </a:ext>
+            </a:extLst>
+          </p:cNvPr>
+          <p:cNvSpPr txBox="1"/>
+          <p:nvPr/>
+        </p:nvSpPr>
+        <p:spPr>
+          <a:xfrm>
+            <a:off x="3884707" y="473679"/>
+            <a:ext cx="2907978" cy="523220"/>
+          </a:xfrm>
+          <a:prstGeom prst="rect">
+            <a:avLst/>
+          </a:prstGeom>
+          <a:noFill/>
+        </p:spPr>
+        <p:txBody>
+          <a:bodyPr wrap="square" rtlCol="0">
+            <a:spAutoFit/>
+          </a:bodyPr>
+          <a:lstStyle/>
+          <a:p>
+            <a:pPr algn="ctr"/>
+            <a:r>
+              <a:rPr lang="pl-PL" sz="2800" b="1" dirty="0">
+                <a:solidFill>
+                  <a:srgbClr val="0070C0"/>
+                </a:solidFill>
+              </a:rPr>
+              <a:t>Funkcjonalne</a:t>
+            </a:r>
+          </a:p>
+        </p:txBody>
+      </p:sp>
+      <p:sp>
+        <p:nvSpPr>
+          <p:cNvPr id="16" name="Symbol zastępczy zawartości 11">
+            <a:extLst>
+              <a:ext uri="{FF2B5EF4-FFF2-40B4-BE49-F238E27FC236}">
+                <a16:creationId xmlns:a16="http://schemas.microsoft.com/office/drawing/2014/main" id="{D23F2E3F-5269-08B0-F48B-8797C7E64531}"/>
+              </a:ext>
+            </a:extLst>
+          </p:cNvPr>
+          <p:cNvSpPr txBox="1">
+            <a:spLocks/>
+          </p:cNvSpPr>
+          <p:nvPr/>
+        </p:nvSpPr>
+        <p:spPr>
+          <a:xfrm>
+            <a:off x="1047687" y="1260939"/>
+            <a:ext cx="8582018" cy="3986784"/>
+          </a:xfrm>
+          <a:prstGeom prst="rect">
+            <a:avLst/>
+          </a:prstGeom>
+        </p:spPr>
+        <p:txBody>
+          <a:bodyPr vert="horz" lIns="91440" tIns="45720" rIns="91440" bIns="45720" rtlCol="0">
+            <a:normAutofit/>
+          </a:bodyPr>
+          <a:lstStyle>
+            <a:defPPr>
+              <a:defRPr lang="pl-PL"/>
+            </a:defPPr>
+            <a:lvl1pPr marL="0" indent="0" algn="l" defTabSz="914400" rtl="0" eaLnBrk="1" latinLnBrk="0" hangingPunct="1">
+              <a:lnSpc>
+                <a:spcPct val="100000"/>
+              </a:lnSpc>
+              <a:spcBef>
+                <a:spcPts val="0"/>
+              </a:spcBef>
+              <a:buFont typeface="Arial" panose="020B0604020202020204" pitchFamily="34" charset="0"/>
+              <a:buNone/>
+              <a:defRPr lang="pl-PL" sz="1800" kern="1200">
+                <a:solidFill>
+                  <a:schemeClr val="tx1"/>
+                </a:solidFill>
+                <a:latin typeface="+mn-lt"/>
+                <a:ea typeface="+mn-ea"/>
+                <a:cs typeface="+mn-cs"/>
+              </a:defRPr>
+            </a:lvl1pPr>
+            <a:lvl2pPr marL="457200" indent="0" algn="l" defTabSz="914400" rtl="0" eaLnBrk="1" latinLnBrk="0" hangingPunct="1">
+              <a:lnSpc>
+                <a:spcPct val="90000"/>
+              </a:lnSpc>
+              <a:spcBef>
+                <a:spcPts val="500"/>
+              </a:spcBef>
+              <a:buFont typeface="Arial" panose="020B0604020202020204" pitchFamily="34" charset="0"/>
+              <a:buNone/>
+              <a:defRPr lang="pl-PL" sz="2000" kern="1200">
+                <a:solidFill>
+                  <a:schemeClr val="tx1">
+                    <a:tint val="75000"/>
+                  </a:schemeClr>
+                </a:solidFill>
+                <a:latin typeface="+mn-lt"/>
+                <a:ea typeface="+mn-ea"/>
+                <a:cs typeface="+mn-cs"/>
+              </a:defRPr>
+            </a:lvl2pPr>
+            <a:lvl3pPr marL="914400" indent="0" algn="l" defTabSz="914400" rtl="0" eaLnBrk="1" latinLnBrk="0" hangingPunct="1">
+              <a:lnSpc>
+                <a:spcPct val="90000"/>
+              </a:lnSpc>
+              <a:spcBef>
+                <a:spcPts val="500"/>
+              </a:spcBef>
+              <a:buFont typeface="Arial" panose="020B0604020202020204" pitchFamily="34" charset="0"/>
+              <a:buNone/>
+              <a:defRPr lang="pl-PL" sz="1800" kern="1200">
+                <a:solidFill>
+                  <a:schemeClr val="tx1">
+                    <a:tint val="75000"/>
+                  </a:schemeClr>
+                </a:solidFill>
+                <a:latin typeface="+mn-lt"/>
+                <a:ea typeface="+mn-ea"/>
+                <a:cs typeface="+mn-cs"/>
+              </a:defRPr>
+            </a:lvl3pPr>
+            <a:lvl4pPr marL="1371600" indent="0" algn="l" defTabSz="914400" rtl="0" eaLnBrk="1" latinLnBrk="0" hangingPunct="1">
+              <a:lnSpc>
+                <a:spcPct val="90000"/>
+              </a:lnSpc>
+              <a:spcBef>
+                <a:spcPts val="500"/>
+              </a:spcBef>
+              <a:buFont typeface="Arial" panose="020B0604020202020204" pitchFamily="34" charset="0"/>
+              <a:buNone/>
+              <a:defRPr lang="pl-PL" sz="1600" kern="1200">
+                <a:solidFill>
+                  <a:schemeClr val="tx1">
+                    <a:tint val="75000"/>
+                  </a:schemeClr>
+                </a:solidFill>
+                <a:latin typeface="+mn-lt"/>
+                <a:ea typeface="+mn-ea"/>
+                <a:cs typeface="+mn-cs"/>
+              </a:defRPr>
+            </a:lvl4pPr>
+            <a:lvl5pPr marL="1828800" indent="0" algn="l" defTabSz="914400" rtl="0" eaLnBrk="1" latinLnBrk="0" hangingPunct="1">
+              <a:lnSpc>
+                <a:spcPct val="90000"/>
+              </a:lnSpc>
+              <a:spcBef>
+                <a:spcPts val="500"/>
+              </a:spcBef>
+              <a:buFont typeface="Arial" panose="020B0604020202020204" pitchFamily="34" charset="0"/>
+              <a:buNone/>
+              <a:defRPr lang="pl-PL" sz="1600" kern="1200">
+                <a:solidFill>
+                  <a:schemeClr val="tx1">
+                    <a:tint val="75000"/>
+                  </a:schemeClr>
+                </a:solidFill>
+                <a:latin typeface="+mn-lt"/>
+                <a:ea typeface="+mn-ea"/>
+                <a:cs typeface="+mn-cs"/>
+              </a:defRPr>
+            </a:lvl5pPr>
+            <a:lvl6pPr marL="2286000" indent="0" algn="l" defTabSz="914400" rtl="0" eaLnBrk="1" latinLnBrk="0" hangingPunct="1">
+              <a:lnSpc>
+                <a:spcPct val="90000"/>
+              </a:lnSpc>
+              <a:spcBef>
+                <a:spcPts val="500"/>
+              </a:spcBef>
+              <a:buFont typeface="Arial" panose="020B0604020202020204" pitchFamily="34" charset="0"/>
+              <a:buNone/>
+              <a:defRPr lang="pl-PL" sz="1600" kern="1200">
+                <a:solidFill>
+                  <a:schemeClr val="tx1">
+                    <a:tint val="75000"/>
+                  </a:schemeClr>
+                </a:solidFill>
+                <a:latin typeface="+mn-lt"/>
+                <a:ea typeface="+mn-ea"/>
+                <a:cs typeface="+mn-cs"/>
+              </a:defRPr>
+            </a:lvl6pPr>
+            <a:lvl7pPr marL="2743200" indent="0" algn="l" defTabSz="914400" rtl="0" eaLnBrk="1" latinLnBrk="0" hangingPunct="1">
+              <a:lnSpc>
+                <a:spcPct val="90000"/>
+              </a:lnSpc>
+              <a:spcBef>
+                <a:spcPts val="500"/>
+              </a:spcBef>
+              <a:buFont typeface="Arial" panose="020B0604020202020204" pitchFamily="34" charset="0"/>
+              <a:buNone/>
+              <a:defRPr lang="pl-PL" sz="1600" kern="1200">
+                <a:solidFill>
+                  <a:schemeClr val="tx1">
+                    <a:tint val="75000"/>
+                  </a:schemeClr>
+                </a:solidFill>
+                <a:latin typeface="+mn-lt"/>
+                <a:ea typeface="+mn-ea"/>
+                <a:cs typeface="+mn-cs"/>
+              </a:defRPr>
+            </a:lvl7pPr>
+            <a:lvl8pPr marL="3200400" indent="0" algn="l" defTabSz="914400" rtl="0" eaLnBrk="1" latinLnBrk="0" hangingPunct="1">
+              <a:lnSpc>
+                <a:spcPct val="90000"/>
+              </a:lnSpc>
+              <a:spcBef>
+                <a:spcPts val="500"/>
+              </a:spcBef>
+              <a:buFont typeface="Arial" panose="020B0604020202020204" pitchFamily="34" charset="0"/>
+              <a:buNone/>
+              <a:defRPr lang="pl-PL" sz="1600" kern="1200">
+                <a:solidFill>
+                  <a:schemeClr val="tx1">
+                    <a:tint val="75000"/>
+                  </a:schemeClr>
+                </a:solidFill>
+                <a:latin typeface="+mn-lt"/>
+                <a:ea typeface="+mn-ea"/>
+                <a:cs typeface="+mn-cs"/>
+              </a:defRPr>
+            </a:lvl8pPr>
+            <a:lvl9pPr marL="3657600" indent="0" algn="l" defTabSz="914400" rtl="0" eaLnBrk="1" latinLnBrk="0" hangingPunct="1">
+              <a:lnSpc>
+                <a:spcPct val="90000"/>
+              </a:lnSpc>
+              <a:spcBef>
+                <a:spcPts val="500"/>
+              </a:spcBef>
+              <a:buFont typeface="Arial" panose="020B0604020202020204" pitchFamily="34" charset="0"/>
+              <a:buNone/>
+              <a:defRPr lang="pl-PL" sz="1600" kern="1200">
+                <a:solidFill>
+                  <a:schemeClr val="tx1">
+                    <a:tint val="75000"/>
+                  </a:schemeClr>
+                </a:solidFill>
+                <a:latin typeface="+mn-lt"/>
+                <a:ea typeface="+mn-ea"/>
+                <a:cs typeface="+mn-cs"/>
+              </a:defRPr>
+            </a:lvl9pPr>
+          </a:lstStyle>
+          <a:p>
+            <a:r>
+              <a:rPr lang="pl-PL" sz="1600" i="1" dirty="0"/>
+              <a:t>Tworzenie konta użytkownika </a:t>
+            </a:r>
+            <a:r>
+              <a:rPr lang="pl-PL" sz="1600" dirty="0">
+                <a:latin typeface="Abadi" panose="020B0604020104020204" pitchFamily="34" charset="0"/>
+              </a:rPr>
+              <a:t>– prosty panel rejestracyjny z podstawowymi informacjami w celu identyfikowania każdego z użytkowników.</a:t>
+            </a:r>
+          </a:p>
+          <a:p>
+            <a:endParaRPr lang="pl-PL" sz="1400" dirty="0"/>
+          </a:p>
+          <a:p>
+            <a:r>
+              <a:rPr lang="pl-PL" sz="1600" i="1" dirty="0"/>
+              <a:t>Tworzenie wydarzenia sportowego </a:t>
+            </a:r>
+            <a:r>
+              <a:rPr lang="pl-PL" sz="1600" dirty="0">
+                <a:latin typeface="Abadi" panose="020B0604020104020204" pitchFamily="34" charset="0"/>
+              </a:rPr>
+              <a:t>– każdy użytkownik może stworzyć otwarte wydarzenie sportowe.</a:t>
+            </a:r>
+          </a:p>
+          <a:p>
+            <a:endParaRPr lang="pl-PL" sz="1400" dirty="0"/>
+          </a:p>
+          <a:p>
+            <a:r>
+              <a:rPr lang="pl-PL" sz="1600" i="1" dirty="0"/>
+              <a:t>Dołączanie do wydarzenia sportowego </a:t>
+            </a:r>
+            <a:r>
+              <a:rPr lang="pl-PL" sz="1600" dirty="0">
+                <a:latin typeface="Abadi" panose="020B0604020104020204" pitchFamily="34" charset="0"/>
+              </a:rPr>
+              <a:t>– każdy użytkownik niebędący organizatorem wydarzenia może do takiego dołączyć oraz z niego zrezygnować.</a:t>
+            </a:r>
+          </a:p>
+          <a:p>
+            <a:endParaRPr lang="pl-PL" sz="1400" dirty="0"/>
+          </a:p>
+          <a:p>
+            <a:r>
+              <a:rPr lang="pl-PL" sz="1600" i="1" dirty="0"/>
+              <a:t>Edytowanie wydarzenia sportowego </a:t>
+            </a:r>
+            <a:r>
+              <a:rPr lang="pl-PL" sz="1600" dirty="0">
+                <a:latin typeface="Abadi" panose="020B0604020104020204" pitchFamily="34" charset="0"/>
+              </a:rPr>
+              <a:t>– każde wydarzenie może zostać edytowane przez organizatora.</a:t>
+            </a:r>
+            <a:endParaRPr lang="pl-PL" sz="1400" dirty="0">
+              <a:latin typeface="Abadi" panose="020B0604020104020204" pitchFamily="34" charset="0"/>
+            </a:endParaRPr>
+          </a:p>
+          <a:p>
+            <a:endParaRPr lang="pl-PL" sz="1400" dirty="0"/>
+          </a:p>
+          <a:p>
+            <a:r>
+              <a:rPr lang="pl-PL" sz="1600" i="1" dirty="0"/>
+              <a:t>Usuwanie wydarzenia sportowego </a:t>
+            </a:r>
+            <a:r>
+              <a:rPr lang="pl-PL" sz="1600" dirty="0">
+                <a:latin typeface="Abadi" panose="020B0604020104020204" pitchFamily="34" charset="0"/>
+              </a:rPr>
+              <a:t>– każde wydarzenie może zostać usunięte przez organizatora.</a:t>
+            </a:r>
+            <a:endParaRPr lang="pl-PL" sz="1400" dirty="0">
+              <a:latin typeface="Abadi" panose="020B0604020104020204" pitchFamily="34" charset="0"/>
+            </a:endParaRPr>
+          </a:p>
+          <a:p>
+            <a:endParaRPr lang="pl-PL" sz="1400" dirty="0"/>
+          </a:p>
+          <a:p>
+            <a:r>
+              <a:rPr lang="pl-PL" sz="1600" i="1" dirty="0"/>
+              <a:t>Edytowanie profilu </a:t>
+            </a:r>
+            <a:r>
+              <a:rPr lang="pl-PL" sz="1600" dirty="0">
+                <a:latin typeface="Abadi" panose="020B0604020104020204" pitchFamily="34" charset="0"/>
+              </a:rPr>
+              <a:t>– możliwość zmiany danych użytkownika oraz zdjęcia profilowego.</a:t>
+            </a:r>
+            <a:endParaRPr lang="pl-PL" sz="1400" dirty="0">
+              <a:latin typeface="Abadi" panose="020B0604020104020204" pitchFamily="34" charset="0"/>
+            </a:endParaRPr>
+          </a:p>
+          <a:p>
+            <a:endParaRPr lang="pl-PL" sz="1400" dirty="0"/>
+          </a:p>
+          <a:p>
+            <a:endParaRPr lang="pl-PL" sz="1600" dirty="0"/>
+          </a:p>
+        </p:txBody>
+      </p:sp>
+    </p:spTree>
+    <p:extLst>
+      <p:ext uri="{BB962C8B-B14F-4D97-AF65-F5344CB8AC3E}">
+        <p14:creationId xmlns:p14="http://schemas.microsoft.com/office/powerpoint/2010/main" val="99352321"/>
+      </p:ext>
+    </p:extLst>
+  </p:cSld>
+  <p:clrMapOvr>
+    <a:masterClrMapping/>
+  </p:clrMapOvr>
+</p:sld>
+</file>
+
+<file path=ppt/slides/slide13.xml><?xml version="1.0" encoding="utf-8"?>
+<p:sld xmlns:a="http://schemas.openxmlformats.org/drawingml/2006/main" xmlns:r="http://schemas.openxmlformats.org/officeDocument/2006/relationships" xmlns:p="http://schemas.openxmlformats.org/presentationml/2006/main">
+  <p:cSld>
     <p:bg>
       <p:bgPr>
         <a:solidFill>
@@ -23462,7 +24322,7 @@
 </p:sld>
 </file>
 
-<file path=ppt/slides/slide12.xml><?xml version="1.0" encoding="utf-8"?>
+<file path=ppt/slides/slide14.xml><?xml version="1.0" encoding="utf-8"?>
 <p:sld xmlns:a="http://schemas.openxmlformats.org/drawingml/2006/main" xmlns:r="http://schemas.openxmlformats.org/officeDocument/2006/relationships" xmlns:p="http://schemas.openxmlformats.org/presentationml/2006/main">
   <p:cSld>
     <p:bg>
@@ -24626,14 +25486,14 @@
             <p:ph idx="1"/>
             <p:extLst>
               <p:ext uri="{D42A27DB-BD31-4B8C-83A1-F6EECF244321}">
-                <p14:modId xmlns:p14="http://schemas.microsoft.com/office/powerpoint/2010/main" val="2359752038"/>
+                <p14:modId xmlns:p14="http://schemas.microsoft.com/office/powerpoint/2010/main" val="919415620"/>
               </p:ext>
             </p:extLst>
           </p:nvPr>
         </p:nvGraphicFramePr>
         <p:xfrm>
-          <a:off x="731838" y="2222500"/>
-          <a:ext cx="8283575" cy="3986213"/>
+          <a:off x="535895" y="3265715"/>
+          <a:ext cx="8337517" cy="3418860"/>
         </p:xfrm>
         <a:graphic>
           <a:graphicData uri="http://schemas.openxmlformats.org/drawingml/2006/diagram">
@@ -24715,8 +25575,8 @@
         </p:nvSpPr>
         <p:spPr>
           <a:xfrm>
-            <a:off x="731838" y="4829145"/>
-            <a:ext cx="1526170" cy="400110"/>
+            <a:off x="507415" y="5463626"/>
+            <a:ext cx="1213364" cy="400110"/>
           </a:xfrm>
           <a:prstGeom prst="rect">
             <a:avLst/>
@@ -24750,8 +25610,8 @@
         </p:nvSpPr>
         <p:spPr>
           <a:xfrm>
-            <a:off x="1114097" y="1797269"/>
-            <a:ext cx="8187558" cy="369332"/>
+            <a:off x="946441" y="1844711"/>
+            <a:ext cx="7516423" cy="1200329"/>
           </a:xfrm>
           <a:prstGeom prst="rect">
             <a:avLst/>
@@ -24766,7 +25626,7 @@
           <a:p>
             <a:r>
               <a:rPr lang="pl-PL" dirty="0"/>
-              <a:t>Notatka o tym, że dla każdego jest taka sama funkcjonalność</a:t>
+              <a:t>Aplikacja będzie przeznaczona dla każdego w jednakowej wersji. Zarówno funkcjonalności, jak i interfejs użytkownika będą dokładnie takie same. Poniżej wyszczególniłem korzyści dla każdej grupy wiekowej:</a:t>
             </a:r>
           </a:p>
         </p:txBody>
@@ -27347,15 +28207,6 @@
 </file>
 
 <file path=customXml/item1.xml><?xml version="1.0" encoding="utf-8"?>
-<?mso-contentType ?>
-<FormTemplates xmlns="http://schemas.microsoft.com/sharepoint/v3/contenttype/forms">
-  <Display>DocumentLibraryForm</Display>
-  <Edit>DocumentLibraryForm</Edit>
-  <New>DocumentLibraryForm</New>
-</FormTemplates>
-</file>
-
-<file path=customXml/item2.xml><?xml version="1.0" encoding="utf-8"?>
 <ct:contentTypeSchema xmlns:ct="http://schemas.microsoft.com/office/2006/metadata/contentType" xmlns:ma="http://schemas.microsoft.com/office/2006/metadata/properties/metaAttributes" ct:_="" ma:_="" ma:contentTypeName="Document" ma:contentTypeID="0x0101003AB9CED55E8F8543BEFD54205924B97E" ma:contentTypeVersion="15" ma:contentTypeDescription="Create a new document." ma:contentTypeScope="" ma:versionID="7934cfc98febfa177962bc8a36be076c">
   <xsd:schema xmlns:xsd="http://www.w3.org/2001/XMLSchema" xmlns:xs="http://www.w3.org/2001/XMLSchema" xmlns:p="http://schemas.microsoft.com/office/2006/metadata/properties" xmlns:ns2="4f0d45a2-344c-4fe0-9811-4277bf2c2e17" xmlns:ns3="bb13cd20-357b-48a5-aff4-3bb4b52aae3e" targetNamespace="http://schemas.microsoft.com/office/2006/metadata/properties" ma:root="true" ma:fieldsID="aa190bc864bcebc737c679dbb323a16d" ns2:_="" ns3:_="">
     <xsd:import namespace="4f0d45a2-344c-4fe0-9811-4277bf2c2e17"/>
@@ -27592,6 +28443,15 @@
 </ct:contentTypeSchema>
 </file>
 
+<file path=customXml/item2.xml><?xml version="1.0" encoding="utf-8"?>
+<?mso-contentType ?>
+<FormTemplates xmlns="http://schemas.microsoft.com/sharepoint/v3/contenttype/forms">
+  <Display>DocumentLibraryForm</Display>
+  <Edit>DocumentLibraryForm</Edit>
+  <New>DocumentLibraryForm</New>
+</FormTemplates>
+</file>
+
 <file path=customXml/item3.xml><?xml version="1.0" encoding="utf-8"?>
 <p:properties xmlns:p="http://schemas.microsoft.com/office/2006/metadata/properties" xmlns:xsi="http://www.w3.org/2001/XMLSchema-instance" xmlns:pc="http://schemas.microsoft.com/office/infopath/2007/PartnerControls">
   <documentManagement>
@@ -27605,14 +28465,6 @@
 </file>
 
 <file path=customXml/itemProps1.xml><?xml version="1.0" encoding="utf-8"?>
-<ds:datastoreItem xmlns:ds="http://schemas.openxmlformats.org/officeDocument/2006/customXml" ds:itemID="{83441F37-C10B-49C7-9131-D813AD6E9480}">
-  <ds:schemaRefs>
-    <ds:schemaRef ds:uri="http://schemas.microsoft.com/sharepoint/v3/contenttype/forms"/>
-  </ds:schemaRefs>
-</ds:datastoreItem>
-</file>
-
-<file path=customXml/itemProps2.xml><?xml version="1.0" encoding="utf-8"?>
 <ds:datastoreItem xmlns:ds="http://schemas.openxmlformats.org/officeDocument/2006/customXml" ds:itemID="{40F892F8-B153-4A37-BD5F-A2BAB7375010}">
   <ds:schemaRefs>
     <ds:schemaRef ds:uri="http://schemas.microsoft.com/office/2006/metadata/contentType"/>
@@ -27627,6 +28479,14 @@
     <ds:schemaRef ds:uri="http://purl.org/dc/elements/1.1/"/>
     <ds:schemaRef ds:uri="http://purl.org/dc/terms/"/>
     <ds:schemaRef ds:uri="http://schemas.microsoft.com/internal/obd"/>
+  </ds:schemaRefs>
+</ds:datastoreItem>
+</file>
+
+<file path=customXml/itemProps2.xml><?xml version="1.0" encoding="utf-8"?>
+<ds:datastoreItem xmlns:ds="http://schemas.openxmlformats.org/officeDocument/2006/customXml" ds:itemID="{83441F37-C10B-49C7-9131-D813AD6E9480}">
+  <ds:schemaRefs>
+    <ds:schemaRef ds:uri="http://schemas.microsoft.com/sharepoint/v3/contenttype/forms"/>
   </ds:schemaRefs>
 </ds:datastoreItem>
 </file>

</xml_diff>

<commit_message>
Makiety ramek i interfejsów użytkownika
</commit_message>
<xml_diff>
--- a/Aplikacja Sports Joiner.pptx
+++ b/Aplikacja Sports Joiner.pptx
@@ -5,10 +5,10 @@
     <p:sldMasterId id="2147483648" r:id="rId4"/>
   </p:sldMasterIdLst>
   <p:notesMasterIdLst>
-    <p:notesMasterId r:id="rId19"/>
+    <p:notesMasterId r:id="rId26"/>
   </p:notesMasterIdLst>
   <p:handoutMasterIdLst>
-    <p:handoutMasterId r:id="rId20"/>
+    <p:handoutMasterId r:id="rId27"/>
   </p:handoutMasterIdLst>
   <p:sldIdLst>
     <p:sldId id="258" r:id="rId5"/>
@@ -23,8 +23,15 @@
     <p:sldId id="288" r:id="rId14"/>
     <p:sldId id="291" r:id="rId15"/>
     <p:sldId id="292" r:id="rId16"/>
-    <p:sldId id="279" r:id="rId17"/>
-    <p:sldId id="274" r:id="rId18"/>
+    <p:sldId id="301" r:id="rId17"/>
+    <p:sldId id="300" r:id="rId18"/>
+    <p:sldId id="295" r:id="rId19"/>
+    <p:sldId id="296" r:id="rId20"/>
+    <p:sldId id="297" r:id="rId21"/>
+    <p:sldId id="298" r:id="rId22"/>
+    <p:sldId id="299" r:id="rId23"/>
+    <p:sldId id="279" r:id="rId24"/>
+    <p:sldId id="274" r:id="rId25"/>
   </p:sldIdLst>
   <p:sldSz cx="12192000" cy="6858000"/>
   <p:notesSz cx="6858000" cy="9144000"/>
@@ -4790,7 +4797,7 @@
             <a:pPr rtl="0"/>
             <a:fld id="{DAB64803-BE99-4D11-92FE-DB0D80E992EC}" type="datetime1">
               <a:rPr lang="pl-PL" smtClean="0"/>
-              <a:t>17.11.2024</a:t>
+              <a:t>19.11.2024</a:t>
             </a:fld>
             <a:endParaRPr lang="pl-PL" dirty="0"/>
           </a:p>
@@ -4971,7 +4978,7 @@
             <a:fld id="{DB090C74-F23A-4A01-B61B-B7FE422EF232}" type="datetime1">
               <a:rPr lang="pl-PL" smtClean="0"/>
               <a:pPr/>
-              <a:t>17.11.2024</a:t>
+              <a:t>19.11.2024</a:t>
             </a:fld>
             <a:endParaRPr lang="pl-PL" dirty="0"/>
           </a:p>
@@ -5794,7 +5801,7 @@
             <a:pPr rtl="0"/>
             <a:fld id="{339D21CC-DD94-204E-93C8-E1AAF3084C8D}" type="slidenum">
               <a:rPr lang="pl-PL" smtClean="0"/>
-              <a:t>13</a:t>
+              <a:t>20</a:t>
             </a:fld>
             <a:endParaRPr lang="pl-PL"/>
           </a:p>
@@ -5888,7 +5895,7 @@
             <a:pPr rtl="0"/>
             <a:fld id="{339D21CC-DD94-204E-93C8-E1AAF3084C8D}" type="slidenum">
               <a:rPr lang="pl-PL" smtClean="0"/>
-              <a:t>14</a:t>
+              <a:t>21</a:t>
             </a:fld>
             <a:endParaRPr lang="pl-PL"/>
           </a:p>
@@ -24123,14 +24130,6 @@
 <file path=ppt/slides/slide13.xml><?xml version="1.0" encoding="utf-8"?>
 <p:sld xmlns:a="http://schemas.openxmlformats.org/drawingml/2006/main" xmlns:r="http://schemas.openxmlformats.org/officeDocument/2006/relationships" xmlns:p="http://schemas.openxmlformats.org/presentationml/2006/main">
   <p:cSld>
-    <p:bg>
-      <p:bgPr>
-        <a:solidFill>
-          <a:schemeClr val="bg2"/>
-        </a:solidFill>
-        <a:effectLst/>
-      </p:bgPr>
-    </p:bg>
     <p:spTree>
       <p:nvGrpSpPr>
         <p:cNvPr id="1" name=""/>
@@ -24147,10 +24146,10 @@
       </p:grpSpPr>
       <p:sp>
         <p:nvSpPr>
-          <p:cNvPr id="13" name="Tytuł 12">
-            <a:extLst>
-              <a:ext uri="{FF2B5EF4-FFF2-40B4-BE49-F238E27FC236}">
-                <a16:creationId xmlns:a16="http://schemas.microsoft.com/office/drawing/2014/main" id="{E729A509-992F-8C10-902D-182448B5A1AE}"/>
+          <p:cNvPr id="2" name="Tytuł 1">
+            <a:extLst>
+              <a:ext uri="{FF2B5EF4-FFF2-40B4-BE49-F238E27FC236}">
+                <a16:creationId xmlns:a16="http://schemas.microsoft.com/office/drawing/2014/main" id="{FFB6BEDA-0EEE-667F-5059-D5B75CC8D8B9}"/>
               </a:ext>
             </a:extLst>
           </p:cNvPr>
@@ -24161,150 +24160,19 @@
             <p:ph type="title"/>
           </p:nvPr>
         </p:nvSpPr>
-        <p:spPr/>
-        <p:txBody>
-          <a:bodyPr rtlCol="0"/>
-          <a:lstStyle>
-            <a:defPPr>
-              <a:defRPr lang="pl-PL"/>
-            </a:defPPr>
-          </a:lstStyle>
-          <a:p>
-            <a:pPr rtl="0"/>
+        <p:spPr>
+          <a:xfrm>
+            <a:off x="4431854" y="2052362"/>
+            <a:ext cx="6979486" cy="2762234"/>
+          </a:xfrm>
+        </p:spPr>
+        <p:txBody>
+          <a:bodyPr/>
+          <a:lstStyle/>
+          <a:p>
             <a:r>
-              <a:rPr lang="pl-PL" dirty="0"/>
-              <a:t>Podsumowanie</a:t>
-            </a:r>
-          </a:p>
-        </p:txBody>
-      </p:sp>
-      <p:sp>
-        <p:nvSpPr>
-          <p:cNvPr id="12" name="Zawartość — symbol zastępczy 11">
-            <a:extLst>
-              <a:ext uri="{FF2B5EF4-FFF2-40B4-BE49-F238E27FC236}">
-                <a16:creationId xmlns:a16="http://schemas.microsoft.com/office/drawing/2014/main" id="{84FA0F1E-A920-0194-981E-4B573643BB48}"/>
-              </a:ext>
-            </a:extLst>
-          </p:cNvPr>
-          <p:cNvSpPr>
-            <a:spLocks noGrp="1"/>
-          </p:cNvSpPr>
-          <p:nvPr>
-            <p:ph idx="1"/>
-          </p:nvPr>
-        </p:nvSpPr>
-        <p:spPr/>
-        <p:txBody>
-          <a:bodyPr rtlCol="0"/>
-          <a:lstStyle>
-            <a:defPPr>
-              <a:defRPr lang="pl-PL"/>
-            </a:defPPr>
-          </a:lstStyle>
-          <a:p>
-            <a:pPr rtl="0"/>
-            <a:r>
-              <a:rPr lang="pl-PL" dirty="0"/>
-              <a:t>Aplikacja „Sports </a:t>
-            </a:r>
-            <a:r>
-              <a:rPr lang="pl-PL" dirty="0" err="1"/>
-              <a:t>Joiner</a:t>
-            </a:r>
-            <a:r>
-              <a:rPr lang="pl-PL" dirty="0"/>
-              <a:t>” jest rewolucyjnym rozwiązaniem, mającym na celu poprawę zdrowia oraz zacieśniania więzi wśród wszystkich jej użytkowników. Głównym celem, przyświecającym tej idei technologicznej, jest pomoc w odnalezieniu chętnych do uprawiania tego samego sportu. Projekt ten jest także narzędziem dla osób, którym brakuje motywacji do poszerzania swoich możliwości ruchowych w pojedynkę.</a:t>
-            </a:r>
-          </a:p>
-          <a:p>
-            <a:pPr algn="l" rtl="0" fontAlgn="base"/>
-            <a:r>
-              <a:rPr lang="pl-PL" b="0" i="0" dirty="0">
-                <a:solidFill>
-                  <a:srgbClr val="000000"/>
-                </a:solidFill>
-                <a:effectLst/>
-                <a:latin typeface="Calibri" panose="020F0502020204030204" pitchFamily="34" charset="0"/>
-              </a:rPr>
-              <a:t>​</a:t>
-            </a:r>
-            <a:endParaRPr lang="pl-PL" b="0" i="0" dirty="0">
-              <a:solidFill>
-                <a:srgbClr val="000000"/>
-              </a:solidFill>
-              <a:effectLst/>
-              <a:latin typeface="Segoe UI" panose="020B0502040204020203" pitchFamily="34" charset="0"/>
-            </a:endParaRPr>
-          </a:p>
-          <a:p>
-            <a:pPr rtl="0"/>
-            <a:endParaRPr lang="pl-PL" b="1" dirty="0">
-              <a:latin typeface="Arial Black" panose="020B0604020202020204" pitchFamily="34" charset="0"/>
-              <a:cs typeface="Arial Black" panose="020B0604020202020204" pitchFamily="34" charset="0"/>
-            </a:endParaRPr>
-          </a:p>
-        </p:txBody>
-      </p:sp>
-      <p:sp>
-        <p:nvSpPr>
-          <p:cNvPr id="19" name="Tekst — symbol zastępczy 18">
-            <a:extLst>
-              <a:ext uri="{FF2B5EF4-FFF2-40B4-BE49-F238E27FC236}">
-                <a16:creationId xmlns:a16="http://schemas.microsoft.com/office/drawing/2014/main" id="{1A502D19-C614-886C-4945-5880F36E0998}"/>
-              </a:ext>
-            </a:extLst>
-          </p:cNvPr>
-          <p:cNvSpPr>
-            <a:spLocks noGrp="1"/>
-          </p:cNvSpPr>
-          <p:nvPr>
-            <p:ph type="body" sz="quarter" idx="13"/>
-          </p:nvPr>
-        </p:nvSpPr>
-        <p:spPr/>
-        <p:txBody>
-          <a:bodyPr rtlCol="0"/>
-          <a:lstStyle>
-            <a:defPPr>
-              <a:defRPr lang="pl-PL"/>
-            </a:defPPr>
-          </a:lstStyle>
-          <a:p>
-            <a:pPr rtl="0"/>
-            <a:endParaRPr lang="pl-PL"/>
-          </a:p>
-        </p:txBody>
-      </p:sp>
-      <p:sp>
-        <p:nvSpPr>
-          <p:cNvPr id="17" name="Numer slajdu — symbol zastępczy 16">
-            <a:extLst>
-              <a:ext uri="{FF2B5EF4-FFF2-40B4-BE49-F238E27FC236}">
-                <a16:creationId xmlns:a16="http://schemas.microsoft.com/office/drawing/2014/main" id="{E46CC291-411B-349C-8657-ED39C084F877}"/>
-              </a:ext>
-            </a:extLst>
-          </p:cNvPr>
-          <p:cNvSpPr>
-            <a:spLocks noGrp="1"/>
-          </p:cNvSpPr>
-          <p:nvPr>
-            <p:ph type="sldNum" sz="quarter" idx="15"/>
-          </p:nvPr>
-        </p:nvSpPr>
-        <p:spPr/>
-        <p:txBody>
-          <a:bodyPr rtlCol="0"/>
-          <a:lstStyle>
-            <a:defPPr>
-              <a:defRPr lang="pl-PL"/>
-            </a:defPPr>
-          </a:lstStyle>
-          <a:p>
-            <a:pPr rtl="0"/>
-            <a:r>
-              <a:rPr lang="pl-PL" dirty="0"/>
-              <a:t>10</a:t>
+              <a:rPr lang="pl-PL" sz="6000" dirty="0"/>
+              <a:t>Makiety ramek i interfejsów użytkownika</a:t>
             </a:r>
           </a:p>
         </p:txBody>
@@ -24312,7 +24180,7 @@
     </p:spTree>
     <p:extLst>
       <p:ext uri="{BB962C8B-B14F-4D97-AF65-F5344CB8AC3E}">
-        <p14:creationId xmlns:p14="http://schemas.microsoft.com/office/powerpoint/2010/main" val="893108741"/>
+        <p14:creationId xmlns:p14="http://schemas.microsoft.com/office/powerpoint/2010/main" val="1639825837"/>
       </p:ext>
     </p:extLst>
   </p:cSld>
@@ -24325,17 +24193,15 @@
 <file path=ppt/slides/slide14.xml><?xml version="1.0" encoding="utf-8"?>
 <p:sld xmlns:a="http://schemas.openxmlformats.org/drawingml/2006/main" xmlns:r="http://schemas.openxmlformats.org/officeDocument/2006/relationships" xmlns:p="http://schemas.openxmlformats.org/presentationml/2006/main">
   <p:cSld>
-    <p:bg>
-      <p:bgPr>
-        <a:solidFill>
-          <a:schemeClr val="bg2"/>
-        </a:solidFill>
-        <a:effectLst/>
-      </p:bgPr>
-    </p:bg>
     <p:spTree>
       <p:nvGrpSpPr>
-        <p:cNvPr id="1" name=""/>
+        <p:cNvPr id="1" name="">
+          <a:extLst>
+            <a:ext uri="{FF2B5EF4-FFF2-40B4-BE49-F238E27FC236}">
+              <a16:creationId xmlns:a16="http://schemas.microsoft.com/office/drawing/2014/main" id="{AB496477-87B7-A900-5FE9-38BF2439DB2B}"/>
+            </a:ext>
+          </a:extLst>
+        </p:cNvPr>
         <p:cNvGrpSpPr/>
         <p:nvPr/>
       </p:nvGrpSpPr>
@@ -24349,10 +24215,10 @@
       </p:grpSpPr>
       <p:sp>
         <p:nvSpPr>
-          <p:cNvPr id="3" name="Tytuł 2">
-            <a:extLst>
-              <a:ext uri="{FF2B5EF4-FFF2-40B4-BE49-F238E27FC236}">
-                <a16:creationId xmlns:a16="http://schemas.microsoft.com/office/drawing/2014/main" id="{1945C2F8-2E24-F46B-AC7B-3070B381497A}"/>
+          <p:cNvPr id="2" name="Tytuł 1">
+            <a:extLst>
+              <a:ext uri="{FF2B5EF4-FFF2-40B4-BE49-F238E27FC236}">
+                <a16:creationId xmlns:a16="http://schemas.microsoft.com/office/drawing/2014/main" id="{D61E412A-314F-9450-13D8-087C34BBE001}"/>
               </a:ext>
             </a:extLst>
           </p:cNvPr>
@@ -24363,34 +24229,24 @@
             <p:ph type="title"/>
           </p:nvPr>
         </p:nvSpPr>
-        <p:spPr>
-          <a:xfrm>
-            <a:off x="5441317" y="3144415"/>
-            <a:ext cx="4147462" cy="1045511"/>
-          </a:xfrm>
-        </p:spPr>
-        <p:txBody>
-          <a:bodyPr rtlCol="0"/>
-          <a:lstStyle>
-            <a:defPPr>
-              <a:defRPr lang="pl-PL"/>
-            </a:defPPr>
-          </a:lstStyle>
-          <a:p>
-            <a:pPr rtl="0"/>
+        <p:spPr/>
+        <p:txBody>
+          <a:bodyPr/>
+          <a:lstStyle/>
+          <a:p>
             <a:r>
-              <a:rPr lang="pl-PL" dirty="0"/>
-              <a:t>Dziękuję</a:t>
+              <a:rPr lang="pl-PL" sz="2800" dirty="0"/>
+              <a:t>Widok strony głównej</a:t>
             </a:r>
           </a:p>
         </p:txBody>
       </p:sp>
       <p:sp>
         <p:nvSpPr>
-          <p:cNvPr id="6" name="Tekst — symbol zastępczy 5">
-            <a:extLst>
-              <a:ext uri="{FF2B5EF4-FFF2-40B4-BE49-F238E27FC236}">
-                <a16:creationId xmlns:a16="http://schemas.microsoft.com/office/drawing/2014/main" id="{7DA212DC-D3DD-DD6B-D644-0F7B9BA98E17}"/>
+          <p:cNvPr id="4" name="Symbol zastępczy tekstu 3">
+            <a:extLst>
+              <a:ext uri="{FF2B5EF4-FFF2-40B4-BE49-F238E27FC236}">
+                <a16:creationId xmlns:a16="http://schemas.microsoft.com/office/drawing/2014/main" id="{EC81B353-DBEC-0949-8DD9-3E07C7082B25}"/>
               </a:ext>
             </a:extLst>
           </p:cNvPr>
@@ -24398,55 +24254,24 @@
             <a:spLocks noGrp="1"/>
           </p:cNvSpPr>
           <p:nvPr>
-            <p:ph type="body" idx="1"/>
+            <p:ph type="body" sz="quarter" idx="13"/>
           </p:nvPr>
         </p:nvSpPr>
-        <p:spPr>
-          <a:xfrm>
-            <a:off x="5659369" y="4370089"/>
-            <a:ext cx="3711356" cy="1170432"/>
-          </a:xfrm>
-        </p:spPr>
-        <p:txBody>
-          <a:bodyPr rtlCol="0"/>
-          <a:lstStyle>
-            <a:defPPr>
-              <a:defRPr lang="pl-PL"/>
-            </a:defPPr>
-          </a:lstStyle>
-          <a:p>
-            <a:pPr algn="ctr" rtl="0"/>
-            <a:r>
-              <a:rPr lang="pl-PL" dirty="0"/>
-              <a:t>Mikołaj Kalejta</a:t>
-            </a:r>
-          </a:p>
-          <a:p>
-            <a:pPr algn="ctr" rtl="0"/>
-            <a:r>
-              <a:rPr lang="pl-PL" b="1" i="0" u="sng" dirty="0">
-                <a:solidFill>
-                  <a:srgbClr val="FF0000"/>
-                </a:solidFill>
-                <a:effectLst/>
-                <a:latin typeface="Segoe UI Variable Text" pitchFamily="2" charset="0"/>
-              </a:rPr>
-              <a:t>m.kalejta.607@studms.ug.edu.pl</a:t>
-            </a:r>
-            <a:endParaRPr lang="pl-PL" b="1" u="sng" dirty="0">
-              <a:solidFill>
-                <a:srgbClr val="FF0000"/>
-              </a:solidFill>
-            </a:endParaRPr>
+        <p:spPr/>
+        <p:txBody>
+          <a:bodyPr/>
+          <a:lstStyle/>
+          <a:p>
+            <a:endParaRPr lang="pl-PL"/>
           </a:p>
         </p:txBody>
       </p:sp>
       <p:pic>
         <p:nvPicPr>
-          <p:cNvPr id="4" name="Obraz 3">
-            <a:extLst>
-              <a:ext uri="{FF2B5EF4-FFF2-40B4-BE49-F238E27FC236}">
-                <a16:creationId xmlns:a16="http://schemas.microsoft.com/office/drawing/2014/main" id="{F22375FD-1BC3-EEED-1923-4D765FF85BBB}"/>
+          <p:cNvPr id="7" name="Obraz 6" descr="Obraz zawierający tekst, zrzut ekranu, oprogramowanie, System operacyjny&#10;&#10;Opis wygenerowany automatycznie">
+            <a:extLst>
+              <a:ext uri="{FF2B5EF4-FFF2-40B4-BE49-F238E27FC236}">
+                <a16:creationId xmlns:a16="http://schemas.microsoft.com/office/drawing/2014/main" id="{C29CC17C-F84F-A7BF-1054-60F46DE062E7}"/>
               </a:ext>
             </a:extLst>
           </p:cNvPr>
@@ -24456,15 +24281,15 @@
           <p:nvPr/>
         </p:nvPicPr>
         <p:blipFill>
-          <a:blip r:embed="rId3"/>
+          <a:blip r:embed="rId2"/>
           <a:stretch>
             <a:fillRect/>
           </a:stretch>
         </p:blipFill>
         <p:spPr>
           <a:xfrm>
-            <a:off x="6206049" y="359280"/>
-            <a:ext cx="2617997" cy="2604972"/>
+            <a:off x="1064832" y="1666386"/>
+            <a:ext cx="10062335" cy="5007522"/>
           </a:xfrm>
           <a:prstGeom prst="rect">
             <a:avLst/>
@@ -24474,7 +24299,602 @@
     </p:spTree>
     <p:extLst>
       <p:ext uri="{BB962C8B-B14F-4D97-AF65-F5344CB8AC3E}">
-        <p14:creationId xmlns:p14="http://schemas.microsoft.com/office/powerpoint/2010/main" val="3161219934"/>
+        <p14:creationId xmlns:p14="http://schemas.microsoft.com/office/powerpoint/2010/main" val="2087257885"/>
+      </p:ext>
+    </p:extLst>
+  </p:cSld>
+  <p:clrMapOvr>
+    <a:masterClrMapping/>
+  </p:clrMapOvr>
+</p:sld>
+</file>
+
+<file path=ppt/slides/slide15.xml><?xml version="1.0" encoding="utf-8"?>
+<p:sld xmlns:a="http://schemas.openxmlformats.org/drawingml/2006/main" xmlns:r="http://schemas.openxmlformats.org/officeDocument/2006/relationships" xmlns:p="http://schemas.openxmlformats.org/presentationml/2006/main">
+  <p:cSld>
+    <p:spTree>
+      <p:nvGrpSpPr>
+        <p:cNvPr id="1" name="">
+          <a:extLst>
+            <a:ext uri="{FF2B5EF4-FFF2-40B4-BE49-F238E27FC236}">
+              <a16:creationId xmlns:a16="http://schemas.microsoft.com/office/drawing/2014/main" id="{CE8D59C3-3ABD-EC9C-603D-0DA7D0CE84D9}"/>
+            </a:ext>
+          </a:extLst>
+        </p:cNvPr>
+        <p:cNvGrpSpPr/>
+        <p:nvPr/>
+      </p:nvGrpSpPr>
+      <p:grpSpPr>
+        <a:xfrm>
+          <a:off x="0" y="0"/>
+          <a:ext cx="0" cy="0"/>
+          <a:chOff x="0" y="0"/>
+          <a:chExt cx="0" cy="0"/>
+        </a:xfrm>
+      </p:grpSpPr>
+      <p:sp>
+        <p:nvSpPr>
+          <p:cNvPr id="2" name="Tytuł 1">
+            <a:extLst>
+              <a:ext uri="{FF2B5EF4-FFF2-40B4-BE49-F238E27FC236}">
+                <a16:creationId xmlns:a16="http://schemas.microsoft.com/office/drawing/2014/main" id="{74976542-ACF0-9655-8652-34BF5E6E818F}"/>
+              </a:ext>
+            </a:extLst>
+          </p:cNvPr>
+          <p:cNvSpPr>
+            <a:spLocks noGrp="1"/>
+          </p:cNvSpPr>
+          <p:nvPr>
+            <p:ph type="title"/>
+          </p:nvPr>
+        </p:nvSpPr>
+        <p:spPr/>
+        <p:txBody>
+          <a:bodyPr/>
+          <a:lstStyle/>
+          <a:p>
+            <a:r>
+              <a:rPr lang="pl-PL" sz="2800" dirty="0"/>
+              <a:t>Widok panelu rejestracyjnego</a:t>
+            </a:r>
+          </a:p>
+        </p:txBody>
+      </p:sp>
+      <p:sp>
+        <p:nvSpPr>
+          <p:cNvPr id="6" name="Symbol zastępczy tekstu 5">
+            <a:extLst>
+              <a:ext uri="{FF2B5EF4-FFF2-40B4-BE49-F238E27FC236}">
+                <a16:creationId xmlns:a16="http://schemas.microsoft.com/office/drawing/2014/main" id="{84FE0905-F7AE-F5E9-26EA-A2A94A6F16A1}"/>
+              </a:ext>
+            </a:extLst>
+          </p:cNvPr>
+          <p:cNvSpPr>
+            <a:spLocks noGrp="1"/>
+          </p:cNvSpPr>
+          <p:nvPr>
+            <p:ph type="body" sz="quarter" idx="13"/>
+          </p:nvPr>
+        </p:nvSpPr>
+        <p:spPr/>
+        <p:txBody>
+          <a:bodyPr/>
+          <a:lstStyle/>
+          <a:p>
+            <a:endParaRPr lang="pl-PL"/>
+          </a:p>
+        </p:txBody>
+      </p:sp>
+      <p:pic>
+        <p:nvPicPr>
+          <p:cNvPr id="10" name="Obraz 9" descr="Obraz zawierający tekst, zrzut ekranu, oprogramowanie, Strona internetowa&#10;&#10;Opis wygenerowany automatycznie">
+            <a:extLst>
+              <a:ext uri="{FF2B5EF4-FFF2-40B4-BE49-F238E27FC236}">
+                <a16:creationId xmlns:a16="http://schemas.microsoft.com/office/drawing/2014/main" id="{8500B9A4-A024-E804-CFA0-F1C34EA62DFE}"/>
+              </a:ext>
+            </a:extLst>
+          </p:cNvPr>
+          <p:cNvPicPr>
+            <a:picLocks noChangeAspect="1"/>
+          </p:cNvPicPr>
+          <p:nvPr/>
+        </p:nvPicPr>
+        <p:blipFill>
+          <a:blip r:embed="rId2"/>
+          <a:stretch>
+            <a:fillRect/>
+          </a:stretch>
+        </p:blipFill>
+        <p:spPr>
+          <a:xfrm>
+            <a:off x="961544" y="1667532"/>
+            <a:ext cx="10268912" cy="5118343"/>
+          </a:xfrm>
+          <a:prstGeom prst="rect">
+            <a:avLst/>
+          </a:prstGeom>
+        </p:spPr>
+      </p:pic>
+    </p:spTree>
+    <p:extLst>
+      <p:ext uri="{BB962C8B-B14F-4D97-AF65-F5344CB8AC3E}">
+        <p14:creationId xmlns:p14="http://schemas.microsoft.com/office/powerpoint/2010/main" val="4266595480"/>
+      </p:ext>
+    </p:extLst>
+  </p:cSld>
+  <p:clrMapOvr>
+    <a:masterClrMapping/>
+  </p:clrMapOvr>
+</p:sld>
+</file>
+
+<file path=ppt/slides/slide16.xml><?xml version="1.0" encoding="utf-8"?>
+<p:sld xmlns:a="http://schemas.openxmlformats.org/drawingml/2006/main" xmlns:r="http://schemas.openxmlformats.org/officeDocument/2006/relationships" xmlns:p="http://schemas.openxmlformats.org/presentationml/2006/main">
+  <p:cSld>
+    <p:spTree>
+      <p:nvGrpSpPr>
+        <p:cNvPr id="1" name="">
+          <a:extLst>
+            <a:ext uri="{FF2B5EF4-FFF2-40B4-BE49-F238E27FC236}">
+              <a16:creationId xmlns:a16="http://schemas.microsoft.com/office/drawing/2014/main" id="{4C31A425-EE38-2CA4-D619-AE58CB668731}"/>
+            </a:ext>
+          </a:extLst>
+        </p:cNvPr>
+        <p:cNvGrpSpPr/>
+        <p:nvPr/>
+      </p:nvGrpSpPr>
+      <p:grpSpPr>
+        <a:xfrm>
+          <a:off x="0" y="0"/>
+          <a:ext cx="0" cy="0"/>
+          <a:chOff x="0" y="0"/>
+          <a:chExt cx="0" cy="0"/>
+        </a:xfrm>
+      </p:grpSpPr>
+      <p:sp>
+        <p:nvSpPr>
+          <p:cNvPr id="2" name="Tytuł 1">
+            <a:extLst>
+              <a:ext uri="{FF2B5EF4-FFF2-40B4-BE49-F238E27FC236}">
+                <a16:creationId xmlns:a16="http://schemas.microsoft.com/office/drawing/2014/main" id="{EDB411B9-35C3-7AF5-D19D-288BDD58C053}"/>
+              </a:ext>
+            </a:extLst>
+          </p:cNvPr>
+          <p:cNvSpPr>
+            <a:spLocks noGrp="1"/>
+          </p:cNvSpPr>
+          <p:nvPr>
+            <p:ph type="title"/>
+          </p:nvPr>
+        </p:nvSpPr>
+        <p:spPr/>
+        <p:txBody>
+          <a:bodyPr/>
+          <a:lstStyle/>
+          <a:p>
+            <a:r>
+              <a:rPr lang="pl-PL" sz="2800" dirty="0"/>
+              <a:t>Widok listy wszystkich wydarzeń</a:t>
+            </a:r>
+          </a:p>
+        </p:txBody>
+      </p:sp>
+      <p:sp>
+        <p:nvSpPr>
+          <p:cNvPr id="6" name="Symbol zastępczy tekstu 5">
+            <a:extLst>
+              <a:ext uri="{FF2B5EF4-FFF2-40B4-BE49-F238E27FC236}">
+                <a16:creationId xmlns:a16="http://schemas.microsoft.com/office/drawing/2014/main" id="{B464E233-F93C-6F57-2814-7F2117D77B3F}"/>
+              </a:ext>
+            </a:extLst>
+          </p:cNvPr>
+          <p:cNvSpPr>
+            <a:spLocks noGrp="1"/>
+          </p:cNvSpPr>
+          <p:nvPr>
+            <p:ph type="body" sz="quarter" idx="13"/>
+          </p:nvPr>
+        </p:nvSpPr>
+        <p:spPr/>
+        <p:txBody>
+          <a:bodyPr/>
+          <a:lstStyle/>
+          <a:p>
+            <a:endParaRPr lang="pl-PL"/>
+          </a:p>
+        </p:txBody>
+      </p:sp>
+      <p:pic>
+        <p:nvPicPr>
+          <p:cNvPr id="4" name="Obraz 3" descr="Obraz zawierający tekst, zrzut ekranu, oprogramowanie, Oprogramowanie multimedialne&#10;&#10;Opis wygenerowany automatycznie">
+            <a:extLst>
+              <a:ext uri="{FF2B5EF4-FFF2-40B4-BE49-F238E27FC236}">
+                <a16:creationId xmlns:a16="http://schemas.microsoft.com/office/drawing/2014/main" id="{458E3AF3-EE2C-6995-FEA1-CB7109C7E736}"/>
+              </a:ext>
+            </a:extLst>
+          </p:cNvPr>
+          <p:cNvPicPr>
+            <a:picLocks noChangeAspect="1"/>
+          </p:cNvPicPr>
+          <p:nvPr/>
+        </p:nvPicPr>
+        <p:blipFill>
+          <a:blip r:embed="rId2"/>
+          <a:stretch>
+            <a:fillRect/>
+          </a:stretch>
+        </p:blipFill>
+        <p:spPr>
+          <a:xfrm>
+            <a:off x="964163" y="1574226"/>
+            <a:ext cx="10263673" cy="5131837"/>
+          </a:xfrm>
+          <a:prstGeom prst="rect">
+            <a:avLst/>
+          </a:prstGeom>
+        </p:spPr>
+      </p:pic>
+    </p:spTree>
+    <p:extLst>
+      <p:ext uri="{BB962C8B-B14F-4D97-AF65-F5344CB8AC3E}">
+        <p14:creationId xmlns:p14="http://schemas.microsoft.com/office/powerpoint/2010/main" val="1205207395"/>
+      </p:ext>
+    </p:extLst>
+  </p:cSld>
+  <p:clrMapOvr>
+    <a:masterClrMapping/>
+  </p:clrMapOvr>
+</p:sld>
+</file>
+
+<file path=ppt/slides/slide17.xml><?xml version="1.0" encoding="utf-8"?>
+<p:sld xmlns:a="http://schemas.openxmlformats.org/drawingml/2006/main" xmlns:r="http://schemas.openxmlformats.org/officeDocument/2006/relationships" xmlns:p="http://schemas.openxmlformats.org/presentationml/2006/main">
+  <p:cSld>
+    <p:spTree>
+      <p:nvGrpSpPr>
+        <p:cNvPr id="1" name="">
+          <a:extLst>
+            <a:ext uri="{FF2B5EF4-FFF2-40B4-BE49-F238E27FC236}">
+              <a16:creationId xmlns:a16="http://schemas.microsoft.com/office/drawing/2014/main" id="{A3477E4E-BD93-454B-464C-DD9984451814}"/>
+            </a:ext>
+          </a:extLst>
+        </p:cNvPr>
+        <p:cNvGrpSpPr/>
+        <p:nvPr/>
+      </p:nvGrpSpPr>
+      <p:grpSpPr>
+        <a:xfrm>
+          <a:off x="0" y="0"/>
+          <a:ext cx="0" cy="0"/>
+          <a:chOff x="0" y="0"/>
+          <a:chExt cx="0" cy="0"/>
+        </a:xfrm>
+      </p:grpSpPr>
+      <p:sp>
+        <p:nvSpPr>
+          <p:cNvPr id="2" name="Tytuł 1">
+            <a:extLst>
+              <a:ext uri="{FF2B5EF4-FFF2-40B4-BE49-F238E27FC236}">
+                <a16:creationId xmlns:a16="http://schemas.microsoft.com/office/drawing/2014/main" id="{D96D38E0-E108-53D5-B0AA-D3021F17CF62}"/>
+              </a:ext>
+            </a:extLst>
+          </p:cNvPr>
+          <p:cNvSpPr>
+            <a:spLocks noGrp="1"/>
+          </p:cNvSpPr>
+          <p:nvPr>
+            <p:ph type="title"/>
+          </p:nvPr>
+        </p:nvSpPr>
+        <p:spPr/>
+        <p:txBody>
+          <a:bodyPr/>
+          <a:lstStyle/>
+          <a:p>
+            <a:r>
+              <a:rPr lang="pl-PL" sz="2800" dirty="0"/>
+              <a:t>Widok tworzenia wydarzenia</a:t>
+            </a:r>
+          </a:p>
+        </p:txBody>
+      </p:sp>
+      <p:sp>
+        <p:nvSpPr>
+          <p:cNvPr id="6" name="Symbol zastępczy tekstu 5">
+            <a:extLst>
+              <a:ext uri="{FF2B5EF4-FFF2-40B4-BE49-F238E27FC236}">
+                <a16:creationId xmlns:a16="http://schemas.microsoft.com/office/drawing/2014/main" id="{5E360EA9-499A-B690-1126-FCDAD868468D}"/>
+              </a:ext>
+            </a:extLst>
+          </p:cNvPr>
+          <p:cNvSpPr>
+            <a:spLocks noGrp="1"/>
+          </p:cNvSpPr>
+          <p:nvPr>
+            <p:ph type="body" sz="quarter" idx="13"/>
+          </p:nvPr>
+        </p:nvSpPr>
+        <p:spPr/>
+        <p:txBody>
+          <a:bodyPr/>
+          <a:lstStyle/>
+          <a:p>
+            <a:endParaRPr lang="pl-PL"/>
+          </a:p>
+        </p:txBody>
+      </p:sp>
+      <p:pic>
+        <p:nvPicPr>
+          <p:cNvPr id="4" name="Obraz 3" descr="Obraz zawierający tekst, oprogramowanie, numer, Strona internetowa&#10;&#10;Opis wygenerowany automatycznie">
+            <a:extLst>
+              <a:ext uri="{FF2B5EF4-FFF2-40B4-BE49-F238E27FC236}">
+                <a16:creationId xmlns:a16="http://schemas.microsoft.com/office/drawing/2014/main" id="{D71D85B6-9412-D346-2912-7B413B1F3523}"/>
+              </a:ext>
+            </a:extLst>
+          </p:cNvPr>
+          <p:cNvPicPr>
+            <a:picLocks noChangeAspect="1"/>
+          </p:cNvPicPr>
+          <p:nvPr/>
+        </p:nvPicPr>
+        <p:blipFill>
+          <a:blip r:embed="rId2"/>
+          <a:stretch>
+            <a:fillRect/>
+          </a:stretch>
+        </p:blipFill>
+        <p:spPr>
+          <a:xfrm>
+            <a:off x="1054942" y="1665261"/>
+            <a:ext cx="10082115" cy="5035796"/>
+          </a:xfrm>
+          <a:prstGeom prst="rect">
+            <a:avLst/>
+          </a:prstGeom>
+        </p:spPr>
+      </p:pic>
+    </p:spTree>
+    <p:extLst>
+      <p:ext uri="{BB962C8B-B14F-4D97-AF65-F5344CB8AC3E}">
+        <p14:creationId xmlns:p14="http://schemas.microsoft.com/office/powerpoint/2010/main" val="3286801020"/>
+      </p:ext>
+    </p:extLst>
+  </p:cSld>
+  <p:clrMapOvr>
+    <a:masterClrMapping/>
+  </p:clrMapOvr>
+</p:sld>
+</file>
+
+<file path=ppt/slides/slide18.xml><?xml version="1.0" encoding="utf-8"?>
+<p:sld xmlns:a="http://schemas.openxmlformats.org/drawingml/2006/main" xmlns:r="http://schemas.openxmlformats.org/officeDocument/2006/relationships" xmlns:p="http://schemas.openxmlformats.org/presentationml/2006/main">
+  <p:cSld>
+    <p:spTree>
+      <p:nvGrpSpPr>
+        <p:cNvPr id="1" name="">
+          <a:extLst>
+            <a:ext uri="{FF2B5EF4-FFF2-40B4-BE49-F238E27FC236}">
+              <a16:creationId xmlns:a16="http://schemas.microsoft.com/office/drawing/2014/main" id="{9A972600-8B62-D37D-EEE2-40AA7889E1AE}"/>
+            </a:ext>
+          </a:extLst>
+        </p:cNvPr>
+        <p:cNvGrpSpPr/>
+        <p:nvPr/>
+      </p:nvGrpSpPr>
+      <p:grpSpPr>
+        <a:xfrm>
+          <a:off x="0" y="0"/>
+          <a:ext cx="0" cy="0"/>
+          <a:chOff x="0" y="0"/>
+          <a:chExt cx="0" cy="0"/>
+        </a:xfrm>
+      </p:grpSpPr>
+      <p:sp>
+        <p:nvSpPr>
+          <p:cNvPr id="2" name="Tytuł 1">
+            <a:extLst>
+              <a:ext uri="{FF2B5EF4-FFF2-40B4-BE49-F238E27FC236}">
+                <a16:creationId xmlns:a16="http://schemas.microsoft.com/office/drawing/2014/main" id="{F73046D3-95BF-3BAC-8687-F0405C2F6482}"/>
+              </a:ext>
+            </a:extLst>
+          </p:cNvPr>
+          <p:cNvSpPr>
+            <a:spLocks noGrp="1"/>
+          </p:cNvSpPr>
+          <p:nvPr>
+            <p:ph type="title"/>
+          </p:nvPr>
+        </p:nvSpPr>
+        <p:spPr/>
+        <p:txBody>
+          <a:bodyPr/>
+          <a:lstStyle/>
+          <a:p>
+            <a:r>
+              <a:rPr lang="pl-PL" sz="2800" dirty="0"/>
+              <a:t>Widok listy wydarzeń danego użytkownika</a:t>
+            </a:r>
+          </a:p>
+        </p:txBody>
+      </p:sp>
+      <p:sp>
+        <p:nvSpPr>
+          <p:cNvPr id="6" name="Symbol zastępczy tekstu 5">
+            <a:extLst>
+              <a:ext uri="{FF2B5EF4-FFF2-40B4-BE49-F238E27FC236}">
+                <a16:creationId xmlns:a16="http://schemas.microsoft.com/office/drawing/2014/main" id="{2F7E7481-93DD-88E4-F024-A2210FF2AF75}"/>
+              </a:ext>
+            </a:extLst>
+          </p:cNvPr>
+          <p:cNvSpPr>
+            <a:spLocks noGrp="1"/>
+          </p:cNvSpPr>
+          <p:nvPr>
+            <p:ph type="body" sz="quarter" idx="13"/>
+          </p:nvPr>
+        </p:nvSpPr>
+        <p:spPr/>
+        <p:txBody>
+          <a:bodyPr/>
+          <a:lstStyle/>
+          <a:p>
+            <a:endParaRPr lang="pl-PL"/>
+          </a:p>
+        </p:txBody>
+      </p:sp>
+      <p:pic>
+        <p:nvPicPr>
+          <p:cNvPr id="7" name="Obraz 6" descr="Obraz zawierający tekst, zrzut ekranu, oprogramowanie, Oprogramowanie multimedialne&#10;&#10;Opis wygenerowany automatycznie">
+            <a:extLst>
+              <a:ext uri="{FF2B5EF4-FFF2-40B4-BE49-F238E27FC236}">
+                <a16:creationId xmlns:a16="http://schemas.microsoft.com/office/drawing/2014/main" id="{2E066EFD-1744-6178-F23F-8255CEA562E3}"/>
+              </a:ext>
+            </a:extLst>
+          </p:cNvPr>
+          <p:cNvPicPr>
+            <a:picLocks noChangeAspect="1"/>
+          </p:cNvPicPr>
+          <p:nvPr/>
+        </p:nvPicPr>
+        <p:blipFill>
+          <a:blip r:embed="rId2"/>
+          <a:stretch>
+            <a:fillRect/>
+          </a:stretch>
+        </p:blipFill>
+        <p:spPr>
+          <a:xfrm>
+            <a:off x="1122006" y="1643244"/>
+            <a:ext cx="9947988" cy="5021466"/>
+          </a:xfrm>
+          <a:prstGeom prst="rect">
+            <a:avLst/>
+          </a:prstGeom>
+        </p:spPr>
+      </p:pic>
+    </p:spTree>
+    <p:extLst>
+      <p:ext uri="{BB962C8B-B14F-4D97-AF65-F5344CB8AC3E}">
+        <p14:creationId xmlns:p14="http://schemas.microsoft.com/office/powerpoint/2010/main" val="297880975"/>
+      </p:ext>
+    </p:extLst>
+  </p:cSld>
+  <p:clrMapOvr>
+    <a:masterClrMapping/>
+  </p:clrMapOvr>
+</p:sld>
+</file>
+
+<file path=ppt/slides/slide19.xml><?xml version="1.0" encoding="utf-8"?>
+<p:sld xmlns:a="http://schemas.openxmlformats.org/drawingml/2006/main" xmlns:r="http://schemas.openxmlformats.org/officeDocument/2006/relationships" xmlns:p="http://schemas.openxmlformats.org/presentationml/2006/main">
+  <p:cSld>
+    <p:spTree>
+      <p:nvGrpSpPr>
+        <p:cNvPr id="1" name="">
+          <a:extLst>
+            <a:ext uri="{FF2B5EF4-FFF2-40B4-BE49-F238E27FC236}">
+              <a16:creationId xmlns:a16="http://schemas.microsoft.com/office/drawing/2014/main" id="{68E6CABA-C388-CB3D-B458-BB472DFDC562}"/>
+            </a:ext>
+          </a:extLst>
+        </p:cNvPr>
+        <p:cNvGrpSpPr/>
+        <p:nvPr/>
+      </p:nvGrpSpPr>
+      <p:grpSpPr>
+        <a:xfrm>
+          <a:off x="0" y="0"/>
+          <a:ext cx="0" cy="0"/>
+          <a:chOff x="0" y="0"/>
+          <a:chExt cx="0" cy="0"/>
+        </a:xfrm>
+      </p:grpSpPr>
+      <p:sp>
+        <p:nvSpPr>
+          <p:cNvPr id="2" name="Tytuł 1">
+            <a:extLst>
+              <a:ext uri="{FF2B5EF4-FFF2-40B4-BE49-F238E27FC236}">
+                <a16:creationId xmlns:a16="http://schemas.microsoft.com/office/drawing/2014/main" id="{8348F119-2139-4AD5-86F3-E96164243243}"/>
+              </a:ext>
+            </a:extLst>
+          </p:cNvPr>
+          <p:cNvSpPr>
+            <a:spLocks noGrp="1"/>
+          </p:cNvSpPr>
+          <p:nvPr>
+            <p:ph type="title"/>
+          </p:nvPr>
+        </p:nvSpPr>
+        <p:spPr/>
+        <p:txBody>
+          <a:bodyPr/>
+          <a:lstStyle/>
+          <a:p>
+            <a:r>
+              <a:rPr lang="pl-PL" sz="2800" dirty="0"/>
+              <a:t>Widok szczegółów wydarzenia </a:t>
+            </a:r>
+          </a:p>
+        </p:txBody>
+      </p:sp>
+      <p:sp>
+        <p:nvSpPr>
+          <p:cNvPr id="6" name="Symbol zastępczy tekstu 5">
+            <a:extLst>
+              <a:ext uri="{FF2B5EF4-FFF2-40B4-BE49-F238E27FC236}">
+                <a16:creationId xmlns:a16="http://schemas.microsoft.com/office/drawing/2014/main" id="{4FCEAAD0-BBFE-4935-0335-0E43DA4715FD}"/>
+              </a:ext>
+            </a:extLst>
+          </p:cNvPr>
+          <p:cNvSpPr>
+            <a:spLocks noGrp="1"/>
+          </p:cNvSpPr>
+          <p:nvPr>
+            <p:ph type="body" sz="quarter" idx="13"/>
+          </p:nvPr>
+        </p:nvSpPr>
+        <p:spPr/>
+        <p:txBody>
+          <a:bodyPr/>
+          <a:lstStyle/>
+          <a:p>
+            <a:endParaRPr lang="pl-PL"/>
+          </a:p>
+        </p:txBody>
+      </p:sp>
+      <p:pic>
+        <p:nvPicPr>
+          <p:cNvPr id="7" name="Obraz 6" descr="Obraz zawierający tekst, zrzut ekranu, diagram, oprogramowanie&#10;&#10;Opis wygenerowany automatycznie">
+            <a:extLst>
+              <a:ext uri="{FF2B5EF4-FFF2-40B4-BE49-F238E27FC236}">
+                <a16:creationId xmlns:a16="http://schemas.microsoft.com/office/drawing/2014/main" id="{D74D2BB1-A1B9-158B-B78E-8D7AD775B5B3}"/>
+              </a:ext>
+            </a:extLst>
+          </p:cNvPr>
+          <p:cNvPicPr>
+            <a:picLocks noChangeAspect="1"/>
+          </p:cNvPicPr>
+          <p:nvPr/>
+        </p:nvPicPr>
+        <p:blipFill>
+          <a:blip r:embed="rId2"/>
+          <a:stretch>
+            <a:fillRect/>
+          </a:stretch>
+        </p:blipFill>
+        <p:spPr>
+          <a:xfrm>
+            <a:off x="2480380" y="1574226"/>
+            <a:ext cx="7231240" cy="5238119"/>
+          </a:xfrm>
+          <a:prstGeom prst="rect">
+            <a:avLst/>
+          </a:prstGeom>
+        </p:spPr>
+      </p:pic>
+    </p:spTree>
+    <p:extLst>
+      <p:ext uri="{BB962C8B-B14F-4D97-AF65-F5344CB8AC3E}">
+        <p14:creationId xmlns:p14="http://schemas.microsoft.com/office/powerpoint/2010/main" val="2587805372"/>
       </p:ext>
     </p:extLst>
   </p:cSld>
@@ -24726,6 +25146,370 @@
     <p:extLst>
       <p:ext uri="{BB962C8B-B14F-4D97-AF65-F5344CB8AC3E}">
         <p14:creationId xmlns:p14="http://schemas.microsoft.com/office/powerpoint/2010/main" val="1343223353"/>
+      </p:ext>
+    </p:extLst>
+  </p:cSld>
+  <p:clrMapOvr>
+    <a:masterClrMapping/>
+  </p:clrMapOvr>
+</p:sld>
+</file>
+
+<file path=ppt/slides/slide20.xml><?xml version="1.0" encoding="utf-8"?>
+<p:sld xmlns:a="http://schemas.openxmlformats.org/drawingml/2006/main" xmlns:r="http://schemas.openxmlformats.org/officeDocument/2006/relationships" xmlns:p="http://schemas.openxmlformats.org/presentationml/2006/main">
+  <p:cSld>
+    <p:bg>
+      <p:bgPr>
+        <a:solidFill>
+          <a:schemeClr val="bg2"/>
+        </a:solidFill>
+        <a:effectLst/>
+      </p:bgPr>
+    </p:bg>
+    <p:spTree>
+      <p:nvGrpSpPr>
+        <p:cNvPr id="1" name=""/>
+        <p:cNvGrpSpPr/>
+        <p:nvPr/>
+      </p:nvGrpSpPr>
+      <p:grpSpPr>
+        <a:xfrm>
+          <a:off x="0" y="0"/>
+          <a:ext cx="0" cy="0"/>
+          <a:chOff x="0" y="0"/>
+          <a:chExt cx="0" cy="0"/>
+        </a:xfrm>
+      </p:grpSpPr>
+      <p:sp>
+        <p:nvSpPr>
+          <p:cNvPr id="13" name="Tytuł 12">
+            <a:extLst>
+              <a:ext uri="{FF2B5EF4-FFF2-40B4-BE49-F238E27FC236}">
+                <a16:creationId xmlns:a16="http://schemas.microsoft.com/office/drawing/2014/main" id="{E729A509-992F-8C10-902D-182448B5A1AE}"/>
+              </a:ext>
+            </a:extLst>
+          </p:cNvPr>
+          <p:cNvSpPr>
+            <a:spLocks noGrp="1"/>
+          </p:cNvSpPr>
+          <p:nvPr>
+            <p:ph type="title"/>
+          </p:nvPr>
+        </p:nvSpPr>
+        <p:spPr/>
+        <p:txBody>
+          <a:bodyPr rtlCol="0"/>
+          <a:lstStyle>
+            <a:defPPr>
+              <a:defRPr lang="pl-PL"/>
+            </a:defPPr>
+          </a:lstStyle>
+          <a:p>
+            <a:pPr rtl="0"/>
+            <a:r>
+              <a:rPr lang="pl-PL" dirty="0"/>
+              <a:t>Podsumowanie</a:t>
+            </a:r>
+          </a:p>
+        </p:txBody>
+      </p:sp>
+      <p:sp>
+        <p:nvSpPr>
+          <p:cNvPr id="12" name="Zawartość — symbol zastępczy 11">
+            <a:extLst>
+              <a:ext uri="{FF2B5EF4-FFF2-40B4-BE49-F238E27FC236}">
+                <a16:creationId xmlns:a16="http://schemas.microsoft.com/office/drawing/2014/main" id="{84FA0F1E-A920-0194-981E-4B573643BB48}"/>
+              </a:ext>
+            </a:extLst>
+          </p:cNvPr>
+          <p:cNvSpPr>
+            <a:spLocks noGrp="1"/>
+          </p:cNvSpPr>
+          <p:nvPr>
+            <p:ph idx="1"/>
+          </p:nvPr>
+        </p:nvSpPr>
+        <p:spPr/>
+        <p:txBody>
+          <a:bodyPr rtlCol="0"/>
+          <a:lstStyle>
+            <a:defPPr>
+              <a:defRPr lang="pl-PL"/>
+            </a:defPPr>
+          </a:lstStyle>
+          <a:p>
+            <a:pPr rtl="0"/>
+            <a:r>
+              <a:rPr lang="pl-PL" dirty="0"/>
+              <a:t>Aplikacja „Sports </a:t>
+            </a:r>
+            <a:r>
+              <a:rPr lang="pl-PL" dirty="0" err="1"/>
+              <a:t>Joiner</a:t>
+            </a:r>
+            <a:r>
+              <a:rPr lang="pl-PL" dirty="0"/>
+              <a:t>” jest rewolucyjnym rozwiązaniem, mającym na celu poprawę zdrowia oraz zacieśniania więzi wśród wszystkich jej użytkowników. Głównym celem, przyświecającym tej idei technologicznej, jest pomoc w odnalezieniu chętnych do uprawiania tego samego sportu. Projekt ten jest także narzędziem dla osób, którym brakuje motywacji do poszerzania swoich możliwości ruchowych w pojedynkę.</a:t>
+            </a:r>
+          </a:p>
+          <a:p>
+            <a:pPr algn="l" rtl="0" fontAlgn="base"/>
+            <a:r>
+              <a:rPr lang="pl-PL" b="0" i="0" dirty="0">
+                <a:solidFill>
+                  <a:srgbClr val="000000"/>
+                </a:solidFill>
+                <a:effectLst/>
+                <a:latin typeface="Calibri" panose="020F0502020204030204" pitchFamily="34" charset="0"/>
+              </a:rPr>
+              <a:t>​</a:t>
+            </a:r>
+            <a:endParaRPr lang="pl-PL" b="0" i="0" dirty="0">
+              <a:solidFill>
+                <a:srgbClr val="000000"/>
+              </a:solidFill>
+              <a:effectLst/>
+              <a:latin typeface="Segoe UI" panose="020B0502040204020203" pitchFamily="34" charset="0"/>
+            </a:endParaRPr>
+          </a:p>
+          <a:p>
+            <a:pPr rtl="0"/>
+            <a:endParaRPr lang="pl-PL" b="1" dirty="0">
+              <a:latin typeface="Arial Black" panose="020B0604020202020204" pitchFamily="34" charset="0"/>
+              <a:cs typeface="Arial Black" panose="020B0604020202020204" pitchFamily="34" charset="0"/>
+            </a:endParaRPr>
+          </a:p>
+        </p:txBody>
+      </p:sp>
+      <p:sp>
+        <p:nvSpPr>
+          <p:cNvPr id="19" name="Tekst — symbol zastępczy 18">
+            <a:extLst>
+              <a:ext uri="{FF2B5EF4-FFF2-40B4-BE49-F238E27FC236}">
+                <a16:creationId xmlns:a16="http://schemas.microsoft.com/office/drawing/2014/main" id="{1A502D19-C614-886C-4945-5880F36E0998}"/>
+              </a:ext>
+            </a:extLst>
+          </p:cNvPr>
+          <p:cNvSpPr>
+            <a:spLocks noGrp="1"/>
+          </p:cNvSpPr>
+          <p:nvPr>
+            <p:ph type="body" sz="quarter" idx="13"/>
+          </p:nvPr>
+        </p:nvSpPr>
+        <p:spPr/>
+        <p:txBody>
+          <a:bodyPr rtlCol="0"/>
+          <a:lstStyle>
+            <a:defPPr>
+              <a:defRPr lang="pl-PL"/>
+            </a:defPPr>
+          </a:lstStyle>
+          <a:p>
+            <a:pPr rtl="0"/>
+            <a:endParaRPr lang="pl-PL"/>
+          </a:p>
+        </p:txBody>
+      </p:sp>
+      <p:sp>
+        <p:nvSpPr>
+          <p:cNvPr id="17" name="Numer slajdu — symbol zastępczy 16">
+            <a:extLst>
+              <a:ext uri="{FF2B5EF4-FFF2-40B4-BE49-F238E27FC236}">
+                <a16:creationId xmlns:a16="http://schemas.microsoft.com/office/drawing/2014/main" id="{E46CC291-411B-349C-8657-ED39C084F877}"/>
+              </a:ext>
+            </a:extLst>
+          </p:cNvPr>
+          <p:cNvSpPr>
+            <a:spLocks noGrp="1"/>
+          </p:cNvSpPr>
+          <p:nvPr>
+            <p:ph type="sldNum" sz="quarter" idx="15"/>
+          </p:nvPr>
+        </p:nvSpPr>
+        <p:spPr/>
+        <p:txBody>
+          <a:bodyPr rtlCol="0"/>
+          <a:lstStyle>
+            <a:defPPr>
+              <a:defRPr lang="pl-PL"/>
+            </a:defPPr>
+          </a:lstStyle>
+          <a:p>
+            <a:pPr rtl="0"/>
+            <a:r>
+              <a:rPr lang="pl-PL" dirty="0"/>
+              <a:t>12</a:t>
+            </a:r>
+          </a:p>
+        </p:txBody>
+      </p:sp>
+    </p:spTree>
+    <p:extLst>
+      <p:ext uri="{BB962C8B-B14F-4D97-AF65-F5344CB8AC3E}">
+        <p14:creationId xmlns:p14="http://schemas.microsoft.com/office/powerpoint/2010/main" val="893108741"/>
+      </p:ext>
+    </p:extLst>
+  </p:cSld>
+  <p:clrMapOvr>
+    <a:masterClrMapping/>
+  </p:clrMapOvr>
+</p:sld>
+</file>
+
+<file path=ppt/slides/slide21.xml><?xml version="1.0" encoding="utf-8"?>
+<p:sld xmlns:a="http://schemas.openxmlformats.org/drawingml/2006/main" xmlns:r="http://schemas.openxmlformats.org/officeDocument/2006/relationships" xmlns:p="http://schemas.openxmlformats.org/presentationml/2006/main">
+  <p:cSld>
+    <p:bg>
+      <p:bgPr>
+        <a:solidFill>
+          <a:schemeClr val="bg2"/>
+        </a:solidFill>
+        <a:effectLst/>
+      </p:bgPr>
+    </p:bg>
+    <p:spTree>
+      <p:nvGrpSpPr>
+        <p:cNvPr id="1" name=""/>
+        <p:cNvGrpSpPr/>
+        <p:nvPr/>
+      </p:nvGrpSpPr>
+      <p:grpSpPr>
+        <a:xfrm>
+          <a:off x="0" y="0"/>
+          <a:ext cx="0" cy="0"/>
+          <a:chOff x="0" y="0"/>
+          <a:chExt cx="0" cy="0"/>
+        </a:xfrm>
+      </p:grpSpPr>
+      <p:sp>
+        <p:nvSpPr>
+          <p:cNvPr id="3" name="Tytuł 2">
+            <a:extLst>
+              <a:ext uri="{FF2B5EF4-FFF2-40B4-BE49-F238E27FC236}">
+                <a16:creationId xmlns:a16="http://schemas.microsoft.com/office/drawing/2014/main" id="{1945C2F8-2E24-F46B-AC7B-3070B381497A}"/>
+              </a:ext>
+            </a:extLst>
+          </p:cNvPr>
+          <p:cNvSpPr>
+            <a:spLocks noGrp="1"/>
+          </p:cNvSpPr>
+          <p:nvPr>
+            <p:ph type="title"/>
+          </p:nvPr>
+        </p:nvSpPr>
+        <p:spPr>
+          <a:xfrm>
+            <a:off x="5441317" y="3144415"/>
+            <a:ext cx="4147462" cy="1045511"/>
+          </a:xfrm>
+        </p:spPr>
+        <p:txBody>
+          <a:bodyPr rtlCol="0"/>
+          <a:lstStyle>
+            <a:defPPr>
+              <a:defRPr lang="pl-PL"/>
+            </a:defPPr>
+          </a:lstStyle>
+          <a:p>
+            <a:pPr rtl="0"/>
+            <a:r>
+              <a:rPr lang="pl-PL" dirty="0"/>
+              <a:t>Dziękuję</a:t>
+            </a:r>
+          </a:p>
+        </p:txBody>
+      </p:sp>
+      <p:sp>
+        <p:nvSpPr>
+          <p:cNvPr id="6" name="Tekst — symbol zastępczy 5">
+            <a:extLst>
+              <a:ext uri="{FF2B5EF4-FFF2-40B4-BE49-F238E27FC236}">
+                <a16:creationId xmlns:a16="http://schemas.microsoft.com/office/drawing/2014/main" id="{7DA212DC-D3DD-DD6B-D644-0F7B9BA98E17}"/>
+              </a:ext>
+            </a:extLst>
+          </p:cNvPr>
+          <p:cNvSpPr>
+            <a:spLocks noGrp="1"/>
+          </p:cNvSpPr>
+          <p:nvPr>
+            <p:ph type="body" idx="1"/>
+          </p:nvPr>
+        </p:nvSpPr>
+        <p:spPr>
+          <a:xfrm>
+            <a:off x="5659369" y="4370089"/>
+            <a:ext cx="3711356" cy="1170432"/>
+          </a:xfrm>
+        </p:spPr>
+        <p:txBody>
+          <a:bodyPr rtlCol="0"/>
+          <a:lstStyle>
+            <a:defPPr>
+              <a:defRPr lang="pl-PL"/>
+            </a:defPPr>
+          </a:lstStyle>
+          <a:p>
+            <a:pPr algn="ctr" rtl="0"/>
+            <a:r>
+              <a:rPr lang="pl-PL" dirty="0"/>
+              <a:t>Mikołaj Kalejta</a:t>
+            </a:r>
+          </a:p>
+          <a:p>
+            <a:pPr algn="ctr" rtl="0"/>
+            <a:r>
+              <a:rPr lang="pl-PL" b="1" i="0" u="sng" dirty="0">
+                <a:solidFill>
+                  <a:srgbClr val="FF0000"/>
+                </a:solidFill>
+                <a:effectLst/>
+                <a:latin typeface="Segoe UI Variable Text" pitchFamily="2" charset="0"/>
+              </a:rPr>
+              <a:t>m.kalejta.607@studms.ug.edu.pl</a:t>
+            </a:r>
+            <a:endParaRPr lang="pl-PL" b="1" u="sng" dirty="0">
+              <a:solidFill>
+                <a:srgbClr val="FF0000"/>
+              </a:solidFill>
+            </a:endParaRPr>
+          </a:p>
+        </p:txBody>
+      </p:sp>
+      <p:pic>
+        <p:nvPicPr>
+          <p:cNvPr id="4" name="Obraz 3">
+            <a:extLst>
+              <a:ext uri="{FF2B5EF4-FFF2-40B4-BE49-F238E27FC236}">
+                <a16:creationId xmlns:a16="http://schemas.microsoft.com/office/drawing/2014/main" id="{F22375FD-1BC3-EEED-1923-4D765FF85BBB}"/>
+              </a:ext>
+            </a:extLst>
+          </p:cNvPr>
+          <p:cNvPicPr>
+            <a:picLocks noChangeAspect="1"/>
+          </p:cNvPicPr>
+          <p:nvPr/>
+        </p:nvPicPr>
+        <p:blipFill>
+          <a:blip r:embed="rId3"/>
+          <a:stretch>
+            <a:fillRect/>
+          </a:stretch>
+        </p:blipFill>
+        <p:spPr>
+          <a:xfrm>
+            <a:off x="6206049" y="359280"/>
+            <a:ext cx="2617997" cy="2604972"/>
+          </a:xfrm>
+          <a:prstGeom prst="rect">
+            <a:avLst/>
+          </a:prstGeom>
+        </p:spPr>
+      </p:pic>
+    </p:spTree>
+    <p:extLst>
+      <p:ext uri="{BB962C8B-B14F-4D97-AF65-F5344CB8AC3E}">
+        <p14:creationId xmlns:p14="http://schemas.microsoft.com/office/powerpoint/2010/main" val="3161219934"/>
       </p:ext>
     </p:extLst>
   </p:cSld>
@@ -28207,6 +28991,15 @@
 </file>
 
 <file path=customXml/item1.xml><?xml version="1.0" encoding="utf-8"?>
+<?mso-contentType ?>
+<FormTemplates xmlns="http://schemas.microsoft.com/sharepoint/v3/contenttype/forms">
+  <Display>DocumentLibraryForm</Display>
+  <Edit>DocumentLibraryForm</Edit>
+  <New>DocumentLibraryForm</New>
+</FormTemplates>
+</file>
+
+<file path=customXml/item2.xml><?xml version="1.0" encoding="utf-8"?>
 <ct:contentTypeSchema xmlns:ct="http://schemas.microsoft.com/office/2006/metadata/contentType" xmlns:ma="http://schemas.microsoft.com/office/2006/metadata/properties/metaAttributes" ct:_="" ma:_="" ma:contentTypeName="Document" ma:contentTypeID="0x0101003AB9CED55E8F8543BEFD54205924B97E" ma:contentTypeVersion="15" ma:contentTypeDescription="Create a new document." ma:contentTypeScope="" ma:versionID="7934cfc98febfa177962bc8a36be076c">
   <xsd:schema xmlns:xsd="http://www.w3.org/2001/XMLSchema" xmlns:xs="http://www.w3.org/2001/XMLSchema" xmlns:p="http://schemas.microsoft.com/office/2006/metadata/properties" xmlns:ns2="4f0d45a2-344c-4fe0-9811-4277bf2c2e17" xmlns:ns3="bb13cd20-357b-48a5-aff4-3bb4b52aae3e" targetNamespace="http://schemas.microsoft.com/office/2006/metadata/properties" ma:root="true" ma:fieldsID="aa190bc864bcebc737c679dbb323a16d" ns2:_="" ns3:_="">
     <xsd:import namespace="4f0d45a2-344c-4fe0-9811-4277bf2c2e17"/>
@@ -28443,15 +29236,6 @@
 </ct:contentTypeSchema>
 </file>
 
-<file path=customXml/item2.xml><?xml version="1.0" encoding="utf-8"?>
-<?mso-contentType ?>
-<FormTemplates xmlns="http://schemas.microsoft.com/sharepoint/v3/contenttype/forms">
-  <Display>DocumentLibraryForm</Display>
-  <Edit>DocumentLibraryForm</Edit>
-  <New>DocumentLibraryForm</New>
-</FormTemplates>
-</file>
-
 <file path=customXml/item3.xml><?xml version="1.0" encoding="utf-8"?>
 <p:properties xmlns:p="http://schemas.microsoft.com/office/2006/metadata/properties" xmlns:xsi="http://www.w3.org/2001/XMLSchema-instance" xmlns:pc="http://schemas.microsoft.com/office/infopath/2007/PartnerControls">
   <documentManagement>
@@ -28465,6 +29249,14 @@
 </file>
 
 <file path=customXml/itemProps1.xml><?xml version="1.0" encoding="utf-8"?>
+<ds:datastoreItem xmlns:ds="http://schemas.openxmlformats.org/officeDocument/2006/customXml" ds:itemID="{83441F37-C10B-49C7-9131-D813AD6E9480}">
+  <ds:schemaRefs>
+    <ds:schemaRef ds:uri="http://schemas.microsoft.com/sharepoint/v3/contenttype/forms"/>
+  </ds:schemaRefs>
+</ds:datastoreItem>
+</file>
+
+<file path=customXml/itemProps2.xml><?xml version="1.0" encoding="utf-8"?>
 <ds:datastoreItem xmlns:ds="http://schemas.openxmlformats.org/officeDocument/2006/customXml" ds:itemID="{40F892F8-B153-4A37-BD5F-A2BAB7375010}">
   <ds:schemaRefs>
     <ds:schemaRef ds:uri="http://schemas.microsoft.com/office/2006/metadata/contentType"/>
@@ -28479,14 +29271,6 @@
     <ds:schemaRef ds:uri="http://purl.org/dc/elements/1.1/"/>
     <ds:schemaRef ds:uri="http://purl.org/dc/terms/"/>
     <ds:schemaRef ds:uri="http://schemas.microsoft.com/internal/obd"/>
-  </ds:schemaRefs>
-</ds:datastoreItem>
-</file>
-
-<file path=customXml/itemProps2.xml><?xml version="1.0" encoding="utf-8"?>
-<ds:datastoreItem xmlns:ds="http://schemas.openxmlformats.org/officeDocument/2006/customXml" ds:itemID="{83441F37-C10B-49C7-9131-D813AD6E9480}">
-  <ds:schemaRefs>
-    <ds:schemaRef ds:uri="http://schemas.microsoft.com/sharepoint/v3/contenttype/forms"/>
   </ds:schemaRefs>
 </ds:datastoreItem>
 </file>

</xml_diff>

<commit_message>
Risk Assessment and Mitigation Plan
</commit_message>
<xml_diff>
--- a/Aplikacja Sports Joiner.pptx
+++ b/Aplikacja Sports Joiner.pptx
@@ -5,10 +5,10 @@
     <p:sldMasterId id="2147483648" r:id="rId4"/>
   </p:sldMasterIdLst>
   <p:notesMasterIdLst>
-    <p:notesMasterId r:id="rId26"/>
+    <p:notesMasterId r:id="rId29"/>
   </p:notesMasterIdLst>
   <p:handoutMasterIdLst>
-    <p:handoutMasterId r:id="rId27"/>
+    <p:handoutMasterId r:id="rId30"/>
   </p:handoutMasterIdLst>
   <p:sldIdLst>
     <p:sldId id="258" r:id="rId5"/>
@@ -20,18 +20,21 @@
     <p:sldId id="287" r:id="rId11"/>
     <p:sldId id="289" r:id="rId12"/>
     <p:sldId id="290" r:id="rId13"/>
-    <p:sldId id="288" r:id="rId14"/>
-    <p:sldId id="291" r:id="rId15"/>
-    <p:sldId id="292" r:id="rId16"/>
-    <p:sldId id="301" r:id="rId17"/>
-    <p:sldId id="300" r:id="rId18"/>
-    <p:sldId id="295" r:id="rId19"/>
-    <p:sldId id="296" r:id="rId20"/>
-    <p:sldId id="297" r:id="rId21"/>
-    <p:sldId id="298" r:id="rId22"/>
-    <p:sldId id="299" r:id="rId23"/>
-    <p:sldId id="279" r:id="rId24"/>
-    <p:sldId id="274" r:id="rId25"/>
+    <p:sldId id="291" r:id="rId14"/>
+    <p:sldId id="292" r:id="rId15"/>
+    <p:sldId id="305" r:id="rId16"/>
+    <p:sldId id="304" r:id="rId17"/>
+    <p:sldId id="303" r:id="rId18"/>
+    <p:sldId id="288" r:id="rId19"/>
+    <p:sldId id="301" r:id="rId20"/>
+    <p:sldId id="300" r:id="rId21"/>
+    <p:sldId id="295" r:id="rId22"/>
+    <p:sldId id="296" r:id="rId23"/>
+    <p:sldId id="297" r:id="rId24"/>
+    <p:sldId id="298" r:id="rId25"/>
+    <p:sldId id="299" r:id="rId26"/>
+    <p:sldId id="279" r:id="rId27"/>
+    <p:sldId id="274" r:id="rId28"/>
   </p:sldIdLst>
   <p:sldSz cx="12192000" cy="6858000"/>
   <p:notesSz cx="6858000" cy="9144000"/>
@@ -5801,7 +5804,7 @@
             <a:pPr rtl="0"/>
             <a:fld id="{339D21CC-DD94-204E-93C8-E1AAF3084C8D}" type="slidenum">
               <a:rPr lang="pl-PL" smtClean="0"/>
-              <a:t>20</a:t>
+              <a:t>23</a:t>
             </a:fld>
             <a:endParaRPr lang="pl-PL"/>
           </a:p>
@@ -5895,7 +5898,7 @@
             <a:pPr rtl="0"/>
             <a:fld id="{339D21CC-DD94-204E-93C8-E1AAF3084C8D}" type="slidenum">
               <a:rPr lang="pl-PL" smtClean="0"/>
-              <a:t>21</a:t>
+              <a:t>24</a:t>
             </a:fld>
             <a:endParaRPr lang="pl-PL"/>
           </a:p>
@@ -23050,244 +23053,6 @@
       </p:grpSpPr>
       <p:sp>
         <p:nvSpPr>
-          <p:cNvPr id="6" name="Tytuł 5">
-            <a:extLst>
-              <a:ext uri="{FF2B5EF4-FFF2-40B4-BE49-F238E27FC236}">
-                <a16:creationId xmlns:a16="http://schemas.microsoft.com/office/drawing/2014/main" id="{45769442-E8FA-B87A-7C95-A0B598ED0832}"/>
-              </a:ext>
-            </a:extLst>
-          </p:cNvPr>
-          <p:cNvSpPr>
-            <a:spLocks noGrp="1"/>
-          </p:cNvSpPr>
-          <p:nvPr>
-            <p:ph type="title"/>
-          </p:nvPr>
-        </p:nvSpPr>
-        <p:spPr>
-          <a:xfrm>
-            <a:off x="2597336" y="722376"/>
-            <a:ext cx="8863144" cy="764982"/>
-          </a:xfrm>
-        </p:spPr>
-        <p:txBody>
-          <a:bodyPr/>
-          <a:lstStyle/>
-          <a:p>
-            <a:r>
-              <a:rPr lang="pl-PL" dirty="0"/>
-              <a:t>Struktura bazy danych</a:t>
-            </a:r>
-          </a:p>
-        </p:txBody>
-      </p:sp>
-      <p:sp>
-        <p:nvSpPr>
-          <p:cNvPr id="8" name="Symbol zastępczy tekstu 7">
-            <a:extLst>
-              <a:ext uri="{FF2B5EF4-FFF2-40B4-BE49-F238E27FC236}">
-                <a16:creationId xmlns:a16="http://schemas.microsoft.com/office/drawing/2014/main" id="{F10490FA-D8B1-FA60-9887-9E48405BCC2D}"/>
-              </a:ext>
-            </a:extLst>
-          </p:cNvPr>
-          <p:cNvSpPr>
-            <a:spLocks noGrp="1"/>
-          </p:cNvSpPr>
-          <p:nvPr>
-            <p:ph type="body" sz="quarter" idx="13"/>
-          </p:nvPr>
-        </p:nvSpPr>
-        <p:spPr/>
-        <p:txBody>
-          <a:bodyPr/>
-          <a:lstStyle/>
-          <a:p>
-            <a:endParaRPr lang="pl-PL"/>
-          </a:p>
-        </p:txBody>
-      </p:sp>
-      <p:sp>
-        <p:nvSpPr>
-          <p:cNvPr id="5" name="Symbol zastępczy numeru slajdu 4">
-            <a:extLst>
-              <a:ext uri="{FF2B5EF4-FFF2-40B4-BE49-F238E27FC236}">
-                <a16:creationId xmlns:a16="http://schemas.microsoft.com/office/drawing/2014/main" id="{DF679D6F-A1DB-A3B5-F4CE-392847BCB6EA}"/>
-              </a:ext>
-            </a:extLst>
-          </p:cNvPr>
-          <p:cNvSpPr>
-            <a:spLocks noGrp="1"/>
-          </p:cNvSpPr>
-          <p:nvPr>
-            <p:ph type="sldNum" sz="quarter" idx="15"/>
-          </p:nvPr>
-        </p:nvSpPr>
-        <p:spPr/>
-        <p:txBody>
-          <a:bodyPr/>
-          <a:lstStyle/>
-          <a:p>
-            <a:pPr rtl="0"/>
-            <a:fld id="{CC43B8D3-9A08-F84C-9DD4-44948BA52D4B}" type="slidenum">
-              <a:rPr lang="pl-PL" noProof="0" smtClean="0"/>
-              <a:pPr rtl="0"/>
-              <a:t>10</a:t>
-            </a:fld>
-            <a:endParaRPr lang="pl-PL" noProof="0"/>
-          </a:p>
-        </p:txBody>
-      </p:sp>
-      <p:sp>
-        <p:nvSpPr>
-          <p:cNvPr id="12" name="Symbol zastępczy zawartości 11">
-            <a:extLst>
-              <a:ext uri="{FF2B5EF4-FFF2-40B4-BE49-F238E27FC236}">
-                <a16:creationId xmlns:a16="http://schemas.microsoft.com/office/drawing/2014/main" id="{EC74D70C-1F1D-9A59-9638-29D94C2C26D7}"/>
-              </a:ext>
-            </a:extLst>
-          </p:cNvPr>
-          <p:cNvSpPr>
-            <a:spLocks noGrp="1"/>
-          </p:cNvSpPr>
-          <p:nvPr>
-            <p:ph idx="1"/>
-          </p:nvPr>
-        </p:nvSpPr>
-        <p:spPr>
-          <a:xfrm>
-            <a:off x="345361" y="2019160"/>
-            <a:ext cx="4496747" cy="4346065"/>
-          </a:xfrm>
-        </p:spPr>
-        <p:txBody>
-          <a:bodyPr>
-            <a:normAutofit/>
-          </a:bodyPr>
-          <a:lstStyle/>
-          <a:p>
-            <a:pPr>
-              <a:lnSpc>
-                <a:spcPct val="150000"/>
-              </a:lnSpc>
-            </a:pPr>
-            <a:r>
-              <a:rPr lang="pl-PL" sz="2000" dirty="0"/>
-              <a:t>5 tabel (profile, użytkownicy, wydarzenia, </a:t>
-            </a:r>
-            <a:r>
-              <a:rPr lang="pl-PL" sz="2000" dirty="0" err="1"/>
-              <a:t>obiekty_sportowe</a:t>
-            </a:r>
-            <a:r>
-              <a:rPr lang="pl-PL" sz="2000" dirty="0"/>
-              <a:t>, sporty) </a:t>
-            </a:r>
-          </a:p>
-          <a:p>
-            <a:pPr>
-              <a:lnSpc>
-                <a:spcPct val="150000"/>
-              </a:lnSpc>
-            </a:pPr>
-            <a:r>
-              <a:rPr lang="pl-PL" sz="2000" dirty="0"/>
-              <a:t>Różne typy relacji między tabelami (jeden-jeden, jeden-wielu)</a:t>
-            </a:r>
-          </a:p>
-          <a:p>
-            <a:pPr>
-              <a:lnSpc>
-                <a:spcPct val="150000"/>
-              </a:lnSpc>
-            </a:pPr>
-            <a:r>
-              <a:rPr lang="pl-PL" sz="2000" dirty="0"/>
-              <a:t>4 klucze obce</a:t>
-            </a:r>
-          </a:p>
-          <a:p>
-            <a:pPr>
-              <a:lnSpc>
-                <a:spcPct val="150000"/>
-              </a:lnSpc>
-            </a:pPr>
-            <a:r>
-              <a:rPr lang="pl-PL" sz="2000" dirty="0"/>
-              <a:t>Pole `uczestnicy` jest typem pola </a:t>
-            </a:r>
-            <a:r>
-              <a:rPr lang="pl-PL" sz="2000" dirty="0" err="1"/>
-              <a:t>ManyToManyField</a:t>
-            </a:r>
-            <a:r>
-              <a:rPr lang="pl-PL" sz="2000" dirty="0"/>
-              <a:t>()</a:t>
-            </a:r>
-          </a:p>
-        </p:txBody>
-      </p:sp>
-      <p:pic>
-        <p:nvPicPr>
-          <p:cNvPr id="19" name="Obraz 18" descr="Obraz zawierający tekst, zrzut ekranu, Czcionka, Równolegle&#10;&#10;Opis wygenerowany automatycznie">
-            <a:extLst>
-              <a:ext uri="{FF2B5EF4-FFF2-40B4-BE49-F238E27FC236}">
-                <a16:creationId xmlns:a16="http://schemas.microsoft.com/office/drawing/2014/main" id="{2D0969FA-A942-BBC4-5057-B43B950D6A04}"/>
-              </a:ext>
-            </a:extLst>
-          </p:cNvPr>
-          <p:cNvPicPr>
-            <a:picLocks noChangeAspect="1"/>
-          </p:cNvPicPr>
-          <p:nvPr/>
-        </p:nvPicPr>
-        <p:blipFill>
-          <a:blip r:embed="rId2"/>
-          <a:stretch>
-            <a:fillRect/>
-          </a:stretch>
-        </p:blipFill>
-        <p:spPr>
-          <a:xfrm>
-            <a:off x="4862730" y="1595535"/>
-            <a:ext cx="6597750" cy="5193317"/>
-          </a:xfrm>
-          <a:prstGeom prst="rect">
-            <a:avLst/>
-          </a:prstGeom>
-        </p:spPr>
-      </p:pic>
-    </p:spTree>
-    <p:extLst>
-      <p:ext uri="{BB962C8B-B14F-4D97-AF65-F5344CB8AC3E}">
-        <p14:creationId xmlns:p14="http://schemas.microsoft.com/office/powerpoint/2010/main" val="1128170052"/>
-      </p:ext>
-    </p:extLst>
-  </p:cSld>
-  <p:clrMapOvr>
-    <a:masterClrMapping/>
-  </p:clrMapOvr>
-</p:sld>
-</file>
-
-<file path=ppt/slides/slide11.xml><?xml version="1.0" encoding="utf-8"?>
-<p:sld xmlns:a="http://schemas.openxmlformats.org/drawingml/2006/main" xmlns:r="http://schemas.openxmlformats.org/officeDocument/2006/relationships" xmlns:p="http://schemas.openxmlformats.org/presentationml/2006/main">
-  <p:cSld>
-    <p:spTree>
-      <p:nvGrpSpPr>
-        <p:cNvPr id="1" name=""/>
-        <p:cNvGrpSpPr/>
-        <p:nvPr/>
-      </p:nvGrpSpPr>
-      <p:grpSpPr>
-        <a:xfrm>
-          <a:off x="0" y="0"/>
-          <a:ext cx="0" cy="0"/>
-          <a:chOff x="0" y="0"/>
-          <a:chExt cx="0" cy="0"/>
-        </a:xfrm>
-      </p:grpSpPr>
-      <p:sp>
-        <p:nvSpPr>
           <p:cNvPr id="14" name="Title 1">
             <a:extLst>
               <a:ext uri="{FF2B5EF4-FFF2-40B4-BE49-F238E27FC236}">
@@ -23390,7 +23155,7 @@
                   <a:spcPts val="600"/>
                 </a:spcAft>
               </a:pPr>
-              <a:t>11</a:t>
+              <a:t>10</a:t>
             </a:fld>
             <a:endParaRPr lang="pl-PL" noProof="0"/>
           </a:p>
@@ -23707,7 +23472,7 @@
 </p:sld>
 </file>
 
-<file path=ppt/slides/slide12.xml><?xml version="1.0" encoding="utf-8"?>
+<file path=ppt/slides/slide11.xml><?xml version="1.0" encoding="utf-8"?>
 <p:sld xmlns:a="http://schemas.openxmlformats.org/drawingml/2006/main" xmlns:r="http://schemas.openxmlformats.org/officeDocument/2006/relationships" xmlns:p="http://schemas.openxmlformats.org/presentationml/2006/main">
   <p:cSld>
     <p:spTree>
@@ -23754,7 +23519,7 @@
             <a:fld id="{CC43B8D3-9A08-F84C-9DD4-44948BA52D4B}" type="slidenum">
               <a:rPr lang="pl-PL" noProof="0" smtClean="0"/>
               <a:pPr rtl="0"/>
-              <a:t>12</a:t>
+              <a:t>11</a:t>
             </a:fld>
             <a:endParaRPr lang="pl-PL" noProof="0" dirty="0"/>
           </a:p>
@@ -24127,6 +23892,266 @@
 </p:sld>
 </file>
 
+<file path=ppt/slides/slide12.xml><?xml version="1.0" encoding="utf-8"?>
+<p:sld xmlns:a="http://schemas.openxmlformats.org/drawingml/2006/main" xmlns:r="http://schemas.openxmlformats.org/officeDocument/2006/relationships" xmlns:p="http://schemas.openxmlformats.org/presentationml/2006/main">
+  <p:cSld>
+    <p:spTree>
+      <p:nvGrpSpPr>
+        <p:cNvPr id="1" name=""/>
+        <p:cNvGrpSpPr/>
+        <p:nvPr/>
+      </p:nvGrpSpPr>
+      <p:grpSpPr>
+        <a:xfrm>
+          <a:off x="0" y="0"/>
+          <a:ext cx="0" cy="0"/>
+          <a:chOff x="0" y="0"/>
+          <a:chExt cx="0" cy="0"/>
+        </a:xfrm>
+      </p:grpSpPr>
+      <p:sp>
+        <p:nvSpPr>
+          <p:cNvPr id="2" name="Tytuł 1">
+            <a:extLst>
+              <a:ext uri="{FF2B5EF4-FFF2-40B4-BE49-F238E27FC236}">
+                <a16:creationId xmlns:a16="http://schemas.microsoft.com/office/drawing/2014/main" id="{F4B53349-054E-A9FA-99D9-60094F90DD61}"/>
+              </a:ext>
+            </a:extLst>
+          </p:cNvPr>
+          <p:cNvSpPr>
+            <a:spLocks noGrp="1"/>
+          </p:cNvSpPr>
+          <p:nvPr>
+            <p:ph type="title"/>
+          </p:nvPr>
+        </p:nvSpPr>
+        <p:spPr/>
+        <p:txBody>
+          <a:bodyPr/>
+          <a:lstStyle/>
+          <a:p>
+            <a:r>
+              <a:rPr lang="pl-PL" dirty="0"/>
+              <a:t>Potencjalne ryzyka projektu</a:t>
+            </a:r>
+          </a:p>
+        </p:txBody>
+      </p:sp>
+      <p:sp>
+        <p:nvSpPr>
+          <p:cNvPr id="4" name="Symbol zastępczy tekstu 3">
+            <a:extLst>
+              <a:ext uri="{FF2B5EF4-FFF2-40B4-BE49-F238E27FC236}">
+                <a16:creationId xmlns:a16="http://schemas.microsoft.com/office/drawing/2014/main" id="{828C99D8-0981-8FCC-666C-3ADFFBBFD578}"/>
+              </a:ext>
+            </a:extLst>
+          </p:cNvPr>
+          <p:cNvSpPr>
+            <a:spLocks noGrp="1"/>
+          </p:cNvSpPr>
+          <p:nvPr>
+            <p:ph type="body" sz="quarter" idx="13"/>
+          </p:nvPr>
+        </p:nvSpPr>
+        <p:spPr/>
+        <p:txBody>
+          <a:bodyPr/>
+          <a:lstStyle/>
+          <a:p>
+            <a:endParaRPr lang="pl-PL"/>
+          </a:p>
+        </p:txBody>
+      </p:sp>
+      <p:sp>
+        <p:nvSpPr>
+          <p:cNvPr id="5" name="Symbol zastępczy numeru slajdu 4">
+            <a:extLst>
+              <a:ext uri="{FF2B5EF4-FFF2-40B4-BE49-F238E27FC236}">
+                <a16:creationId xmlns:a16="http://schemas.microsoft.com/office/drawing/2014/main" id="{9DDF1F7D-80F4-32D8-5270-7FA1E8BA00CF}"/>
+              </a:ext>
+            </a:extLst>
+          </p:cNvPr>
+          <p:cNvSpPr>
+            <a:spLocks noGrp="1"/>
+          </p:cNvSpPr>
+          <p:nvPr>
+            <p:ph type="sldNum" sz="quarter" idx="16"/>
+          </p:nvPr>
+        </p:nvSpPr>
+        <p:spPr/>
+        <p:txBody>
+          <a:bodyPr/>
+          <a:lstStyle/>
+          <a:p>
+            <a:pPr rtl="0"/>
+            <a:fld id="{CC43B8D3-9A08-F84C-9DD4-44948BA52D4B}" type="slidenum">
+              <a:rPr lang="pl-PL" noProof="0" smtClean="0"/>
+              <a:pPr rtl="0"/>
+              <a:t>12</a:t>
+            </a:fld>
+            <a:endParaRPr lang="pl-PL" noProof="0"/>
+          </a:p>
+        </p:txBody>
+      </p:sp>
+      <p:sp>
+        <p:nvSpPr>
+          <p:cNvPr id="7" name="Symbol zastępczy zawartości 4">
+            <a:extLst>
+              <a:ext uri="{FF2B5EF4-FFF2-40B4-BE49-F238E27FC236}">
+                <a16:creationId xmlns:a16="http://schemas.microsoft.com/office/drawing/2014/main" id="{C6672233-93B3-1A21-0798-5C1F0674B8F4}"/>
+              </a:ext>
+            </a:extLst>
+          </p:cNvPr>
+          <p:cNvSpPr>
+            <a:spLocks noGrp="1"/>
+          </p:cNvSpPr>
+          <p:nvPr>
+            <p:ph idx="1"/>
+          </p:nvPr>
+        </p:nvSpPr>
+        <p:spPr>
+          <a:xfrm>
+            <a:off x="844419" y="1720191"/>
+            <a:ext cx="8626151" cy="3578352"/>
+          </a:xfrm>
+        </p:spPr>
+        <p:txBody>
+          <a:bodyPr>
+            <a:normAutofit/>
+          </a:bodyPr>
+          <a:lstStyle/>
+          <a:p>
+            <a:pPr marL="285750" indent="-285750">
+              <a:buFont typeface="Arial" panose="020B0604020202020204" pitchFamily="34" charset="0"/>
+              <a:buChar char="•"/>
+            </a:pPr>
+            <a:r>
+              <a:rPr lang="pl-PL" sz="1600" dirty="0">
+                <a:solidFill>
+                  <a:srgbClr val="FF0000"/>
+                </a:solidFill>
+              </a:rPr>
+              <a:t>Problem: </a:t>
+            </a:r>
+            <a:r>
+              <a:rPr lang="pl-PL" sz="1600" dirty="0"/>
+              <a:t>Przekroczenie wyznaczonego budżetu</a:t>
+            </a:r>
+          </a:p>
+          <a:p>
+            <a:pPr marL="285750" indent="-285750">
+              <a:buFont typeface="Wingdings" panose="05000000000000000000" pitchFamily="2" charset="2"/>
+              <a:buChar char="Ø"/>
+            </a:pPr>
+            <a:r>
+              <a:rPr lang="pl-PL" sz="1600" dirty="0">
+                <a:solidFill>
+                  <a:srgbClr val="0070C0"/>
+                </a:solidFill>
+              </a:rPr>
+              <a:t>Rozwiązanie: </a:t>
+            </a:r>
+            <a:r>
+              <a:rPr lang="pl-PL" sz="1600" dirty="0"/>
+              <a:t>Po zaplanowaniu kosztów całego projektu należy wyznaczyć je ponownie z sumą o co najmniej 10% mniejszą od poprzedniej. Pozwoli to zachować środki na ewentualne nieprzewidziane koszty.</a:t>
+            </a:r>
+          </a:p>
+          <a:p>
+            <a:endParaRPr lang="pl-PL" sz="1600" dirty="0"/>
+          </a:p>
+          <a:p>
+            <a:pPr marL="285750" indent="-285750">
+              <a:buFont typeface="Arial" panose="020B0604020202020204" pitchFamily="34" charset="0"/>
+              <a:buChar char="•"/>
+            </a:pPr>
+            <a:r>
+              <a:rPr lang="pl-PL" sz="1600" dirty="0">
+                <a:solidFill>
+                  <a:srgbClr val="FF0000"/>
+                </a:solidFill>
+              </a:rPr>
+              <a:t>Problem: </a:t>
+            </a:r>
+            <a:r>
+              <a:rPr lang="pl-PL" sz="1600" dirty="0"/>
+              <a:t>Błędna komunikacja pomiędzy zespołami</a:t>
+            </a:r>
+          </a:p>
+          <a:p>
+            <a:pPr marL="285750" indent="-285750">
+              <a:buFont typeface="Wingdings" panose="05000000000000000000" pitchFamily="2" charset="2"/>
+              <a:buChar char="Ø"/>
+            </a:pPr>
+            <a:r>
+              <a:rPr lang="pl-PL" sz="1600" dirty="0">
+                <a:solidFill>
+                  <a:srgbClr val="0070C0"/>
+                </a:solidFill>
+              </a:rPr>
+              <a:t>Rozwiązanie: </a:t>
+            </a:r>
+            <a:r>
+              <a:rPr lang="pl-PL" sz="1600" dirty="0"/>
+              <a:t>Regularne spotkania wraz z osobami dowodzącymi co najmniej raz w tygodniu powinny zapobiec ewentualnym konfliktom.</a:t>
+            </a:r>
+          </a:p>
+          <a:p>
+            <a:r>
+              <a:rPr lang="pl-PL" sz="1600" dirty="0"/>
+              <a:t> </a:t>
+            </a:r>
+          </a:p>
+          <a:p>
+            <a:pPr marL="285750" indent="-285750">
+              <a:buFont typeface="Arial" panose="020B0604020202020204" pitchFamily="34" charset="0"/>
+              <a:buChar char="•"/>
+            </a:pPr>
+            <a:r>
+              <a:rPr lang="pl-PL" sz="1600" dirty="0">
+                <a:solidFill>
+                  <a:srgbClr val="FF0000"/>
+                </a:solidFill>
+              </a:rPr>
+              <a:t>Problem: </a:t>
+            </a:r>
+            <a:r>
+              <a:rPr lang="pl-PL" sz="1600" dirty="0"/>
+              <a:t>Opóźnienie poszczególnych etapów projektu</a:t>
+            </a:r>
+          </a:p>
+          <a:p>
+            <a:pPr marL="285750" indent="-285750">
+              <a:buFont typeface="Wingdings" panose="05000000000000000000" pitchFamily="2" charset="2"/>
+              <a:buChar char="Ø"/>
+            </a:pPr>
+            <a:r>
+              <a:rPr lang="pl-PL" sz="1600" dirty="0">
+                <a:solidFill>
+                  <a:srgbClr val="0070C0"/>
+                </a:solidFill>
+              </a:rPr>
+              <a:t>Rozwiązanie: </a:t>
+            </a:r>
+            <a:r>
+              <a:rPr lang="pl-PL" sz="1600" dirty="0"/>
+              <a:t>Monitorowanie stanu poszczególnych zadań przez leaderów zespołów. Oprócz tego bardzo szczegółowa oś czasu.</a:t>
+            </a:r>
+          </a:p>
+        </p:txBody>
+      </p:sp>
+    </p:spTree>
+    <p:extLst>
+      <p:ext uri="{BB962C8B-B14F-4D97-AF65-F5344CB8AC3E}">
+        <p14:creationId xmlns:p14="http://schemas.microsoft.com/office/powerpoint/2010/main" val="3100029300"/>
+      </p:ext>
+    </p:extLst>
+  </p:cSld>
+  <p:clrMapOvr>
+    <a:masterClrMapping/>
+  </p:clrMapOvr>
+</p:sld>
+</file>
+
 <file path=ppt/slides/slide13.xml><?xml version="1.0" encoding="utf-8"?>
 <p:sld xmlns:a="http://schemas.openxmlformats.org/drawingml/2006/main" xmlns:r="http://schemas.openxmlformats.org/officeDocument/2006/relationships" xmlns:p="http://schemas.openxmlformats.org/presentationml/2006/main">
   <p:cSld>
@@ -24146,6 +24171,1039 @@
       </p:grpSpPr>
       <p:sp>
         <p:nvSpPr>
+          <p:cNvPr id="10" name="Tytuł 9">
+            <a:extLst>
+              <a:ext uri="{FF2B5EF4-FFF2-40B4-BE49-F238E27FC236}">
+                <a16:creationId xmlns:a16="http://schemas.microsoft.com/office/drawing/2014/main" id="{F14F1378-9B07-C1A7-3FE6-F675BEA35ED3}"/>
+              </a:ext>
+            </a:extLst>
+          </p:cNvPr>
+          <p:cNvSpPr>
+            <a:spLocks noGrp="1"/>
+          </p:cNvSpPr>
+          <p:nvPr>
+            <p:ph type="title"/>
+          </p:nvPr>
+        </p:nvSpPr>
+        <p:spPr/>
+        <p:txBody>
+          <a:bodyPr/>
+          <a:lstStyle/>
+          <a:p>
+            <a:r>
+              <a:rPr lang="pl-PL" dirty="0"/>
+              <a:t>Potencjalne ryzyka projektu</a:t>
+            </a:r>
+          </a:p>
+        </p:txBody>
+      </p:sp>
+      <p:sp>
+        <p:nvSpPr>
+          <p:cNvPr id="11" name="Symbol zastępczy zawartości 10">
+            <a:extLst>
+              <a:ext uri="{FF2B5EF4-FFF2-40B4-BE49-F238E27FC236}">
+                <a16:creationId xmlns:a16="http://schemas.microsoft.com/office/drawing/2014/main" id="{0E7A28FC-E14A-6B56-0A24-3ACEC03B8B59}"/>
+              </a:ext>
+            </a:extLst>
+          </p:cNvPr>
+          <p:cNvSpPr>
+            <a:spLocks noGrp="1"/>
+          </p:cNvSpPr>
+          <p:nvPr>
+            <p:ph idx="1"/>
+          </p:nvPr>
+        </p:nvSpPr>
+        <p:spPr>
+          <a:xfrm>
+            <a:off x="919842" y="1710675"/>
+            <a:ext cx="8038323" cy="2245506"/>
+          </a:xfrm>
+        </p:spPr>
+        <p:txBody>
+          <a:bodyPr>
+            <a:normAutofit/>
+          </a:bodyPr>
+          <a:lstStyle/>
+          <a:p>
+            <a:pPr marL="285750" indent="-285750">
+              <a:buFont typeface="Arial" panose="020B0604020202020204" pitchFamily="34" charset="0"/>
+              <a:buChar char="•"/>
+            </a:pPr>
+            <a:r>
+              <a:rPr lang="pl-PL" sz="1600" dirty="0">
+                <a:solidFill>
+                  <a:srgbClr val="FF0000"/>
+                </a:solidFill>
+              </a:rPr>
+              <a:t>Problem:</a:t>
+            </a:r>
+            <a:r>
+              <a:rPr lang="pl-PL" sz="1600" i="1" dirty="0">
+                <a:solidFill>
+                  <a:srgbClr val="FF0000"/>
+                </a:solidFill>
+              </a:rPr>
+              <a:t> </a:t>
+            </a:r>
+            <a:r>
+              <a:rPr lang="pl-PL" sz="1600" dirty="0"/>
+              <a:t>Problemy techniczne</a:t>
+            </a:r>
+          </a:p>
+          <a:p>
+            <a:pPr marL="285750" indent="-285750">
+              <a:buFont typeface="Wingdings" panose="05000000000000000000" pitchFamily="2" charset="2"/>
+              <a:buChar char="Ø"/>
+            </a:pPr>
+            <a:r>
+              <a:rPr lang="pl-PL" sz="1600" dirty="0">
+                <a:solidFill>
+                  <a:srgbClr val="0070C0"/>
+                </a:solidFill>
+              </a:rPr>
+              <a:t>Rozwiązanie: </a:t>
+            </a:r>
+            <a:r>
+              <a:rPr lang="pl-PL" sz="1600" dirty="0"/>
+              <a:t>Szybka interwencja specjalistów z zespołu, bądź firm zewnętrznych.</a:t>
+            </a:r>
+          </a:p>
+          <a:p>
+            <a:endParaRPr lang="pl-PL" sz="1600" dirty="0"/>
+          </a:p>
+          <a:p>
+            <a:pPr marL="285750" indent="-285750">
+              <a:buFont typeface="Arial" panose="020B0604020202020204" pitchFamily="34" charset="0"/>
+              <a:buChar char="•"/>
+            </a:pPr>
+            <a:r>
+              <a:rPr lang="pl-PL" sz="1600" dirty="0">
+                <a:solidFill>
+                  <a:srgbClr val="FF0000"/>
+                </a:solidFill>
+              </a:rPr>
+              <a:t>Problem: </a:t>
+            </a:r>
+            <a:r>
+              <a:rPr lang="pl-PL" sz="1600" dirty="0"/>
+              <a:t>Błędy ludzkie</a:t>
+            </a:r>
+          </a:p>
+          <a:p>
+            <a:pPr marL="285750" indent="-285750">
+              <a:buFont typeface="Wingdings" panose="05000000000000000000" pitchFamily="2" charset="2"/>
+              <a:buChar char="Ø"/>
+            </a:pPr>
+            <a:r>
+              <a:rPr lang="pl-PL" sz="1600" dirty="0">
+                <a:solidFill>
+                  <a:srgbClr val="0070C0"/>
+                </a:solidFill>
+              </a:rPr>
+              <a:t>Rozwiązanie: </a:t>
+            </a:r>
+            <a:r>
+              <a:rPr lang="pl-PL" sz="1600" dirty="0"/>
+              <a:t>Ciężko jest być nieomylnym, dlatego właśnie potrzebni są leaderzy, monitorujący kod programistów. Niektóre błahe błędy mogą być niezauważalne przez ich autorów.</a:t>
+            </a:r>
+          </a:p>
+          <a:p>
+            <a:endParaRPr lang="pl-PL" sz="1600" dirty="0"/>
+          </a:p>
+        </p:txBody>
+      </p:sp>
+      <p:sp>
+        <p:nvSpPr>
+          <p:cNvPr id="12" name="Symbol zastępczy tekstu 11">
+            <a:extLst>
+              <a:ext uri="{FF2B5EF4-FFF2-40B4-BE49-F238E27FC236}">
+                <a16:creationId xmlns:a16="http://schemas.microsoft.com/office/drawing/2014/main" id="{ED131566-5741-77FD-1538-936E03D3AAD6}"/>
+              </a:ext>
+            </a:extLst>
+          </p:cNvPr>
+          <p:cNvSpPr>
+            <a:spLocks noGrp="1"/>
+          </p:cNvSpPr>
+          <p:nvPr>
+            <p:ph type="body" sz="quarter" idx="13"/>
+          </p:nvPr>
+        </p:nvSpPr>
+        <p:spPr/>
+        <p:txBody>
+          <a:bodyPr/>
+          <a:lstStyle/>
+          <a:p>
+            <a:endParaRPr lang="pl-PL"/>
+          </a:p>
+        </p:txBody>
+      </p:sp>
+      <p:sp>
+        <p:nvSpPr>
+          <p:cNvPr id="5" name="Symbol zastępczy numeru slajdu 4">
+            <a:extLst>
+              <a:ext uri="{FF2B5EF4-FFF2-40B4-BE49-F238E27FC236}">
+                <a16:creationId xmlns:a16="http://schemas.microsoft.com/office/drawing/2014/main" id="{62AF565B-3E0D-A22E-A28D-CA1FF8E6151C}"/>
+              </a:ext>
+            </a:extLst>
+          </p:cNvPr>
+          <p:cNvSpPr>
+            <a:spLocks noGrp="1"/>
+          </p:cNvSpPr>
+          <p:nvPr>
+            <p:ph type="sldNum" sz="quarter" idx="16"/>
+          </p:nvPr>
+        </p:nvSpPr>
+        <p:spPr>
+          <a:xfrm>
+            <a:off x="1655786" y="809244"/>
+            <a:ext cx="941832" cy="621792"/>
+          </a:xfrm>
+        </p:spPr>
+        <p:txBody>
+          <a:bodyPr/>
+          <a:lstStyle/>
+          <a:p>
+            <a:pPr rtl="0"/>
+            <a:r>
+              <a:rPr lang="pl-PL" noProof="0" dirty="0"/>
+              <a:t>13</a:t>
+            </a:r>
+          </a:p>
+        </p:txBody>
+      </p:sp>
+      <p:sp>
+        <p:nvSpPr>
+          <p:cNvPr id="13" name="pole tekstowe 12">
+            <a:extLst>
+              <a:ext uri="{FF2B5EF4-FFF2-40B4-BE49-F238E27FC236}">
+                <a16:creationId xmlns:a16="http://schemas.microsoft.com/office/drawing/2014/main" id="{DD97AEE7-19DD-7960-A46D-5D974C127121}"/>
+              </a:ext>
+            </a:extLst>
+          </p:cNvPr>
+          <p:cNvSpPr txBox="1"/>
+          <p:nvPr/>
+        </p:nvSpPr>
+        <p:spPr>
+          <a:xfrm>
+            <a:off x="919842" y="4251124"/>
+            <a:ext cx="7137919" cy="584775"/>
+          </a:xfrm>
+          <a:prstGeom prst="rect">
+            <a:avLst/>
+          </a:prstGeom>
+          <a:noFill/>
+        </p:spPr>
+        <p:txBody>
+          <a:bodyPr wrap="square" rtlCol="0">
+            <a:spAutoFit/>
+          </a:bodyPr>
+          <a:lstStyle/>
+          <a:p>
+            <a:r>
+              <a:rPr lang="pl-PL" sz="1600" b="1" i="1" dirty="0"/>
+              <a:t>Każde ryzyko ma również swoje prawdopodobieństwo i wpływ na projekt. Wszystkie te szczegóły umieszczone są w tabelce</a:t>
+            </a:r>
+          </a:p>
+        </p:txBody>
+      </p:sp>
+    </p:spTree>
+    <p:extLst>
+      <p:ext uri="{BB962C8B-B14F-4D97-AF65-F5344CB8AC3E}">
+        <p14:creationId xmlns:p14="http://schemas.microsoft.com/office/powerpoint/2010/main" val="3275439555"/>
+      </p:ext>
+    </p:extLst>
+  </p:cSld>
+  <p:clrMapOvr>
+    <a:masterClrMapping/>
+  </p:clrMapOvr>
+</p:sld>
+</file>
+
+<file path=ppt/slides/slide14.xml><?xml version="1.0" encoding="utf-8"?>
+<p:sld xmlns:a="http://schemas.openxmlformats.org/drawingml/2006/main" xmlns:r="http://schemas.openxmlformats.org/officeDocument/2006/relationships" xmlns:p="http://schemas.openxmlformats.org/presentationml/2006/main">
+  <p:cSld>
+    <p:spTree>
+      <p:nvGrpSpPr>
+        <p:cNvPr id="1" name=""/>
+        <p:cNvGrpSpPr/>
+        <p:nvPr/>
+      </p:nvGrpSpPr>
+      <p:grpSpPr>
+        <a:xfrm>
+          <a:off x="0" y="0"/>
+          <a:ext cx="0" cy="0"/>
+          <a:chOff x="0" y="0"/>
+          <a:chExt cx="0" cy="0"/>
+        </a:xfrm>
+      </p:grpSpPr>
+      <p:sp>
+        <p:nvSpPr>
+          <p:cNvPr id="6" name="Symbol zastępczy tekstu 5">
+            <a:extLst>
+              <a:ext uri="{FF2B5EF4-FFF2-40B4-BE49-F238E27FC236}">
+                <a16:creationId xmlns:a16="http://schemas.microsoft.com/office/drawing/2014/main" id="{F7796D07-1C68-DE1A-4521-42B46D6EABA2}"/>
+              </a:ext>
+            </a:extLst>
+          </p:cNvPr>
+          <p:cNvSpPr>
+            <a:spLocks noGrp="1"/>
+          </p:cNvSpPr>
+          <p:nvPr>
+            <p:ph type="body" sz="quarter" idx="13"/>
+          </p:nvPr>
+        </p:nvSpPr>
+        <p:spPr/>
+        <p:txBody>
+          <a:bodyPr/>
+          <a:lstStyle/>
+          <a:p>
+            <a:endParaRPr lang="pl-PL"/>
+          </a:p>
+        </p:txBody>
+      </p:sp>
+      <p:sp>
+        <p:nvSpPr>
+          <p:cNvPr id="5" name="Symbol zastępczy numeru slajdu 4">
+            <a:extLst>
+              <a:ext uri="{FF2B5EF4-FFF2-40B4-BE49-F238E27FC236}">
+                <a16:creationId xmlns:a16="http://schemas.microsoft.com/office/drawing/2014/main" id="{62EB1B55-AF1F-859A-17D7-0B30AD3C5054}"/>
+              </a:ext>
+            </a:extLst>
+          </p:cNvPr>
+          <p:cNvSpPr>
+            <a:spLocks noGrp="1"/>
+          </p:cNvSpPr>
+          <p:nvPr>
+            <p:ph type="sldNum" sz="quarter" idx="11"/>
+          </p:nvPr>
+        </p:nvSpPr>
+        <p:spPr/>
+        <p:txBody>
+          <a:bodyPr/>
+          <a:lstStyle/>
+          <a:p>
+            <a:pPr rtl="0"/>
+            <a:fld id="{CC43B8D3-9A08-F84C-9DD4-44948BA52D4B}" type="slidenum">
+              <a:rPr lang="pl-PL" noProof="0" smtClean="0"/>
+              <a:pPr rtl="0"/>
+              <a:t>14</a:t>
+            </a:fld>
+            <a:endParaRPr lang="pl-PL" noProof="0"/>
+          </a:p>
+        </p:txBody>
+      </p:sp>
+      <p:graphicFrame>
+        <p:nvGraphicFramePr>
+          <p:cNvPr id="7" name="Tabela 6">
+            <a:extLst>
+              <a:ext uri="{FF2B5EF4-FFF2-40B4-BE49-F238E27FC236}">
+                <a16:creationId xmlns:a16="http://schemas.microsoft.com/office/drawing/2014/main" id="{493C3B33-53FC-2F09-289C-43603669D278}"/>
+              </a:ext>
+            </a:extLst>
+          </p:cNvPr>
+          <p:cNvGraphicFramePr>
+            <a:graphicFrameLocks noGrp="1"/>
+          </p:cNvGraphicFramePr>
+          <p:nvPr>
+            <p:extLst>
+              <p:ext uri="{D42A27DB-BD31-4B8C-83A1-F6EECF244321}">
+                <p14:modId xmlns:p14="http://schemas.microsoft.com/office/powerpoint/2010/main" val="3211658597"/>
+              </p:ext>
+            </p:extLst>
+          </p:nvPr>
+        </p:nvGraphicFramePr>
+        <p:xfrm>
+          <a:off x="286656" y="128450"/>
+          <a:ext cx="11618688" cy="6601100"/>
+        </p:xfrm>
+        <a:graphic>
+          <a:graphicData uri="http://schemas.openxmlformats.org/drawingml/2006/table">
+            <a:tbl>
+              <a:tblPr firstRow="1" bandRow="1">
+                <a:tableStyleId>{69CF1AB2-1976-4502-BF36-3FF5EA218861}</a:tableStyleId>
+              </a:tblPr>
+              <a:tblGrid>
+                <a:gridCol w="2904672">
+                  <a:extLst>
+                    <a:ext uri="{9D8B030D-6E8A-4147-A177-3AD203B41FA5}">
+                      <a16:colId xmlns:a16="http://schemas.microsoft.com/office/drawing/2014/main" val="2768164944"/>
+                    </a:ext>
+                  </a:extLst>
+                </a:gridCol>
+                <a:gridCol w="2904672">
+                  <a:extLst>
+                    <a:ext uri="{9D8B030D-6E8A-4147-A177-3AD203B41FA5}">
+                      <a16:colId xmlns:a16="http://schemas.microsoft.com/office/drawing/2014/main" val="328024447"/>
+                    </a:ext>
+                  </a:extLst>
+                </a:gridCol>
+                <a:gridCol w="2904672">
+                  <a:extLst>
+                    <a:ext uri="{9D8B030D-6E8A-4147-A177-3AD203B41FA5}">
+                      <a16:colId xmlns:a16="http://schemas.microsoft.com/office/drawing/2014/main" val="437132700"/>
+                    </a:ext>
+                  </a:extLst>
+                </a:gridCol>
+                <a:gridCol w="2904672">
+                  <a:extLst>
+                    <a:ext uri="{9D8B030D-6E8A-4147-A177-3AD203B41FA5}">
+                      <a16:colId xmlns:a16="http://schemas.microsoft.com/office/drawing/2014/main" val="4051692201"/>
+                    </a:ext>
+                  </a:extLst>
+                </a:gridCol>
+              </a:tblGrid>
+              <a:tr h="1055915">
+                <a:tc>
+                  <a:txBody>
+                    <a:bodyPr/>
+                    <a:lstStyle/>
+                    <a:p>
+                      <a:pPr algn="ctr"/>
+                      <a:r>
+                        <a:rPr lang="pl-PL" dirty="0"/>
+                        <a:t>Problem</a:t>
+                      </a:r>
+                    </a:p>
+                  </a:txBody>
+                  <a:tcPr anchor="ctr"/>
+                </a:tc>
+                <a:tc>
+                  <a:txBody>
+                    <a:bodyPr/>
+                    <a:lstStyle/>
+                    <a:p>
+                      <a:pPr algn="ctr"/>
+                      <a:r>
+                        <a:rPr lang="pl-PL" dirty="0"/>
+                        <a:t>Prawdopodobieństwo</a:t>
+                      </a:r>
+                    </a:p>
+                  </a:txBody>
+                  <a:tcPr anchor="ctr"/>
+                </a:tc>
+                <a:tc>
+                  <a:txBody>
+                    <a:bodyPr/>
+                    <a:lstStyle/>
+                    <a:p>
+                      <a:pPr algn="ctr"/>
+                      <a:r>
+                        <a:rPr lang="pl-PL" dirty="0"/>
+                        <a:t>Wpływ</a:t>
+                      </a:r>
+                    </a:p>
+                  </a:txBody>
+                  <a:tcPr anchor="ctr"/>
+                </a:tc>
+                <a:tc>
+                  <a:txBody>
+                    <a:bodyPr/>
+                    <a:lstStyle/>
+                    <a:p>
+                      <a:pPr algn="ctr"/>
+                      <a:r>
+                        <a:rPr lang="pl-PL" dirty="0"/>
+                        <a:t>Rozwiązanie</a:t>
+                      </a:r>
+                    </a:p>
+                  </a:txBody>
+                  <a:tcPr anchor="ctr"/>
+                </a:tc>
+                <a:extLst>
+                  <a:ext uri="{0D108BD9-81ED-4DB2-BD59-A6C34878D82A}">
+                    <a16:rowId xmlns:a16="http://schemas.microsoft.com/office/drawing/2014/main" val="3599597014"/>
+                  </a:ext>
+                </a:extLst>
+              </a:tr>
+              <a:tr h="1055915">
+                <a:tc>
+                  <a:txBody>
+                    <a:bodyPr/>
+                    <a:lstStyle/>
+                    <a:p>
+                      <a:pPr algn="ctr"/>
+                      <a:r>
+                        <a:rPr lang="pl-PL" dirty="0"/>
+                        <a:t>Przekroczenie wyznaczonego budżetu </a:t>
+                      </a:r>
+                    </a:p>
+                  </a:txBody>
+                  <a:tcPr anchor="ctr"/>
+                </a:tc>
+                <a:tc>
+                  <a:txBody>
+                    <a:bodyPr/>
+                    <a:lstStyle/>
+                    <a:p>
+                      <a:pPr algn="ctr"/>
+                      <a:r>
+                        <a:rPr lang="pl-PL" dirty="0"/>
+                        <a:t>Bardzo wysoko</a:t>
+                      </a:r>
+                    </a:p>
+                  </a:txBody>
+                  <a:tcPr anchor="ctr"/>
+                </a:tc>
+                <a:tc>
+                  <a:txBody>
+                    <a:bodyPr/>
+                    <a:lstStyle/>
+                    <a:p>
+                      <a:pPr algn="ctr"/>
+                      <a:r>
+                        <a:rPr lang="pl-PL" dirty="0"/>
+                        <a:t>Średnio</a:t>
+                      </a:r>
+                    </a:p>
+                  </a:txBody>
+                  <a:tcPr anchor="ctr"/>
+                </a:tc>
+                <a:tc>
+                  <a:txBody>
+                    <a:bodyPr/>
+                    <a:lstStyle/>
+                    <a:p>
+                      <a:pPr algn="ctr"/>
+                      <a:r>
+                        <a:rPr lang="pl-PL" dirty="0"/>
+                        <a:t>Wyznaczenie budżetu niższego niż przewidywany</a:t>
+                      </a:r>
+                    </a:p>
+                  </a:txBody>
+                  <a:tcPr anchor="ctr"/>
+                </a:tc>
+                <a:extLst>
+                  <a:ext uri="{0D108BD9-81ED-4DB2-BD59-A6C34878D82A}">
+                    <a16:rowId xmlns:a16="http://schemas.microsoft.com/office/drawing/2014/main" val="1410915990"/>
+                  </a:ext>
+                </a:extLst>
+              </a:tr>
+              <a:tr h="1055915">
+                <a:tc>
+                  <a:txBody>
+                    <a:bodyPr/>
+                    <a:lstStyle/>
+                    <a:p>
+                      <a:pPr algn="ctr"/>
+                      <a:r>
+                        <a:rPr lang="pl-PL" dirty="0"/>
+                        <a:t>Błędna komunikacja pomiędzy zespołami</a:t>
+                      </a:r>
+                    </a:p>
+                  </a:txBody>
+                  <a:tcPr anchor="ctr"/>
+                </a:tc>
+                <a:tc>
+                  <a:txBody>
+                    <a:bodyPr/>
+                    <a:lstStyle/>
+                    <a:p>
+                      <a:pPr algn="ctr"/>
+                      <a:r>
+                        <a:rPr lang="pl-PL" dirty="0"/>
+                        <a:t>Średnio</a:t>
+                      </a:r>
+                    </a:p>
+                  </a:txBody>
+                  <a:tcPr anchor="ctr"/>
+                </a:tc>
+                <a:tc>
+                  <a:txBody>
+                    <a:bodyPr/>
+                    <a:lstStyle/>
+                    <a:p>
+                      <a:pPr algn="ctr"/>
+                      <a:r>
+                        <a:rPr lang="pl-PL" dirty="0"/>
+                        <a:t>Bardzo wysoko</a:t>
+                      </a:r>
+                    </a:p>
+                  </a:txBody>
+                  <a:tcPr anchor="ctr"/>
+                </a:tc>
+                <a:tc>
+                  <a:txBody>
+                    <a:bodyPr/>
+                    <a:lstStyle/>
+                    <a:p>
+                      <a:pPr algn="ctr"/>
+                      <a:r>
+                        <a:rPr lang="pl-PL" dirty="0"/>
+                        <a:t>Regularne spotkania</a:t>
+                      </a:r>
+                    </a:p>
+                  </a:txBody>
+                  <a:tcPr anchor="ctr"/>
+                </a:tc>
+                <a:extLst>
+                  <a:ext uri="{0D108BD9-81ED-4DB2-BD59-A6C34878D82A}">
+                    <a16:rowId xmlns:a16="http://schemas.microsoft.com/office/drawing/2014/main" val="2468562416"/>
+                  </a:ext>
+                </a:extLst>
+              </a:tr>
+              <a:tr h="1055915">
+                <a:tc>
+                  <a:txBody>
+                    <a:bodyPr/>
+                    <a:lstStyle/>
+                    <a:p>
+                      <a:pPr algn="ctr"/>
+                      <a:r>
+                        <a:rPr lang="pl-PL" dirty="0"/>
+                        <a:t>Opóźnienie poszczególnych etapów projektu</a:t>
+                      </a:r>
+                    </a:p>
+                  </a:txBody>
+                  <a:tcPr anchor="ctr"/>
+                </a:tc>
+                <a:tc>
+                  <a:txBody>
+                    <a:bodyPr/>
+                    <a:lstStyle/>
+                    <a:p>
+                      <a:pPr algn="ctr"/>
+                      <a:r>
+                        <a:rPr lang="pl-PL" dirty="0"/>
+                        <a:t>Wysoko</a:t>
+                      </a:r>
+                    </a:p>
+                  </a:txBody>
+                  <a:tcPr anchor="ctr"/>
+                </a:tc>
+                <a:tc>
+                  <a:txBody>
+                    <a:bodyPr/>
+                    <a:lstStyle/>
+                    <a:p>
+                      <a:pPr algn="ctr"/>
+                      <a:r>
+                        <a:rPr lang="pl-PL" dirty="0"/>
+                        <a:t>Wysoko</a:t>
+                      </a:r>
+                    </a:p>
+                  </a:txBody>
+                  <a:tcPr anchor="ctr"/>
+                </a:tc>
+                <a:tc>
+                  <a:txBody>
+                    <a:bodyPr/>
+                    <a:lstStyle/>
+                    <a:p>
+                      <a:pPr algn="ctr"/>
+                      <a:r>
+                        <a:rPr lang="pl-PL" dirty="0"/>
+                        <a:t>Monitorowanie statusu poszczególnych etapów</a:t>
+                      </a:r>
+                    </a:p>
+                  </a:txBody>
+                  <a:tcPr anchor="ctr"/>
+                </a:tc>
+                <a:extLst>
+                  <a:ext uri="{0D108BD9-81ED-4DB2-BD59-A6C34878D82A}">
+                    <a16:rowId xmlns:a16="http://schemas.microsoft.com/office/drawing/2014/main" val="1908468264"/>
+                  </a:ext>
+                </a:extLst>
+              </a:tr>
+              <a:tr h="1055915">
+                <a:tc>
+                  <a:txBody>
+                    <a:bodyPr/>
+                    <a:lstStyle/>
+                    <a:p>
+                      <a:pPr algn="ctr"/>
+                      <a:r>
+                        <a:rPr lang="pl-PL" dirty="0"/>
+                        <a:t>Problemy techniczne</a:t>
+                      </a:r>
+                    </a:p>
+                  </a:txBody>
+                  <a:tcPr anchor="ctr"/>
+                </a:tc>
+                <a:tc>
+                  <a:txBody>
+                    <a:bodyPr/>
+                    <a:lstStyle/>
+                    <a:p>
+                      <a:pPr algn="ctr"/>
+                      <a:r>
+                        <a:rPr lang="pl-PL" dirty="0"/>
+                        <a:t>Wysoko</a:t>
+                      </a:r>
+                    </a:p>
+                  </a:txBody>
+                  <a:tcPr anchor="ctr"/>
+                </a:tc>
+                <a:tc>
+                  <a:txBody>
+                    <a:bodyPr/>
+                    <a:lstStyle/>
+                    <a:p>
+                      <a:pPr algn="ctr"/>
+                      <a:r>
+                        <a:rPr lang="pl-PL" dirty="0"/>
+                        <a:t>Bardzo wysoko</a:t>
+                      </a:r>
+                    </a:p>
+                  </a:txBody>
+                  <a:tcPr anchor="ctr"/>
+                </a:tc>
+                <a:tc>
+                  <a:txBody>
+                    <a:bodyPr/>
+                    <a:lstStyle/>
+                    <a:p>
+                      <a:pPr algn="ctr"/>
+                      <a:r>
+                        <a:rPr lang="pl-PL" dirty="0"/>
+                        <a:t>Szybka naprawa przez specjalistów</a:t>
+                      </a:r>
+                    </a:p>
+                  </a:txBody>
+                  <a:tcPr anchor="ctr"/>
+                </a:tc>
+                <a:extLst>
+                  <a:ext uri="{0D108BD9-81ED-4DB2-BD59-A6C34878D82A}">
+                    <a16:rowId xmlns:a16="http://schemas.microsoft.com/office/drawing/2014/main" val="1817012036"/>
+                  </a:ext>
+                </a:extLst>
+              </a:tr>
+              <a:tr h="1055915">
+                <a:tc>
+                  <a:txBody>
+                    <a:bodyPr/>
+                    <a:lstStyle/>
+                    <a:p>
+                      <a:pPr algn="ctr"/>
+                      <a:r>
+                        <a:rPr lang="pl-PL" dirty="0"/>
+                        <a:t>Błędy ludzkie</a:t>
+                      </a:r>
+                    </a:p>
+                  </a:txBody>
+                  <a:tcPr anchor="ctr"/>
+                </a:tc>
+                <a:tc>
+                  <a:txBody>
+                    <a:bodyPr/>
+                    <a:lstStyle/>
+                    <a:p>
+                      <a:pPr algn="ctr"/>
+                      <a:r>
+                        <a:rPr lang="pl-PL" dirty="0"/>
+                        <a:t>Bardzo wysoko</a:t>
+                      </a:r>
+                    </a:p>
+                  </a:txBody>
+                  <a:tcPr anchor="ctr"/>
+                </a:tc>
+                <a:tc>
+                  <a:txBody>
+                    <a:bodyPr/>
+                    <a:lstStyle/>
+                    <a:p>
+                      <a:pPr algn="ctr"/>
+                      <a:r>
+                        <a:rPr lang="pl-PL" dirty="0"/>
+                        <a:t>Średnio</a:t>
+                      </a:r>
+                    </a:p>
+                  </a:txBody>
+                  <a:tcPr anchor="ctr"/>
+                </a:tc>
+                <a:tc>
+                  <a:txBody>
+                    <a:bodyPr/>
+                    <a:lstStyle/>
+                    <a:p>
+                      <a:pPr algn="ctr"/>
+                      <a:r>
+                        <a:rPr lang="pl-PL" dirty="0"/>
+                        <a:t>Weryfikacja pracy przez współpracowników / leaderów</a:t>
+                      </a:r>
+                    </a:p>
+                  </a:txBody>
+                  <a:tcPr anchor="ctr"/>
+                </a:tc>
+                <a:extLst>
+                  <a:ext uri="{0D108BD9-81ED-4DB2-BD59-A6C34878D82A}">
+                    <a16:rowId xmlns:a16="http://schemas.microsoft.com/office/drawing/2014/main" val="936869040"/>
+                  </a:ext>
+                </a:extLst>
+              </a:tr>
+            </a:tbl>
+          </a:graphicData>
+        </a:graphic>
+      </p:graphicFrame>
+    </p:spTree>
+    <p:extLst>
+      <p:ext uri="{BB962C8B-B14F-4D97-AF65-F5344CB8AC3E}">
+        <p14:creationId xmlns:p14="http://schemas.microsoft.com/office/powerpoint/2010/main" val="1027414327"/>
+      </p:ext>
+    </p:extLst>
+  </p:cSld>
+  <p:clrMapOvr>
+    <a:masterClrMapping/>
+  </p:clrMapOvr>
+</p:sld>
+</file>
+
+<file path=ppt/slides/slide15.xml><?xml version="1.0" encoding="utf-8"?>
+<p:sld xmlns:a="http://schemas.openxmlformats.org/drawingml/2006/main" xmlns:r="http://schemas.openxmlformats.org/officeDocument/2006/relationships" xmlns:p="http://schemas.openxmlformats.org/presentationml/2006/main">
+  <p:cSld>
+    <p:spTree>
+      <p:nvGrpSpPr>
+        <p:cNvPr id="1" name=""/>
+        <p:cNvGrpSpPr/>
+        <p:nvPr/>
+      </p:nvGrpSpPr>
+      <p:grpSpPr>
+        <a:xfrm>
+          <a:off x="0" y="0"/>
+          <a:ext cx="0" cy="0"/>
+          <a:chOff x="0" y="0"/>
+          <a:chExt cx="0" cy="0"/>
+        </a:xfrm>
+      </p:grpSpPr>
+      <p:sp>
+        <p:nvSpPr>
+          <p:cNvPr id="6" name="Tytuł 5">
+            <a:extLst>
+              <a:ext uri="{FF2B5EF4-FFF2-40B4-BE49-F238E27FC236}">
+                <a16:creationId xmlns:a16="http://schemas.microsoft.com/office/drawing/2014/main" id="{45769442-E8FA-B87A-7C95-A0B598ED0832}"/>
+              </a:ext>
+            </a:extLst>
+          </p:cNvPr>
+          <p:cNvSpPr>
+            <a:spLocks noGrp="1"/>
+          </p:cNvSpPr>
+          <p:nvPr>
+            <p:ph type="title"/>
+          </p:nvPr>
+        </p:nvSpPr>
+        <p:spPr>
+          <a:xfrm>
+            <a:off x="2597336" y="722376"/>
+            <a:ext cx="8863144" cy="764982"/>
+          </a:xfrm>
+        </p:spPr>
+        <p:txBody>
+          <a:bodyPr/>
+          <a:lstStyle/>
+          <a:p>
+            <a:r>
+              <a:rPr lang="pl-PL" dirty="0"/>
+              <a:t>Struktura bazy danych</a:t>
+            </a:r>
+          </a:p>
+        </p:txBody>
+      </p:sp>
+      <p:sp>
+        <p:nvSpPr>
+          <p:cNvPr id="8" name="Symbol zastępczy tekstu 7">
+            <a:extLst>
+              <a:ext uri="{FF2B5EF4-FFF2-40B4-BE49-F238E27FC236}">
+                <a16:creationId xmlns:a16="http://schemas.microsoft.com/office/drawing/2014/main" id="{F10490FA-D8B1-FA60-9887-9E48405BCC2D}"/>
+              </a:ext>
+            </a:extLst>
+          </p:cNvPr>
+          <p:cNvSpPr>
+            <a:spLocks noGrp="1"/>
+          </p:cNvSpPr>
+          <p:nvPr>
+            <p:ph type="body" sz="quarter" idx="13"/>
+          </p:nvPr>
+        </p:nvSpPr>
+        <p:spPr/>
+        <p:txBody>
+          <a:bodyPr/>
+          <a:lstStyle/>
+          <a:p>
+            <a:endParaRPr lang="pl-PL"/>
+          </a:p>
+        </p:txBody>
+      </p:sp>
+      <p:sp>
+        <p:nvSpPr>
+          <p:cNvPr id="5" name="Symbol zastępczy numeru slajdu 4">
+            <a:extLst>
+              <a:ext uri="{FF2B5EF4-FFF2-40B4-BE49-F238E27FC236}">
+                <a16:creationId xmlns:a16="http://schemas.microsoft.com/office/drawing/2014/main" id="{DF679D6F-A1DB-A3B5-F4CE-392847BCB6EA}"/>
+              </a:ext>
+            </a:extLst>
+          </p:cNvPr>
+          <p:cNvSpPr>
+            <a:spLocks noGrp="1"/>
+          </p:cNvSpPr>
+          <p:nvPr>
+            <p:ph type="sldNum" sz="quarter" idx="15"/>
+          </p:nvPr>
+        </p:nvSpPr>
+        <p:spPr/>
+        <p:txBody>
+          <a:bodyPr/>
+          <a:lstStyle/>
+          <a:p>
+            <a:pPr rtl="0"/>
+            <a:fld id="{CC43B8D3-9A08-F84C-9DD4-44948BA52D4B}" type="slidenum">
+              <a:rPr lang="pl-PL" noProof="0" smtClean="0"/>
+              <a:pPr rtl="0"/>
+              <a:t>15</a:t>
+            </a:fld>
+            <a:endParaRPr lang="pl-PL" noProof="0" dirty="0"/>
+          </a:p>
+        </p:txBody>
+      </p:sp>
+      <p:sp>
+        <p:nvSpPr>
+          <p:cNvPr id="12" name="Symbol zastępczy zawartości 11">
+            <a:extLst>
+              <a:ext uri="{FF2B5EF4-FFF2-40B4-BE49-F238E27FC236}">
+                <a16:creationId xmlns:a16="http://schemas.microsoft.com/office/drawing/2014/main" id="{EC74D70C-1F1D-9A59-9638-29D94C2C26D7}"/>
+              </a:ext>
+            </a:extLst>
+          </p:cNvPr>
+          <p:cNvSpPr>
+            <a:spLocks noGrp="1"/>
+          </p:cNvSpPr>
+          <p:nvPr>
+            <p:ph idx="1"/>
+          </p:nvPr>
+        </p:nvSpPr>
+        <p:spPr>
+          <a:xfrm>
+            <a:off x="345361" y="2019160"/>
+            <a:ext cx="4496747" cy="4346065"/>
+          </a:xfrm>
+        </p:spPr>
+        <p:txBody>
+          <a:bodyPr>
+            <a:normAutofit/>
+          </a:bodyPr>
+          <a:lstStyle/>
+          <a:p>
+            <a:pPr>
+              <a:lnSpc>
+                <a:spcPct val="150000"/>
+              </a:lnSpc>
+            </a:pPr>
+            <a:r>
+              <a:rPr lang="pl-PL" sz="2000" dirty="0"/>
+              <a:t>5 tabel (profile, użytkownicy, wydarzenia, </a:t>
+            </a:r>
+            <a:r>
+              <a:rPr lang="pl-PL" sz="2000" dirty="0" err="1"/>
+              <a:t>obiekty_sportowe</a:t>
+            </a:r>
+            <a:r>
+              <a:rPr lang="pl-PL" sz="2000" dirty="0"/>
+              <a:t>, sporty) </a:t>
+            </a:r>
+          </a:p>
+          <a:p>
+            <a:pPr>
+              <a:lnSpc>
+                <a:spcPct val="150000"/>
+              </a:lnSpc>
+            </a:pPr>
+            <a:r>
+              <a:rPr lang="pl-PL" sz="2000" dirty="0"/>
+              <a:t>Różne typy relacji między tabelami (jeden-jeden, jeden-wielu)</a:t>
+            </a:r>
+          </a:p>
+          <a:p>
+            <a:pPr>
+              <a:lnSpc>
+                <a:spcPct val="150000"/>
+              </a:lnSpc>
+            </a:pPr>
+            <a:r>
+              <a:rPr lang="pl-PL" sz="2000" dirty="0"/>
+              <a:t>4 klucze obce</a:t>
+            </a:r>
+          </a:p>
+          <a:p>
+            <a:pPr>
+              <a:lnSpc>
+                <a:spcPct val="150000"/>
+              </a:lnSpc>
+            </a:pPr>
+            <a:r>
+              <a:rPr lang="pl-PL" sz="2000" dirty="0"/>
+              <a:t>Pole `uczestnicy` jest typem pola </a:t>
+            </a:r>
+            <a:r>
+              <a:rPr lang="pl-PL" sz="2000" dirty="0" err="1"/>
+              <a:t>ManyToManyField</a:t>
+            </a:r>
+            <a:r>
+              <a:rPr lang="pl-PL" sz="2000" dirty="0"/>
+              <a:t>()</a:t>
+            </a:r>
+          </a:p>
+        </p:txBody>
+      </p:sp>
+      <p:pic>
+        <p:nvPicPr>
+          <p:cNvPr id="19" name="Obraz 18" descr="Obraz zawierający tekst, zrzut ekranu, Czcionka, Równolegle&#10;&#10;Opis wygenerowany automatycznie">
+            <a:extLst>
+              <a:ext uri="{FF2B5EF4-FFF2-40B4-BE49-F238E27FC236}">
+                <a16:creationId xmlns:a16="http://schemas.microsoft.com/office/drawing/2014/main" id="{2D0969FA-A942-BBC4-5057-B43B950D6A04}"/>
+              </a:ext>
+            </a:extLst>
+          </p:cNvPr>
+          <p:cNvPicPr>
+            <a:picLocks noChangeAspect="1"/>
+          </p:cNvPicPr>
+          <p:nvPr/>
+        </p:nvPicPr>
+        <p:blipFill>
+          <a:blip r:embed="rId2"/>
+          <a:stretch>
+            <a:fillRect/>
+          </a:stretch>
+        </p:blipFill>
+        <p:spPr>
+          <a:xfrm>
+            <a:off x="4862730" y="1595535"/>
+            <a:ext cx="6597750" cy="5193317"/>
+          </a:xfrm>
+          <a:prstGeom prst="rect">
+            <a:avLst/>
+          </a:prstGeom>
+        </p:spPr>
+      </p:pic>
+    </p:spTree>
+    <p:extLst>
+      <p:ext uri="{BB962C8B-B14F-4D97-AF65-F5344CB8AC3E}">
+        <p14:creationId xmlns:p14="http://schemas.microsoft.com/office/powerpoint/2010/main" val="1128170052"/>
+      </p:ext>
+    </p:extLst>
+  </p:cSld>
+  <p:clrMapOvr>
+    <a:masterClrMapping/>
+  </p:clrMapOvr>
+</p:sld>
+</file>
+
+<file path=ppt/slides/slide16.xml><?xml version="1.0" encoding="utf-8"?>
+<p:sld xmlns:a="http://schemas.openxmlformats.org/drawingml/2006/main" xmlns:r="http://schemas.openxmlformats.org/officeDocument/2006/relationships" xmlns:p="http://schemas.openxmlformats.org/presentationml/2006/main">
+  <p:cSld>
+    <p:spTree>
+      <p:nvGrpSpPr>
+        <p:cNvPr id="1" name=""/>
+        <p:cNvGrpSpPr/>
+        <p:nvPr/>
+      </p:nvGrpSpPr>
+      <p:grpSpPr>
+        <a:xfrm>
+          <a:off x="0" y="0"/>
+          <a:ext cx="0" cy="0"/>
+          <a:chOff x="0" y="0"/>
+          <a:chExt cx="0" cy="0"/>
+        </a:xfrm>
+      </p:grpSpPr>
+      <p:sp>
+        <p:nvSpPr>
           <p:cNvPr id="2" name="Tytuł 1">
             <a:extLst>
               <a:ext uri="{FF2B5EF4-FFF2-40B4-BE49-F238E27FC236}">
@@ -24190,7 +25248,7 @@
 </p:sld>
 </file>
 
-<file path=ppt/slides/slide14.xml><?xml version="1.0" encoding="utf-8"?>
+<file path=ppt/slides/slide17.xml><?xml version="1.0" encoding="utf-8"?>
 <p:sld xmlns:a="http://schemas.openxmlformats.org/drawingml/2006/main" xmlns:r="http://schemas.openxmlformats.org/officeDocument/2006/relationships" xmlns:p="http://schemas.openxmlformats.org/presentationml/2006/main">
   <p:cSld>
     <p:spTree>
@@ -24309,7 +25367,7 @@
 </p:sld>
 </file>
 
-<file path=ppt/slides/slide15.xml><?xml version="1.0" encoding="utf-8"?>
+<file path=ppt/slides/slide18.xml><?xml version="1.0" encoding="utf-8"?>
 <p:sld xmlns:a="http://schemas.openxmlformats.org/drawingml/2006/main" xmlns:r="http://schemas.openxmlformats.org/officeDocument/2006/relationships" xmlns:p="http://schemas.openxmlformats.org/presentationml/2006/main">
   <p:cSld>
     <p:spTree>
@@ -24428,7 +25486,7 @@
 </p:sld>
 </file>
 
-<file path=ppt/slides/slide16.xml><?xml version="1.0" encoding="utf-8"?>
+<file path=ppt/slides/slide19.xml><?xml version="1.0" encoding="utf-8"?>
 <p:sld xmlns:a="http://schemas.openxmlformats.org/drawingml/2006/main" xmlns:r="http://schemas.openxmlformats.org/officeDocument/2006/relationships" xmlns:p="http://schemas.openxmlformats.org/presentationml/2006/main">
   <p:cSld>
     <p:spTree>
@@ -24547,7 +25605,258 @@
 </p:sld>
 </file>
 
-<file path=ppt/slides/slide17.xml><?xml version="1.0" encoding="utf-8"?>
+<file path=ppt/slides/slide2.xml><?xml version="1.0" encoding="utf-8"?>
+<p:sld xmlns:a="http://schemas.openxmlformats.org/drawingml/2006/main" xmlns:r="http://schemas.openxmlformats.org/officeDocument/2006/relationships" xmlns:p="http://schemas.openxmlformats.org/presentationml/2006/main">
+  <p:cSld>
+    <p:bg>
+      <p:bgPr>
+        <a:solidFill>
+          <a:schemeClr val="bg2"/>
+        </a:solidFill>
+        <a:effectLst/>
+      </p:bgPr>
+    </p:bg>
+    <p:spTree>
+      <p:nvGrpSpPr>
+        <p:cNvPr id="1" name=""/>
+        <p:cNvGrpSpPr/>
+        <p:nvPr/>
+      </p:nvGrpSpPr>
+      <p:grpSpPr>
+        <a:xfrm>
+          <a:off x="0" y="0"/>
+          <a:ext cx="0" cy="0"/>
+          <a:chOff x="0" y="0"/>
+          <a:chExt cx="0" cy="0"/>
+        </a:xfrm>
+      </p:grpSpPr>
+      <p:sp>
+        <p:nvSpPr>
+          <p:cNvPr id="12" name="Tytuł 11">
+            <a:extLst>
+              <a:ext uri="{FF2B5EF4-FFF2-40B4-BE49-F238E27FC236}">
+                <a16:creationId xmlns:a16="http://schemas.microsoft.com/office/drawing/2014/main" id="{0BA60034-9E02-4BFF-D46B-98C157D63892}"/>
+              </a:ext>
+            </a:extLst>
+          </p:cNvPr>
+          <p:cNvSpPr>
+            <a:spLocks noGrp="1"/>
+          </p:cNvSpPr>
+          <p:nvPr>
+            <p:ph type="title"/>
+          </p:nvPr>
+        </p:nvSpPr>
+        <p:spPr/>
+        <p:txBody>
+          <a:bodyPr rtlCol="0"/>
+          <a:lstStyle>
+            <a:defPPr>
+              <a:defRPr lang="pl-PL"/>
+            </a:defPPr>
+          </a:lstStyle>
+          <a:p>
+            <a:pPr rtl="0"/>
+            <a:r>
+              <a:rPr lang="pl-PL"/>
+              <a:t>Wstęp</a:t>
+            </a:r>
+          </a:p>
+        </p:txBody>
+      </p:sp>
+      <p:sp>
+        <p:nvSpPr>
+          <p:cNvPr id="2" name="Zawartość — symbol zastępczy 1">
+            <a:extLst>
+              <a:ext uri="{FF2B5EF4-FFF2-40B4-BE49-F238E27FC236}">
+                <a16:creationId xmlns:a16="http://schemas.microsoft.com/office/drawing/2014/main" id="{2BA91497-60EB-6CC6-BE1A-11323E8A9677}"/>
+              </a:ext>
+            </a:extLst>
+          </p:cNvPr>
+          <p:cNvSpPr>
+            <a:spLocks noGrp="1"/>
+          </p:cNvSpPr>
+          <p:nvPr>
+            <p:ph idx="1"/>
+          </p:nvPr>
+        </p:nvSpPr>
+        <p:spPr>
+          <a:xfrm>
+            <a:off x="3556518" y="1918993"/>
+            <a:ext cx="5932714" cy="3578352"/>
+          </a:xfrm>
+        </p:spPr>
+        <p:txBody>
+          <a:bodyPr rtlCol="0">
+            <a:normAutofit lnSpcReduction="10000"/>
+          </a:bodyPr>
+          <a:lstStyle>
+            <a:defPPr>
+              <a:defRPr lang="pl-PL"/>
+            </a:defPPr>
+          </a:lstStyle>
+          <a:p>
+            <a:pPr rtl="0"/>
+            <a:r>
+              <a:rPr lang="pl-PL" dirty="0"/>
+              <a:t>W dzisiejszych czasach ciężko ludziom zadbać o regularną aktywność fizyczną. Prowadzi to do pogorszenia stanu zdrowia, jak również do problemów z poczuciem własnej wartości. Projekt, który za chwilę zostanie omówiony to narzędzie pozwalające pomóc osobie w dowolnym wieku. Jest to aplikacja, w której każdy może dodać wydarzenie sportowe, aby zebrać jak najwięcej uczestników. Niektóre dyscypliny sportowe wymagają zebrania większej grupy uczestników (np. piłka nożna), a ta aplikacja idealnie rozwiązuje ten problem.</a:t>
+            </a:r>
+          </a:p>
+        </p:txBody>
+      </p:sp>
+      <p:sp>
+        <p:nvSpPr>
+          <p:cNvPr id="25" name="Tekst — symbol zastępczy 24">
+            <a:extLst>
+              <a:ext uri="{FF2B5EF4-FFF2-40B4-BE49-F238E27FC236}">
+                <a16:creationId xmlns:a16="http://schemas.microsoft.com/office/drawing/2014/main" id="{409EE273-65DC-EBC2-149C-7BB5726CEBDB}"/>
+              </a:ext>
+            </a:extLst>
+          </p:cNvPr>
+          <p:cNvSpPr>
+            <a:spLocks noGrp="1"/>
+          </p:cNvSpPr>
+          <p:nvPr>
+            <p:ph type="body" sz="quarter" idx="13"/>
+          </p:nvPr>
+        </p:nvSpPr>
+        <p:spPr/>
+        <p:txBody>
+          <a:bodyPr rtlCol="0"/>
+          <a:lstStyle>
+            <a:defPPr>
+              <a:defRPr lang="pl-PL"/>
+            </a:defPPr>
+          </a:lstStyle>
+          <a:p>
+            <a:pPr rtl="0"/>
+            <a:r>
+              <a:rPr lang="pl-PL"/>
+              <a:t>3</a:t>
+            </a:r>
+          </a:p>
+        </p:txBody>
+      </p:sp>
+      <p:sp>
+        <p:nvSpPr>
+          <p:cNvPr id="27" name="Numer slajdu — symbol zastępczy 26">
+            <a:extLst>
+              <a:ext uri="{FF2B5EF4-FFF2-40B4-BE49-F238E27FC236}">
+                <a16:creationId xmlns:a16="http://schemas.microsoft.com/office/drawing/2014/main" id="{900E35B6-58C6-ABFD-1333-AA1B7702D18A}"/>
+              </a:ext>
+            </a:extLst>
+          </p:cNvPr>
+          <p:cNvSpPr>
+            <a:spLocks noGrp="1"/>
+          </p:cNvSpPr>
+          <p:nvPr>
+            <p:ph type="sldNum" sz="quarter" idx="16"/>
+          </p:nvPr>
+        </p:nvSpPr>
+        <p:spPr/>
+        <p:txBody>
+          <a:bodyPr rtlCol="0"/>
+          <a:lstStyle>
+            <a:defPPr>
+              <a:defRPr lang="pl-PL"/>
+            </a:defPPr>
+          </a:lstStyle>
+          <a:p>
+            <a:pPr rtl="0"/>
+            <a:fld id="{CC43B8D3-9A08-F84C-9DD4-44948BA52D4B}" type="slidenum">
+              <a:rPr lang="pl-PL" smtClean="0"/>
+              <a:pPr rtl="0"/>
+              <a:t>2</a:t>
+            </a:fld>
+            <a:endParaRPr lang="pl-PL"/>
+          </a:p>
+        </p:txBody>
+      </p:sp>
+      <p:pic>
+        <p:nvPicPr>
+          <p:cNvPr id="4" name="Obraz 3" descr="Obraz zawierający tekst, Czcionka, Grafika, logo&#10;&#10;Opis wygenerowany automatycznie">
+            <a:extLst>
+              <a:ext uri="{FF2B5EF4-FFF2-40B4-BE49-F238E27FC236}">
+                <a16:creationId xmlns:a16="http://schemas.microsoft.com/office/drawing/2014/main" id="{3D8FA1F5-2664-B478-675F-35AA02A1B0F2}"/>
+              </a:ext>
+            </a:extLst>
+          </p:cNvPr>
+          <p:cNvPicPr>
+            <a:picLocks noChangeAspect="1"/>
+          </p:cNvPicPr>
+          <p:nvPr/>
+        </p:nvPicPr>
+        <p:blipFill>
+          <a:blip r:embed="rId3"/>
+          <a:stretch>
+            <a:fillRect/>
+          </a:stretch>
+        </p:blipFill>
+        <p:spPr>
+          <a:xfrm>
+            <a:off x="933952" y="1918993"/>
+            <a:ext cx="2114878" cy="2101660"/>
+          </a:xfrm>
+          <a:prstGeom prst="rect">
+            <a:avLst/>
+          </a:prstGeom>
+        </p:spPr>
+      </p:pic>
+      <p:sp>
+        <p:nvSpPr>
+          <p:cNvPr id="5" name="pole tekstowe 4">
+            <a:extLst>
+              <a:ext uri="{FF2B5EF4-FFF2-40B4-BE49-F238E27FC236}">
+                <a16:creationId xmlns:a16="http://schemas.microsoft.com/office/drawing/2014/main" id="{3DBD1273-0B3A-2011-72CD-B5D543236E15}"/>
+              </a:ext>
+            </a:extLst>
+          </p:cNvPr>
+          <p:cNvSpPr txBox="1"/>
+          <p:nvPr/>
+        </p:nvSpPr>
+        <p:spPr>
+          <a:xfrm>
+            <a:off x="543431" y="4030776"/>
+            <a:ext cx="2895919" cy="400110"/>
+          </a:xfrm>
+          <a:prstGeom prst="rect">
+            <a:avLst/>
+          </a:prstGeom>
+          <a:noFill/>
+        </p:spPr>
+        <p:txBody>
+          <a:bodyPr wrap="square" rtlCol="0">
+            <a:spAutoFit/>
+          </a:bodyPr>
+          <a:lstStyle/>
+          <a:p>
+            <a:pPr algn="ctr"/>
+            <a:r>
+              <a:rPr lang="pl-PL" sz="2000" i="1" dirty="0">
+                <a:solidFill>
+                  <a:schemeClr val="accent4">
+                    <a:lumMod val="50000"/>
+                  </a:schemeClr>
+                </a:solidFill>
+              </a:rPr>
+              <a:t>Logo aplikacji</a:t>
+            </a:r>
+          </a:p>
+        </p:txBody>
+      </p:sp>
+    </p:spTree>
+    <p:extLst>
+      <p:ext uri="{BB962C8B-B14F-4D97-AF65-F5344CB8AC3E}">
+        <p14:creationId xmlns:p14="http://schemas.microsoft.com/office/powerpoint/2010/main" val="1343223353"/>
+      </p:ext>
+    </p:extLst>
+  </p:cSld>
+  <p:clrMapOvr>
+    <a:masterClrMapping/>
+  </p:clrMapOvr>
+</p:sld>
+</file>
+
+<file path=ppt/slides/slide20.xml><?xml version="1.0" encoding="utf-8"?>
 <p:sld xmlns:a="http://schemas.openxmlformats.org/drawingml/2006/main" xmlns:r="http://schemas.openxmlformats.org/officeDocument/2006/relationships" xmlns:p="http://schemas.openxmlformats.org/presentationml/2006/main">
   <p:cSld>
     <p:spTree>
@@ -24666,7 +25975,7 @@
 </p:sld>
 </file>
 
-<file path=ppt/slides/slide18.xml><?xml version="1.0" encoding="utf-8"?>
+<file path=ppt/slides/slide21.xml><?xml version="1.0" encoding="utf-8"?>
 <p:sld xmlns:a="http://schemas.openxmlformats.org/drawingml/2006/main" xmlns:r="http://schemas.openxmlformats.org/officeDocument/2006/relationships" xmlns:p="http://schemas.openxmlformats.org/presentationml/2006/main">
   <p:cSld>
     <p:spTree>
@@ -24785,7 +26094,7 @@
 </p:sld>
 </file>
 
-<file path=ppt/slides/slide19.xml><?xml version="1.0" encoding="utf-8"?>
+<file path=ppt/slides/slide22.xml><?xml version="1.0" encoding="utf-8"?>
 <p:sld xmlns:a="http://schemas.openxmlformats.org/drawingml/2006/main" xmlns:r="http://schemas.openxmlformats.org/officeDocument/2006/relationships" xmlns:p="http://schemas.openxmlformats.org/presentationml/2006/main">
   <p:cSld>
     <p:spTree>
@@ -24904,7 +26213,7 @@
 </p:sld>
 </file>
 
-<file path=ppt/slides/slide2.xml><?xml version="1.0" encoding="utf-8"?>
+<file path=ppt/slides/slide23.xml><?xml version="1.0" encoding="utf-8"?>
 <p:sld xmlns:a="http://schemas.openxmlformats.org/drawingml/2006/main" xmlns:r="http://schemas.openxmlformats.org/officeDocument/2006/relationships" xmlns:p="http://schemas.openxmlformats.org/presentationml/2006/main">
   <p:cSld>
     <p:bg>
@@ -24931,257 +26240,6 @@
       </p:grpSpPr>
       <p:sp>
         <p:nvSpPr>
-          <p:cNvPr id="12" name="Tytuł 11">
-            <a:extLst>
-              <a:ext uri="{FF2B5EF4-FFF2-40B4-BE49-F238E27FC236}">
-                <a16:creationId xmlns:a16="http://schemas.microsoft.com/office/drawing/2014/main" id="{0BA60034-9E02-4BFF-D46B-98C157D63892}"/>
-              </a:ext>
-            </a:extLst>
-          </p:cNvPr>
-          <p:cNvSpPr>
-            <a:spLocks noGrp="1"/>
-          </p:cNvSpPr>
-          <p:nvPr>
-            <p:ph type="title"/>
-          </p:nvPr>
-        </p:nvSpPr>
-        <p:spPr/>
-        <p:txBody>
-          <a:bodyPr rtlCol="0"/>
-          <a:lstStyle>
-            <a:defPPr>
-              <a:defRPr lang="pl-PL"/>
-            </a:defPPr>
-          </a:lstStyle>
-          <a:p>
-            <a:pPr rtl="0"/>
-            <a:r>
-              <a:rPr lang="pl-PL"/>
-              <a:t>Wstęp</a:t>
-            </a:r>
-          </a:p>
-        </p:txBody>
-      </p:sp>
-      <p:sp>
-        <p:nvSpPr>
-          <p:cNvPr id="2" name="Zawartość — symbol zastępczy 1">
-            <a:extLst>
-              <a:ext uri="{FF2B5EF4-FFF2-40B4-BE49-F238E27FC236}">
-                <a16:creationId xmlns:a16="http://schemas.microsoft.com/office/drawing/2014/main" id="{2BA91497-60EB-6CC6-BE1A-11323E8A9677}"/>
-              </a:ext>
-            </a:extLst>
-          </p:cNvPr>
-          <p:cNvSpPr>
-            <a:spLocks noGrp="1"/>
-          </p:cNvSpPr>
-          <p:nvPr>
-            <p:ph idx="1"/>
-          </p:nvPr>
-        </p:nvSpPr>
-        <p:spPr>
-          <a:xfrm>
-            <a:off x="3556518" y="1918993"/>
-            <a:ext cx="5932714" cy="3578352"/>
-          </a:xfrm>
-        </p:spPr>
-        <p:txBody>
-          <a:bodyPr rtlCol="0">
-            <a:normAutofit lnSpcReduction="10000"/>
-          </a:bodyPr>
-          <a:lstStyle>
-            <a:defPPr>
-              <a:defRPr lang="pl-PL"/>
-            </a:defPPr>
-          </a:lstStyle>
-          <a:p>
-            <a:pPr rtl="0"/>
-            <a:r>
-              <a:rPr lang="pl-PL" dirty="0"/>
-              <a:t>W dzisiejszych czasach ciężko ludziom zadbać o regularną aktywność fizyczną. Prowadzi to do pogorszenia stanu zdrowia, jak również do problemów z poczuciem własnej wartości. Projekt, który za chwilę zostanie omówiony to narzędzie pozwalające pomóc osobie w dowolnym wieku. Jest to aplikacja, w której każdy może dodać wydarzenie sportowe, aby zebrać jak najwięcej uczestników. Niektóre dyscypliny sportowe wymagają zebrania większej grupy uczestników (np. piłka nożna), a ta aplikacja idealnie rozwiązuje ten problem.</a:t>
-            </a:r>
-          </a:p>
-        </p:txBody>
-      </p:sp>
-      <p:sp>
-        <p:nvSpPr>
-          <p:cNvPr id="25" name="Tekst — symbol zastępczy 24">
-            <a:extLst>
-              <a:ext uri="{FF2B5EF4-FFF2-40B4-BE49-F238E27FC236}">
-                <a16:creationId xmlns:a16="http://schemas.microsoft.com/office/drawing/2014/main" id="{409EE273-65DC-EBC2-149C-7BB5726CEBDB}"/>
-              </a:ext>
-            </a:extLst>
-          </p:cNvPr>
-          <p:cNvSpPr>
-            <a:spLocks noGrp="1"/>
-          </p:cNvSpPr>
-          <p:nvPr>
-            <p:ph type="body" sz="quarter" idx="13"/>
-          </p:nvPr>
-        </p:nvSpPr>
-        <p:spPr/>
-        <p:txBody>
-          <a:bodyPr rtlCol="0"/>
-          <a:lstStyle>
-            <a:defPPr>
-              <a:defRPr lang="pl-PL"/>
-            </a:defPPr>
-          </a:lstStyle>
-          <a:p>
-            <a:pPr rtl="0"/>
-            <a:r>
-              <a:rPr lang="pl-PL"/>
-              <a:t>3</a:t>
-            </a:r>
-          </a:p>
-        </p:txBody>
-      </p:sp>
-      <p:sp>
-        <p:nvSpPr>
-          <p:cNvPr id="27" name="Numer slajdu — symbol zastępczy 26">
-            <a:extLst>
-              <a:ext uri="{FF2B5EF4-FFF2-40B4-BE49-F238E27FC236}">
-                <a16:creationId xmlns:a16="http://schemas.microsoft.com/office/drawing/2014/main" id="{900E35B6-58C6-ABFD-1333-AA1B7702D18A}"/>
-              </a:ext>
-            </a:extLst>
-          </p:cNvPr>
-          <p:cNvSpPr>
-            <a:spLocks noGrp="1"/>
-          </p:cNvSpPr>
-          <p:nvPr>
-            <p:ph type="sldNum" sz="quarter" idx="16"/>
-          </p:nvPr>
-        </p:nvSpPr>
-        <p:spPr/>
-        <p:txBody>
-          <a:bodyPr rtlCol="0"/>
-          <a:lstStyle>
-            <a:defPPr>
-              <a:defRPr lang="pl-PL"/>
-            </a:defPPr>
-          </a:lstStyle>
-          <a:p>
-            <a:pPr rtl="0"/>
-            <a:fld id="{CC43B8D3-9A08-F84C-9DD4-44948BA52D4B}" type="slidenum">
-              <a:rPr lang="pl-PL" smtClean="0"/>
-              <a:pPr rtl="0"/>
-              <a:t>2</a:t>
-            </a:fld>
-            <a:endParaRPr lang="pl-PL"/>
-          </a:p>
-        </p:txBody>
-      </p:sp>
-      <p:pic>
-        <p:nvPicPr>
-          <p:cNvPr id="4" name="Obraz 3" descr="Obraz zawierający tekst, Czcionka, Grafika, logo&#10;&#10;Opis wygenerowany automatycznie">
-            <a:extLst>
-              <a:ext uri="{FF2B5EF4-FFF2-40B4-BE49-F238E27FC236}">
-                <a16:creationId xmlns:a16="http://schemas.microsoft.com/office/drawing/2014/main" id="{3D8FA1F5-2664-B478-675F-35AA02A1B0F2}"/>
-              </a:ext>
-            </a:extLst>
-          </p:cNvPr>
-          <p:cNvPicPr>
-            <a:picLocks noChangeAspect="1"/>
-          </p:cNvPicPr>
-          <p:nvPr/>
-        </p:nvPicPr>
-        <p:blipFill>
-          <a:blip r:embed="rId3"/>
-          <a:stretch>
-            <a:fillRect/>
-          </a:stretch>
-        </p:blipFill>
-        <p:spPr>
-          <a:xfrm>
-            <a:off x="933952" y="1918993"/>
-            <a:ext cx="2114878" cy="2101660"/>
-          </a:xfrm>
-          <a:prstGeom prst="rect">
-            <a:avLst/>
-          </a:prstGeom>
-        </p:spPr>
-      </p:pic>
-      <p:sp>
-        <p:nvSpPr>
-          <p:cNvPr id="5" name="pole tekstowe 4">
-            <a:extLst>
-              <a:ext uri="{FF2B5EF4-FFF2-40B4-BE49-F238E27FC236}">
-                <a16:creationId xmlns:a16="http://schemas.microsoft.com/office/drawing/2014/main" id="{3DBD1273-0B3A-2011-72CD-B5D543236E15}"/>
-              </a:ext>
-            </a:extLst>
-          </p:cNvPr>
-          <p:cNvSpPr txBox="1"/>
-          <p:nvPr/>
-        </p:nvSpPr>
-        <p:spPr>
-          <a:xfrm>
-            <a:off x="543431" y="4030776"/>
-            <a:ext cx="2895919" cy="400110"/>
-          </a:xfrm>
-          <a:prstGeom prst="rect">
-            <a:avLst/>
-          </a:prstGeom>
-          <a:noFill/>
-        </p:spPr>
-        <p:txBody>
-          <a:bodyPr wrap="square" rtlCol="0">
-            <a:spAutoFit/>
-          </a:bodyPr>
-          <a:lstStyle/>
-          <a:p>
-            <a:pPr algn="ctr"/>
-            <a:r>
-              <a:rPr lang="pl-PL" sz="2000" i="1" dirty="0">
-                <a:solidFill>
-                  <a:schemeClr val="accent4">
-                    <a:lumMod val="50000"/>
-                  </a:schemeClr>
-                </a:solidFill>
-              </a:rPr>
-              <a:t>Logo aplikacji</a:t>
-            </a:r>
-          </a:p>
-        </p:txBody>
-      </p:sp>
-    </p:spTree>
-    <p:extLst>
-      <p:ext uri="{BB962C8B-B14F-4D97-AF65-F5344CB8AC3E}">
-        <p14:creationId xmlns:p14="http://schemas.microsoft.com/office/powerpoint/2010/main" val="1343223353"/>
-      </p:ext>
-    </p:extLst>
-  </p:cSld>
-  <p:clrMapOvr>
-    <a:masterClrMapping/>
-  </p:clrMapOvr>
-</p:sld>
-</file>
-
-<file path=ppt/slides/slide20.xml><?xml version="1.0" encoding="utf-8"?>
-<p:sld xmlns:a="http://schemas.openxmlformats.org/drawingml/2006/main" xmlns:r="http://schemas.openxmlformats.org/officeDocument/2006/relationships" xmlns:p="http://schemas.openxmlformats.org/presentationml/2006/main">
-  <p:cSld>
-    <p:bg>
-      <p:bgPr>
-        <a:solidFill>
-          <a:schemeClr val="bg2"/>
-        </a:solidFill>
-        <a:effectLst/>
-      </p:bgPr>
-    </p:bg>
-    <p:spTree>
-      <p:nvGrpSpPr>
-        <p:cNvPr id="1" name=""/>
-        <p:cNvGrpSpPr/>
-        <p:nvPr/>
-      </p:nvGrpSpPr>
-      <p:grpSpPr>
-        <a:xfrm>
-          <a:off x="0" y="0"/>
-          <a:ext cx="0" cy="0"/>
-          <a:chOff x="0" y="0"/>
-          <a:chExt cx="0" cy="0"/>
-        </a:xfrm>
-      </p:grpSpPr>
-      <p:sp>
-        <p:nvSpPr>
           <p:cNvPr id="13" name="Tytuł 12">
             <a:extLst>
               <a:ext uri="{FF2B5EF4-FFF2-40B4-BE49-F238E27FC236}">
@@ -25311,39 +26369,6 @@
           </a:p>
         </p:txBody>
       </p:sp>
-      <p:sp>
-        <p:nvSpPr>
-          <p:cNvPr id="17" name="Numer slajdu — symbol zastępczy 16">
-            <a:extLst>
-              <a:ext uri="{FF2B5EF4-FFF2-40B4-BE49-F238E27FC236}">
-                <a16:creationId xmlns:a16="http://schemas.microsoft.com/office/drawing/2014/main" id="{E46CC291-411B-349C-8657-ED39C084F877}"/>
-              </a:ext>
-            </a:extLst>
-          </p:cNvPr>
-          <p:cNvSpPr>
-            <a:spLocks noGrp="1"/>
-          </p:cNvSpPr>
-          <p:nvPr>
-            <p:ph type="sldNum" sz="quarter" idx="15"/>
-          </p:nvPr>
-        </p:nvSpPr>
-        <p:spPr/>
-        <p:txBody>
-          <a:bodyPr rtlCol="0"/>
-          <a:lstStyle>
-            <a:defPPr>
-              <a:defRPr lang="pl-PL"/>
-            </a:defPPr>
-          </a:lstStyle>
-          <a:p>
-            <a:pPr rtl="0"/>
-            <a:r>
-              <a:rPr lang="pl-PL" dirty="0"/>
-              <a:t>12</a:t>
-            </a:r>
-          </a:p>
-        </p:txBody>
-      </p:sp>
     </p:spTree>
     <p:extLst>
       <p:ext uri="{BB962C8B-B14F-4D97-AF65-F5344CB8AC3E}">
@@ -25357,7 +26382,7 @@
 </p:sld>
 </file>
 
-<file path=ppt/slides/slide21.xml><?xml version="1.0" encoding="utf-8"?>
+<file path=ppt/slides/slide24.xml><?xml version="1.0" encoding="utf-8"?>
 <p:sld xmlns:a="http://schemas.openxmlformats.org/drawingml/2006/main" xmlns:r="http://schemas.openxmlformats.org/officeDocument/2006/relationships" xmlns:p="http://schemas.openxmlformats.org/presentationml/2006/main">
   <p:cSld>
     <p:bg>
@@ -28991,15 +30016,6 @@
 </file>
 
 <file path=customXml/item1.xml><?xml version="1.0" encoding="utf-8"?>
-<?mso-contentType ?>
-<FormTemplates xmlns="http://schemas.microsoft.com/sharepoint/v3/contenttype/forms">
-  <Display>DocumentLibraryForm</Display>
-  <Edit>DocumentLibraryForm</Edit>
-  <New>DocumentLibraryForm</New>
-</FormTemplates>
-</file>
-
-<file path=customXml/item2.xml><?xml version="1.0" encoding="utf-8"?>
 <ct:contentTypeSchema xmlns:ct="http://schemas.microsoft.com/office/2006/metadata/contentType" xmlns:ma="http://schemas.microsoft.com/office/2006/metadata/properties/metaAttributes" ct:_="" ma:_="" ma:contentTypeName="Document" ma:contentTypeID="0x0101003AB9CED55E8F8543BEFD54205924B97E" ma:contentTypeVersion="15" ma:contentTypeDescription="Create a new document." ma:contentTypeScope="" ma:versionID="7934cfc98febfa177962bc8a36be076c">
   <xsd:schema xmlns:xsd="http://www.w3.org/2001/XMLSchema" xmlns:xs="http://www.w3.org/2001/XMLSchema" xmlns:p="http://schemas.microsoft.com/office/2006/metadata/properties" xmlns:ns2="4f0d45a2-344c-4fe0-9811-4277bf2c2e17" xmlns:ns3="bb13cd20-357b-48a5-aff4-3bb4b52aae3e" targetNamespace="http://schemas.microsoft.com/office/2006/metadata/properties" ma:root="true" ma:fieldsID="aa190bc864bcebc737c679dbb323a16d" ns2:_="" ns3:_="">
     <xsd:import namespace="4f0d45a2-344c-4fe0-9811-4277bf2c2e17"/>
@@ -29236,6 +30252,15 @@
 </ct:contentTypeSchema>
 </file>
 
+<file path=customXml/item2.xml><?xml version="1.0" encoding="utf-8"?>
+<?mso-contentType ?>
+<FormTemplates xmlns="http://schemas.microsoft.com/sharepoint/v3/contenttype/forms">
+  <Display>DocumentLibraryForm</Display>
+  <Edit>DocumentLibraryForm</Edit>
+  <New>DocumentLibraryForm</New>
+</FormTemplates>
+</file>
+
 <file path=customXml/item3.xml><?xml version="1.0" encoding="utf-8"?>
 <p:properties xmlns:p="http://schemas.microsoft.com/office/2006/metadata/properties" xmlns:xsi="http://www.w3.org/2001/XMLSchema-instance" xmlns:pc="http://schemas.microsoft.com/office/infopath/2007/PartnerControls">
   <documentManagement>
@@ -29249,14 +30274,6 @@
 </file>
 
 <file path=customXml/itemProps1.xml><?xml version="1.0" encoding="utf-8"?>
-<ds:datastoreItem xmlns:ds="http://schemas.openxmlformats.org/officeDocument/2006/customXml" ds:itemID="{83441F37-C10B-49C7-9131-D813AD6E9480}">
-  <ds:schemaRefs>
-    <ds:schemaRef ds:uri="http://schemas.microsoft.com/sharepoint/v3/contenttype/forms"/>
-  </ds:schemaRefs>
-</ds:datastoreItem>
-</file>
-
-<file path=customXml/itemProps2.xml><?xml version="1.0" encoding="utf-8"?>
 <ds:datastoreItem xmlns:ds="http://schemas.openxmlformats.org/officeDocument/2006/customXml" ds:itemID="{40F892F8-B153-4A37-BD5F-A2BAB7375010}">
   <ds:schemaRefs>
     <ds:schemaRef ds:uri="http://schemas.microsoft.com/office/2006/metadata/contentType"/>
@@ -29271,6 +30288,14 @@
     <ds:schemaRef ds:uri="http://purl.org/dc/elements/1.1/"/>
     <ds:schemaRef ds:uri="http://purl.org/dc/terms/"/>
     <ds:schemaRef ds:uri="http://schemas.microsoft.com/internal/obd"/>
+  </ds:schemaRefs>
+</ds:datastoreItem>
+</file>
+
+<file path=customXml/itemProps2.xml><?xml version="1.0" encoding="utf-8"?>
+<ds:datastoreItem xmlns:ds="http://schemas.openxmlformats.org/officeDocument/2006/customXml" ds:itemID="{83441F37-C10B-49C7-9131-D813AD6E9480}">
+  <ds:schemaRefs>
+    <ds:schemaRef ds:uri="http://schemas.microsoft.com/sharepoint/v3/contenttype/forms"/>
   </ds:schemaRefs>
 </ds:datastoreItem>
 </file>

</xml_diff>

<commit_message>
Drobna poprawka wizualna w tabelce ryzyk
</commit_message>
<xml_diff>
--- a/Aplikacja Sports Joiner.pptx
+++ b/Aplikacja Sports Joiner.pptx
@@ -4800,7 +4800,7 @@
             <a:pPr rtl="0"/>
             <a:fld id="{DAB64803-BE99-4D11-92FE-DB0D80E992EC}" type="datetime1">
               <a:rPr lang="pl-PL" smtClean="0"/>
-              <a:t>19.11.2024</a:t>
+              <a:t>20.11.2024</a:t>
             </a:fld>
             <a:endParaRPr lang="pl-PL" dirty="0"/>
           </a:p>
@@ -4981,7 +4981,7 @@
             <a:fld id="{DB090C74-F23A-4A01-B61B-B7FE422EF232}" type="datetime1">
               <a:rPr lang="pl-PL" smtClean="0"/>
               <a:pPr/>
-              <a:t>19.11.2024</a:t>
+              <a:t>20.11.2024</a:t>
             </a:fld>
             <a:endParaRPr lang="pl-PL" dirty="0"/>
           </a:p>
@@ -24507,7 +24507,7 @@
           <p:nvPr>
             <p:extLst>
               <p:ext uri="{D42A27DB-BD31-4B8C-83A1-F6EECF244321}">
-                <p14:modId xmlns:p14="http://schemas.microsoft.com/office/powerpoint/2010/main" val="3211658597"/>
+                <p14:modId xmlns:p14="http://schemas.microsoft.com/office/powerpoint/2010/main" val="2249927751"/>
               </p:ext>
             </p:extLst>
           </p:nvPr>
@@ -24530,14 +24530,14 @@
                     </a:ext>
                   </a:extLst>
                 </a:gridCol>
-                <a:gridCol w="2904672">
+                <a:gridCol w="3461720">
                   <a:extLst>
                     <a:ext uri="{9D8B030D-6E8A-4147-A177-3AD203B41FA5}">
                       <a16:colId xmlns:a16="http://schemas.microsoft.com/office/drawing/2014/main" val="328024447"/>
                     </a:ext>
                   </a:extLst>
                 </a:gridCol>
-                <a:gridCol w="2904672">
+                <a:gridCol w="2347624">
                   <a:extLst>
                     <a:ext uri="{9D8B030D-6E8A-4147-A177-3AD203B41FA5}">
                       <a16:colId xmlns:a16="http://schemas.microsoft.com/office/drawing/2014/main" val="437132700"/>
@@ -24561,7 +24561,7 @@
                       <a:pPr algn="ctr"/>
                       <a:r>
                         <a:rPr lang="pl-PL" dirty="0"/>
-                        <a:t>Problem</a:t>
+                        <a:t>PROBLEM</a:t>
                       </a:r>
                     </a:p>
                   </a:txBody>
@@ -24575,7 +24575,7 @@
                       <a:pPr algn="ctr"/>
                       <a:r>
                         <a:rPr lang="pl-PL" dirty="0"/>
-                        <a:t>Prawdopodobieństwo</a:t>
+                        <a:t>PRAWDOPODOBIEŃSTWO</a:t>
                       </a:r>
                     </a:p>
                   </a:txBody>
@@ -24589,7 +24589,7 @@
                       <a:pPr algn="ctr"/>
                       <a:r>
                         <a:rPr lang="pl-PL" dirty="0"/>
-                        <a:t>Wpływ</a:t>
+                        <a:t>WPŁYW</a:t>
                       </a:r>
                     </a:p>
                   </a:txBody>
@@ -24603,7 +24603,7 @@
                       <a:pPr algn="ctr"/>
                       <a:r>
                         <a:rPr lang="pl-PL" dirty="0"/>
-                        <a:t>Rozwiązanie</a:t>
+                        <a:t>ROZWIĄZANIE</a:t>
                       </a:r>
                     </a:p>
                   </a:txBody>
@@ -30016,6 +30016,15 @@
 </file>
 
 <file path=customXml/item1.xml><?xml version="1.0" encoding="utf-8"?>
+<?mso-contentType ?>
+<FormTemplates xmlns="http://schemas.microsoft.com/sharepoint/v3/contenttype/forms">
+  <Display>DocumentLibraryForm</Display>
+  <Edit>DocumentLibraryForm</Edit>
+  <New>DocumentLibraryForm</New>
+</FormTemplates>
+</file>
+
+<file path=customXml/item2.xml><?xml version="1.0" encoding="utf-8"?>
 <ct:contentTypeSchema xmlns:ct="http://schemas.microsoft.com/office/2006/metadata/contentType" xmlns:ma="http://schemas.microsoft.com/office/2006/metadata/properties/metaAttributes" ct:_="" ma:_="" ma:contentTypeName="Document" ma:contentTypeID="0x0101003AB9CED55E8F8543BEFD54205924B97E" ma:contentTypeVersion="15" ma:contentTypeDescription="Create a new document." ma:contentTypeScope="" ma:versionID="7934cfc98febfa177962bc8a36be076c">
   <xsd:schema xmlns:xsd="http://www.w3.org/2001/XMLSchema" xmlns:xs="http://www.w3.org/2001/XMLSchema" xmlns:p="http://schemas.microsoft.com/office/2006/metadata/properties" xmlns:ns2="4f0d45a2-344c-4fe0-9811-4277bf2c2e17" xmlns:ns3="bb13cd20-357b-48a5-aff4-3bb4b52aae3e" targetNamespace="http://schemas.microsoft.com/office/2006/metadata/properties" ma:root="true" ma:fieldsID="aa190bc864bcebc737c679dbb323a16d" ns2:_="" ns3:_="">
     <xsd:import namespace="4f0d45a2-344c-4fe0-9811-4277bf2c2e17"/>
@@ -30252,15 +30261,6 @@
 </ct:contentTypeSchema>
 </file>
 
-<file path=customXml/item2.xml><?xml version="1.0" encoding="utf-8"?>
-<?mso-contentType ?>
-<FormTemplates xmlns="http://schemas.microsoft.com/sharepoint/v3/contenttype/forms">
-  <Display>DocumentLibraryForm</Display>
-  <Edit>DocumentLibraryForm</Edit>
-  <New>DocumentLibraryForm</New>
-</FormTemplates>
-</file>
-
 <file path=customXml/item3.xml><?xml version="1.0" encoding="utf-8"?>
 <p:properties xmlns:p="http://schemas.microsoft.com/office/2006/metadata/properties" xmlns:xsi="http://www.w3.org/2001/XMLSchema-instance" xmlns:pc="http://schemas.microsoft.com/office/infopath/2007/PartnerControls">
   <documentManagement>
@@ -30274,6 +30274,14 @@
 </file>
 
 <file path=customXml/itemProps1.xml><?xml version="1.0" encoding="utf-8"?>
+<ds:datastoreItem xmlns:ds="http://schemas.openxmlformats.org/officeDocument/2006/customXml" ds:itemID="{83441F37-C10B-49C7-9131-D813AD6E9480}">
+  <ds:schemaRefs>
+    <ds:schemaRef ds:uri="http://schemas.microsoft.com/sharepoint/v3/contenttype/forms"/>
+  </ds:schemaRefs>
+</ds:datastoreItem>
+</file>
+
+<file path=customXml/itemProps2.xml><?xml version="1.0" encoding="utf-8"?>
 <ds:datastoreItem xmlns:ds="http://schemas.openxmlformats.org/officeDocument/2006/customXml" ds:itemID="{40F892F8-B153-4A37-BD5F-A2BAB7375010}">
   <ds:schemaRefs>
     <ds:schemaRef ds:uri="http://schemas.microsoft.com/office/2006/metadata/contentType"/>
@@ -30288,14 +30296,6 @@
     <ds:schemaRef ds:uri="http://purl.org/dc/elements/1.1/"/>
     <ds:schemaRef ds:uri="http://purl.org/dc/terms/"/>
     <ds:schemaRef ds:uri="http://schemas.microsoft.com/internal/obd"/>
-  </ds:schemaRefs>
-</ds:datastoreItem>
-</file>
-
-<file path=customXml/itemProps2.xml><?xml version="1.0" encoding="utf-8"?>
-<ds:datastoreItem xmlns:ds="http://schemas.openxmlformats.org/officeDocument/2006/customXml" ds:itemID="{83441F37-C10B-49C7-9131-D813AD6E9480}">
-  <ds:schemaRefs>
-    <ds:schemaRef ds:uri="http://schemas.microsoft.com/sharepoint/v3/contenttype/forms"/>
   </ds:schemaRefs>
 </ds:datastoreItem>
 </file>

</xml_diff>